<commit_message>
Added image of VM Instruction Break to lesson
</commit_message>
<xml_diff>
--- a/translations/en-us/beyond/BranchingError.pptx
+++ b/translations/en-us/beyond/BranchingError.pptx
@@ -230,7 +230,7 @@
           <a:p>
             <a:fld id="{E354B44E-40A3-0E46-B16A-9BF1250A248B}" type="datetimeFigureOut">
               <a:rPr lang="en-US" smtClean="0"/>
-              <a:t>10/16/16</a:t>
+              <a:t>10/18/16</a:t>
             </a:fld>
             <a:endParaRPr lang="en-US"/>
           </a:p>
@@ -396,7 +396,7 @@
           <a:p>
             <a:fld id="{C86AD16C-2DB4-6642-BAD4-9ED973A087A0}" type="datetimeFigureOut">
               <a:rPr lang="en-US" smtClean="0"/>
-              <a:t>10/16/16</a:t>
+              <a:t>10/18/16</a:t>
             </a:fld>
             <a:endParaRPr lang="en-US"/>
           </a:p>
@@ -730,6 +730,90 @@
           <a:p>
             <a:fld id="{1E5BF589-3978-3C45-966B-D7B7A71F2A02}" type="slidenum">
               <a:rPr lang="en-US" smtClean="0"/>
+              <a:t>3</a:t>
+            </a:fld>
+            <a:endParaRPr lang="en-US"/>
+          </a:p>
+        </p:txBody>
+      </p:sp>
+    </p:spTree>
+    <p:extLst>
+      <p:ext uri="{BB962C8B-B14F-4D97-AF65-F5344CB8AC3E}">
+        <p14:creationId xmlns:p14="http://schemas.microsoft.com/office/powerpoint/2010/main" val="1495297923"/>
+      </p:ext>
+    </p:extLst>
+  </p:cSld>
+  <p:clrMapOvr>
+    <a:masterClrMapping/>
+  </p:clrMapOvr>
+</p:notes>
+</file>
+
+<file path=ppt/notesSlides/notesSlide2.xml><?xml version="1.0" encoding="utf-8"?>
+<p:notes xmlns:a="http://schemas.openxmlformats.org/drawingml/2006/main" xmlns:r="http://schemas.openxmlformats.org/officeDocument/2006/relationships" xmlns:p="http://schemas.openxmlformats.org/presentationml/2006/main">
+  <p:cSld>
+    <p:spTree>
+      <p:nvGrpSpPr>
+        <p:cNvPr id="1" name=""/>
+        <p:cNvGrpSpPr/>
+        <p:nvPr/>
+      </p:nvGrpSpPr>
+      <p:grpSpPr>
+        <a:xfrm>
+          <a:off x="0" y="0"/>
+          <a:ext cx="0" cy="0"/>
+          <a:chOff x="0" y="0"/>
+          <a:chExt cx="0" cy="0"/>
+        </a:xfrm>
+      </p:grpSpPr>
+      <p:sp>
+        <p:nvSpPr>
+          <p:cNvPr id="2" name="Slide Image Placeholder 1"/>
+          <p:cNvSpPr>
+            <a:spLocks noGrp="1" noRot="1" noChangeAspect="1"/>
+          </p:cNvSpPr>
+          <p:nvPr>
+            <p:ph type="sldImg"/>
+          </p:nvPr>
+        </p:nvSpPr>
+        <p:spPr/>
+      </p:sp>
+      <p:sp>
+        <p:nvSpPr>
+          <p:cNvPr id="3" name="Notes Placeholder 2"/>
+          <p:cNvSpPr>
+            <a:spLocks noGrp="1"/>
+          </p:cNvSpPr>
+          <p:nvPr>
+            <p:ph type="body" idx="1"/>
+          </p:nvPr>
+        </p:nvSpPr>
+        <p:spPr/>
+        <p:txBody>
+          <a:bodyPr/>
+          <a:lstStyle/>
+          <a:p>
+            <a:endParaRPr lang="en-US"/>
+          </a:p>
+        </p:txBody>
+      </p:sp>
+      <p:sp>
+        <p:nvSpPr>
+          <p:cNvPr id="4" name="Slide Number Placeholder 3"/>
+          <p:cNvSpPr>
+            <a:spLocks noGrp="1"/>
+          </p:cNvSpPr>
+          <p:nvPr>
+            <p:ph type="sldNum" sz="quarter" idx="10"/>
+          </p:nvPr>
+        </p:nvSpPr>
+        <p:spPr/>
+        <p:txBody>
+          <a:bodyPr/>
+          <a:lstStyle/>
+          <a:p>
+            <a:fld id="{1E5BF589-3978-3C45-966B-D7B7A71F2A02}" type="slidenum">
+              <a:rPr lang="en-US" smtClean="0"/>
               <a:t>11</a:t>
             </a:fld>
             <a:endParaRPr lang="en-US"/>
@@ -749,7 +833,7 @@
 </p:notes>
 </file>
 
-<file path=ppt/notesSlides/notesSlide2.xml><?xml version="1.0" encoding="utf-8"?>
+<file path=ppt/notesSlides/notesSlide3.xml><?xml version="1.0" encoding="utf-8"?>
 <p:notes xmlns:a="http://schemas.openxmlformats.org/drawingml/2006/main" xmlns:r="http://schemas.openxmlformats.org/officeDocument/2006/relationships" xmlns:p="http://schemas.openxmlformats.org/presentationml/2006/main">
   <p:cSld>
     <p:spTree>
@@ -1024,9 +1108,9 @@
           <a:bodyPr/>
           <a:lstStyle/>
           <a:p>
-            <a:fld id="{041BF718-02FB-0148-AD07-F6B3A1DA4C41}" type="datetime1">
-              <a:rPr lang="en-US" smtClean="0"/>
-              <a:t>10/17/16</a:t>
+            <a:fld id="{FD05E093-ED86-2146-9551-BA44ED13EC02}" type="datetime1">
+              <a:rPr lang="en-US" smtClean="0"/>
+              <a:t>10/18/16</a:t>
             </a:fld>
             <a:endParaRPr lang="en-US"/>
           </a:p>
@@ -1049,7 +1133,7 @@
           <a:p>
             <a:r>
               <a:rPr lang="sk-SK" smtClean="0"/>
-              <a:t>© 2016 EV3Lessons.com, Last Edit 10/17/2016</a:t>
+              <a:t>© 2016 EV3Lessons.com, Last Edit 10/18/2016</a:t>
             </a:r>
             <a:endParaRPr lang="en-US"/>
           </a:p>
@@ -1623,9 +1707,9 @@
           <a:bodyPr/>
           <a:lstStyle/>
           <a:p>
-            <a:fld id="{3A47A696-6EFC-B341-AA5D-81A8DFBCF080}" type="datetime1">
-              <a:rPr lang="en-US" smtClean="0"/>
-              <a:t>10/17/16</a:t>
+            <a:fld id="{D7BAC967-79F1-3045-AC00-BDD8144DE932}" type="datetime1">
+              <a:rPr lang="en-US" smtClean="0"/>
+              <a:t>10/18/16</a:t>
             </a:fld>
             <a:endParaRPr lang="en-US"/>
           </a:p>
@@ -1648,7 +1732,7 @@
           <a:p>
             <a:r>
               <a:rPr lang="sk-SK" smtClean="0"/>
-              <a:t>© 2016 EV3Lessons.com, Last Edit 10/17/2016</a:t>
+              <a:t>© 2016 EV3Lessons.com, Last Edit 10/18/2016</a:t>
             </a:r>
             <a:endParaRPr lang="en-US"/>
           </a:p>
@@ -1807,9 +1891,9 @@
           <a:bodyPr/>
           <a:lstStyle/>
           <a:p>
-            <a:fld id="{23228557-E6CA-5147-9873-B16C069187B2}" type="datetime1">
-              <a:rPr lang="en-US" smtClean="0"/>
-              <a:t>10/17/16</a:t>
+            <a:fld id="{166BB710-88B0-B647-99DF-975987E001A2}" type="datetime1">
+              <a:rPr lang="en-US" smtClean="0"/>
+              <a:t>10/18/16</a:t>
             </a:fld>
             <a:endParaRPr lang="en-US"/>
           </a:p>
@@ -1832,7 +1916,7 @@
           <a:p>
             <a:r>
               <a:rPr lang="sk-SK" smtClean="0"/>
-              <a:t>© 2016 EV3Lessons.com, Last Edit 10/17/2016</a:t>
+              <a:t>© 2016 EV3Lessons.com, Last Edit 10/18/2016</a:t>
             </a:r>
             <a:endParaRPr lang="en-US"/>
           </a:p>
@@ -2024,9 +2108,9 @@
           <a:bodyPr/>
           <a:lstStyle/>
           <a:p>
-            <a:fld id="{01D8DC87-242F-3545-9B5E-BB2B3588C604}" type="datetime1">
-              <a:rPr lang="en-US" smtClean="0"/>
-              <a:t>10/17/16</a:t>
+            <a:fld id="{CD92D860-516E-034D-9467-249867CD21EC}" type="datetime1">
+              <a:rPr lang="en-US" smtClean="0"/>
+              <a:t>10/18/16</a:t>
             </a:fld>
             <a:endParaRPr lang="en-US"/>
           </a:p>
@@ -2054,7 +2138,7 @@
           <a:p>
             <a:r>
               <a:rPr lang="sk-SK" smtClean="0"/>
-              <a:t>© 2016 EV3Lessons.com, Last Edit 10/17/2016</a:t>
+              <a:t>© 2016 EV3Lessons.com, Last Edit 10/18/2016</a:t>
             </a:r>
             <a:endParaRPr lang="en-US"/>
           </a:p>
@@ -2245,7 +2329,7 @@
           <a:noFill/>
           <a:extLst>
             <a:ext uri="{909E8E84-426E-40dd-AFC4-6F175D3DCCD1}">
-              <a14:hiddenFill xmlns:a14="http://schemas.microsoft.com/office/drawing/2010/main" xmlns="">
+              <a14:hiddenFill xmlns="" xmlns:a14="http://schemas.microsoft.com/office/drawing/2010/main">
                 <a:solidFill>
                   <a:srgbClr val="FFFFFF"/>
                 </a:solidFill>
@@ -2878,9 +2962,9 @@
           <a:bodyPr/>
           <a:lstStyle/>
           <a:p>
-            <a:fld id="{725009F2-CE65-4342-A962-0066AF7435AC}" type="datetime1">
-              <a:rPr lang="en-US" smtClean="0"/>
-              <a:t>10/17/16</a:t>
+            <a:fld id="{21DF594E-2FA9-6B4B-987B-567CF26F06D5}" type="datetime1">
+              <a:rPr lang="en-US" smtClean="0"/>
+              <a:t>10/18/16</a:t>
             </a:fld>
             <a:endParaRPr lang="en-US"/>
           </a:p>
@@ -2903,7 +2987,7 @@
           <a:p>
             <a:r>
               <a:rPr lang="sk-SK" smtClean="0"/>
-              <a:t>© 2016 EV3Lessons.com, Last Edit 10/17/2016</a:t>
+              <a:t>© 2016 EV3Lessons.com, Last Edit 10/18/2016</a:t>
             </a:r>
             <a:endParaRPr lang="en-US"/>
           </a:p>
@@ -3151,9 +3235,9 @@
           <a:bodyPr/>
           <a:lstStyle/>
           <a:p>
-            <a:fld id="{53B711D8-3BB5-7F4E-A5EF-F3893298EC1C}" type="datetime1">
-              <a:rPr lang="en-US" smtClean="0"/>
-              <a:t>10/17/16</a:t>
+            <a:fld id="{F1E587C1-9FAA-7E4D-9180-ABB3A32185A2}" type="datetime1">
+              <a:rPr lang="en-US" smtClean="0"/>
+              <a:t>10/18/16</a:t>
             </a:fld>
             <a:endParaRPr lang="en-US"/>
           </a:p>
@@ -3207,7 +3291,7 @@
           <a:p>
             <a:r>
               <a:rPr lang="sk-SK" smtClean="0"/>
-              <a:t>© 2016 EV3Lessons.com, Last Edit 10/17/2016</a:t>
+              <a:t>© 2016 EV3Lessons.com, Last Edit 10/18/2016</a:t>
             </a:r>
             <a:endParaRPr lang="en-US"/>
           </a:p>
@@ -3456,9 +3540,9 @@
           <a:bodyPr/>
           <a:lstStyle/>
           <a:p>
-            <a:fld id="{1F52AEB3-E259-B24C-91A2-526ECD3640D6}" type="datetime1">
-              <a:rPr lang="en-US" smtClean="0"/>
-              <a:t>10/17/16</a:t>
+            <a:fld id="{A5AFF2E5-5E27-2748-A205-6CA6CB4AF064}" type="datetime1">
+              <a:rPr lang="en-US" smtClean="0"/>
+              <a:t>10/18/16</a:t>
             </a:fld>
             <a:endParaRPr lang="en-US"/>
           </a:p>
@@ -3481,7 +3565,7 @@
           <a:p>
             <a:r>
               <a:rPr lang="sk-SK" smtClean="0"/>
-              <a:t>© 2016 EV3Lessons.com, Last Edit 10/17/2016</a:t>
+              <a:t>© 2016 EV3Lessons.com, Last Edit 10/18/2016</a:t>
             </a:r>
             <a:endParaRPr lang="en-US"/>
           </a:p>
@@ -3919,9 +4003,9 @@
           <a:bodyPr/>
           <a:lstStyle/>
           <a:p>
-            <a:fld id="{0B3E8149-F0AC-C74A-94FA-29A5CE2D58B4}" type="datetime1">
-              <a:rPr lang="en-US" smtClean="0"/>
-              <a:t>10/17/16</a:t>
+            <a:fld id="{D59E0700-1495-FA40-92CA-EF439C7F0C60}" type="datetime1">
+              <a:rPr lang="en-US" smtClean="0"/>
+              <a:t>10/18/16</a:t>
             </a:fld>
             <a:endParaRPr lang="en-US"/>
           </a:p>
@@ -3944,7 +4028,7 @@
           <a:p>
             <a:r>
               <a:rPr lang="sk-SK" smtClean="0"/>
-              <a:t>© 2016 EV3Lessons.com, Last Edit 10/17/2016</a:t>
+              <a:t>© 2016 EV3Lessons.com, Last Edit 10/18/2016</a:t>
             </a:r>
             <a:endParaRPr lang="en-US"/>
           </a:p>
@@ -4056,9 +4140,9 @@
           <a:bodyPr/>
           <a:lstStyle/>
           <a:p>
-            <a:fld id="{B151333D-CC79-1B43-9EE7-1C4B5719A2BE}" type="datetime1">
-              <a:rPr lang="en-US" smtClean="0"/>
-              <a:t>10/17/16</a:t>
+            <a:fld id="{57CD7F4B-998A-E248-9389-D5A59CCBC8BE}" type="datetime1">
+              <a:rPr lang="en-US" smtClean="0"/>
+              <a:t>10/18/16</a:t>
             </a:fld>
             <a:endParaRPr lang="en-US"/>
           </a:p>
@@ -4081,7 +4165,7 @@
           <a:p>
             <a:r>
               <a:rPr lang="sk-SK" smtClean="0"/>
-              <a:t>© 2016 EV3Lessons.com, Last Edit 10/17/2016</a:t>
+              <a:t>© 2016 EV3Lessons.com, Last Edit 10/18/2016</a:t>
             </a:r>
             <a:endParaRPr lang="en-US"/>
           </a:p>
@@ -4170,9 +4254,9 @@
           <a:bodyPr/>
           <a:lstStyle/>
           <a:p>
-            <a:fld id="{CFF6FA2F-0731-8E4A-98E6-E333AF375624}" type="datetime1">
-              <a:rPr lang="en-US" smtClean="0"/>
-              <a:t>10/17/16</a:t>
+            <a:fld id="{1DBBB98A-C4EE-0A4F-9CF5-4D145830DE6B}" type="datetime1">
+              <a:rPr lang="en-US" smtClean="0"/>
+              <a:t>10/18/16</a:t>
             </a:fld>
             <a:endParaRPr lang="en-US"/>
           </a:p>
@@ -4195,7 +4279,7 @@
           <a:p>
             <a:r>
               <a:rPr lang="sk-SK" smtClean="0"/>
-              <a:t>© 2016 EV3Lessons.com, Last Edit 10/17/2016</a:t>
+              <a:t>© 2016 EV3Lessons.com, Last Edit 10/18/2016</a:t>
             </a:r>
             <a:endParaRPr lang="en-US"/>
           </a:p>
@@ -4429,9 +4513,9 @@
           <a:bodyPr/>
           <a:lstStyle/>
           <a:p>
-            <a:fld id="{63C64106-A472-6847-AFB9-1E1E08FDD3A7}" type="datetime1">
-              <a:rPr lang="en-US" smtClean="0"/>
-              <a:t>10/17/16</a:t>
+            <a:fld id="{545942EB-BDDD-DA47-B957-9EF2539A6072}" type="datetime1">
+              <a:rPr lang="en-US" smtClean="0"/>
+              <a:t>10/18/16</a:t>
             </a:fld>
             <a:endParaRPr lang="en-US"/>
           </a:p>
@@ -4454,7 +4538,7 @@
           <a:p>
             <a:r>
               <a:rPr lang="sk-SK" smtClean="0"/>
-              <a:t>© 2016 EV3Lessons.com, Last Edit 10/17/2016</a:t>
+              <a:t>© 2016 EV3Lessons.com, Last Edit 10/18/2016</a:t>
             </a:r>
             <a:endParaRPr lang="en-US"/>
           </a:p>
@@ -4644,9 +4728,9 @@
           <a:bodyPr/>
           <a:lstStyle/>
           <a:p>
-            <a:fld id="{6C690BA7-4DF3-5F49-B268-ED78C2BF4878}" type="datetime1">
-              <a:rPr lang="en-US" smtClean="0"/>
-              <a:t>10/17/16</a:t>
+            <a:fld id="{0D0D8D12-238D-AE44-9E0C-997468207ACD}" type="datetime1">
+              <a:rPr lang="en-US" smtClean="0"/>
+              <a:t>10/18/16</a:t>
             </a:fld>
             <a:endParaRPr lang="en-US"/>
           </a:p>
@@ -4669,7 +4753,7 @@
           <a:p>
             <a:r>
               <a:rPr lang="sk-SK" smtClean="0"/>
-              <a:t>© 2016 EV3Lessons.com, Last Edit 10/17/2016</a:t>
+              <a:t>© 2016 EV3Lessons.com, Last Edit 10/18/2016</a:t>
             </a:r>
             <a:endParaRPr lang="en-US"/>
           </a:p>
@@ -4929,9 +5013,9 @@
           <a:bodyPr/>
           <a:lstStyle/>
           <a:p>
-            <a:fld id="{1B6260EB-83AF-7849-83C5-DABBE952D0C3}" type="datetime1">
-              <a:rPr lang="en-US" smtClean="0"/>
-              <a:t>10/17/16</a:t>
+            <a:fld id="{62ACD900-06AD-D94E-81A6-025F2D0F7A8A}" type="datetime1">
+              <a:rPr lang="en-US" smtClean="0"/>
+              <a:t>10/18/16</a:t>
             </a:fld>
             <a:endParaRPr lang="en-US"/>
           </a:p>
@@ -4954,7 +5038,7 @@
           <a:p>
             <a:r>
               <a:rPr lang="sk-SK" smtClean="0"/>
-              <a:t>© 2016 EV3Lessons.com, Last Edit 10/17/2016</a:t>
+              <a:t>© 2016 EV3Lessons.com, Last Edit 10/18/2016</a:t>
             </a:r>
             <a:endParaRPr lang="en-US"/>
           </a:p>
@@ -5199,9 +5283,9 @@
           <a:bodyPr/>
           <a:lstStyle/>
           <a:p>
-            <a:fld id="{25D7F304-2180-054C-A761-7934E5BF7C7F}" type="datetime1">
-              <a:rPr lang="en-US" smtClean="0"/>
-              <a:t>10/17/16</a:t>
+            <a:fld id="{6A6DE80D-2F90-1643-BD00-A66E8C56EDA1}" type="datetime1">
+              <a:rPr lang="en-US" smtClean="0"/>
+              <a:t>10/18/16</a:t>
             </a:fld>
             <a:endParaRPr lang="en-US"/>
           </a:p>
@@ -5224,7 +5308,7 @@
           <a:p>
             <a:r>
               <a:rPr lang="sk-SK" smtClean="0"/>
-              <a:t>© 2016 EV3Lessons.com, Last Edit 10/17/2016</a:t>
+              <a:t>© 2016 EV3Lessons.com, Last Edit 10/18/2016</a:t>
             </a:r>
             <a:endParaRPr lang="en-US"/>
           </a:p>
@@ -5391,9 +5475,9 @@
           <a:bodyPr/>
           <a:lstStyle/>
           <a:p>
-            <a:fld id="{DACD41A3-8E9E-1441-BEE0-7C969150290D}" type="datetime1">
-              <a:rPr lang="en-US" smtClean="0"/>
-              <a:t>10/17/16</a:t>
+            <a:fld id="{B0D9E542-CE7E-C842-B5ED-0CA4976B5FF0}" type="datetime1">
+              <a:rPr lang="en-US" smtClean="0"/>
+              <a:t>10/18/16</a:t>
             </a:fld>
             <a:endParaRPr lang="en-US"/>
           </a:p>
@@ -5416,7 +5500,7 @@
           <a:p>
             <a:r>
               <a:rPr lang="sk-SK" smtClean="0"/>
-              <a:t>© 2016 EV3Lessons.com, Last Edit 10/17/2016</a:t>
+              <a:t>© 2016 EV3Lessons.com, Last Edit 10/18/2016</a:t>
             </a:r>
             <a:endParaRPr lang="en-US"/>
           </a:p>
@@ -5595,9 +5679,9 @@
           <a:bodyPr/>
           <a:lstStyle/>
           <a:p>
-            <a:fld id="{EF17508E-8446-BE4C-BD17-A9B0959086FC}" type="datetime1">
-              <a:rPr lang="en-US" smtClean="0"/>
-              <a:t>10/17/16</a:t>
+            <a:fld id="{D9F59D03-6F35-F941-A3EC-63D8CF8238F0}" type="datetime1">
+              <a:rPr lang="en-US" smtClean="0"/>
+              <a:t>10/18/16</a:t>
             </a:fld>
             <a:endParaRPr lang="en-US"/>
           </a:p>
@@ -5620,7 +5704,7 @@
           <a:p>
             <a:r>
               <a:rPr lang="sk-SK" smtClean="0"/>
-              <a:t>© 2016 EV3Lessons.com, Last Edit 10/17/2016</a:t>
+              <a:t>© 2016 EV3Lessons.com, Last Edit 10/18/2016</a:t>
             </a:r>
             <a:endParaRPr lang="en-US"/>
           </a:p>
@@ -5769,9 +5853,9 @@
           <a:bodyPr/>
           <a:lstStyle/>
           <a:p>
-            <a:fld id="{731268C4-FD95-5D41-8922-5E84A91C436D}" type="datetime1">
-              <a:rPr lang="en-US" smtClean="0"/>
-              <a:t>10/17/16</a:t>
+            <a:fld id="{0274EC29-3731-7E42-A6E0-9B812E405A7E}" type="datetime1">
+              <a:rPr lang="en-US" smtClean="0"/>
+              <a:t>10/18/16</a:t>
             </a:fld>
             <a:endParaRPr lang="en-US"/>
           </a:p>
@@ -5794,7 +5878,7 @@
           <a:p>
             <a:r>
               <a:rPr lang="sk-SK" smtClean="0"/>
-              <a:t>© 2016 EV3Lessons.com, Last Edit 10/17/2016</a:t>
+              <a:t>© 2016 EV3Lessons.com, Last Edit 10/18/2016</a:t>
             </a:r>
             <a:endParaRPr lang="en-US"/>
           </a:p>
@@ -6019,9 +6103,9 @@
           <a:bodyPr/>
           <a:lstStyle/>
           <a:p>
-            <a:fld id="{7AFECA71-3B94-204E-9E81-397C63D22F4A}" type="datetime1">
-              <a:rPr lang="en-US" smtClean="0"/>
-              <a:t>10/17/16</a:t>
+            <a:fld id="{9C8F15D9-B0F4-7649-86A2-D42B02B8D8E3}" type="datetime1">
+              <a:rPr lang="en-US" smtClean="0"/>
+              <a:t>10/18/16</a:t>
             </a:fld>
             <a:endParaRPr lang="en-US"/>
           </a:p>
@@ -6044,7 +6128,7 @@
           <a:p>
             <a:r>
               <a:rPr lang="sk-SK" smtClean="0"/>
-              <a:t>© 2016 EV3Lessons.com, Last Edit 10/17/2016</a:t>
+              <a:t>© 2016 EV3Lessons.com, Last Edit 10/18/2016</a:t>
             </a:r>
             <a:endParaRPr lang="en-US"/>
           </a:p>
@@ -6255,9 +6339,9 @@
           <a:bodyPr/>
           <a:lstStyle/>
           <a:p>
-            <a:fld id="{F172A5CF-E17B-F343-BE28-B26C3ED7F09D}" type="datetime1">
-              <a:rPr lang="en-US" smtClean="0"/>
-              <a:t>10/17/16</a:t>
+            <a:fld id="{10EE3CA3-6BD8-C64B-AFAA-8C863F458724}" type="datetime1">
+              <a:rPr lang="en-US" smtClean="0"/>
+              <a:t>10/18/16</a:t>
             </a:fld>
             <a:endParaRPr lang="en-US"/>
           </a:p>
@@ -6280,7 +6364,7 @@
           <a:p>
             <a:r>
               <a:rPr lang="sk-SK" smtClean="0"/>
-              <a:t>© 2016 EV3Lessons.com, Last Edit 10/17/2016</a:t>
+              <a:t>© 2016 EV3Lessons.com, Last Edit 10/18/2016</a:t>
             </a:r>
             <a:endParaRPr lang="en-US"/>
           </a:p>
@@ -6626,9 +6710,9 @@
           <a:bodyPr/>
           <a:lstStyle/>
           <a:p>
-            <a:fld id="{4D2BBE24-E8C6-BA45-BD8A-A3F287048616}" type="datetime1">
-              <a:rPr lang="en-US" smtClean="0"/>
-              <a:t>10/17/16</a:t>
+            <a:fld id="{3F7BD0D3-610B-2B4A-938D-05A7896D30DF}" type="datetime1">
+              <a:rPr lang="en-US" smtClean="0"/>
+              <a:t>10/18/16</a:t>
             </a:fld>
             <a:endParaRPr lang="en-US"/>
           </a:p>
@@ -6651,7 +6735,7 @@
           <a:p>
             <a:r>
               <a:rPr lang="sk-SK" smtClean="0"/>
-              <a:t>© 2016 EV3Lessons.com, Last Edit 10/17/2016</a:t>
+              <a:t>© 2016 EV3Lessons.com, Last Edit 10/18/2016</a:t>
             </a:r>
             <a:endParaRPr lang="en-US"/>
           </a:p>
@@ -6748,9 +6832,9 @@
           <a:bodyPr/>
           <a:lstStyle/>
           <a:p>
-            <a:fld id="{731D9E20-389B-4F4C-B35E-6066D9F688A8}" type="datetime1">
-              <a:rPr lang="en-US" smtClean="0"/>
-              <a:t>10/17/16</a:t>
+            <a:fld id="{7A11C149-D740-E344-8CCB-A12884967E04}" type="datetime1">
+              <a:rPr lang="en-US" smtClean="0"/>
+              <a:t>10/18/16</a:t>
             </a:fld>
             <a:endParaRPr lang="en-US"/>
           </a:p>
@@ -6773,7 +6857,7 @@
           <a:p>
             <a:r>
               <a:rPr lang="sk-SK" smtClean="0"/>
-              <a:t>© 2016 EV3Lessons.com, Last Edit 10/17/2016</a:t>
+              <a:t>© 2016 EV3Lessons.com, Last Edit 10/18/2016</a:t>
             </a:r>
             <a:endParaRPr lang="en-US"/>
           </a:p>
@@ -6847,9 +6931,9 @@
           <a:bodyPr/>
           <a:lstStyle/>
           <a:p>
-            <a:fld id="{C49CD544-A548-D948-A126-247577ABCEF7}" type="datetime1">
-              <a:rPr lang="en-US" smtClean="0"/>
-              <a:t>10/17/16</a:t>
+            <a:fld id="{2375A2B2-8B5E-6645-AD63-3130E483748F}" type="datetime1">
+              <a:rPr lang="en-US" smtClean="0"/>
+              <a:t>10/18/16</a:t>
             </a:fld>
             <a:endParaRPr lang="en-US"/>
           </a:p>
@@ -6872,7 +6956,7 @@
           <a:p>
             <a:r>
               <a:rPr lang="sk-SK" smtClean="0"/>
-              <a:t>© 2016 EV3Lessons.com, Last Edit 10/17/2016</a:t>
+              <a:t>© 2016 EV3Lessons.com, Last Edit 10/18/2016</a:t>
             </a:r>
             <a:endParaRPr lang="en-US"/>
           </a:p>
@@ -7105,9 +7189,9 @@
           <a:bodyPr/>
           <a:lstStyle/>
           <a:p>
-            <a:fld id="{DFE4699E-8BF3-4A42-BBAE-BCAE511B7C45}" type="datetime1">
-              <a:rPr lang="en-US" smtClean="0"/>
-              <a:t>10/17/16</a:t>
+            <a:fld id="{0F101BC8-CCA2-834F-95E9-84E71FD7B50D}" type="datetime1">
+              <a:rPr lang="en-US" smtClean="0"/>
+              <a:t>10/18/16</a:t>
             </a:fld>
             <a:endParaRPr lang="en-US"/>
           </a:p>
@@ -7153,7 +7237,7 @@
           <a:p>
             <a:r>
               <a:rPr lang="sk-SK" smtClean="0"/>
-              <a:t>© 2016 EV3Lessons.com, Last Edit 10/17/2016</a:t>
+              <a:t>© 2016 EV3Lessons.com, Last Edit 10/18/2016</a:t>
             </a:r>
             <a:endParaRPr lang="en-US"/>
           </a:p>
@@ -7386,9 +7470,9 @@
           <a:bodyPr/>
           <a:lstStyle/>
           <a:p>
-            <a:fld id="{F7CCC46A-6D8C-6D4D-B721-3D201AD5EA86}" type="datetime1">
-              <a:rPr lang="en-US" smtClean="0"/>
-              <a:t>10/17/16</a:t>
+            <a:fld id="{09721406-ED4F-8B45-A549-188C9603D847}" type="datetime1">
+              <a:rPr lang="en-US" smtClean="0"/>
+              <a:t>10/18/16</a:t>
             </a:fld>
             <a:endParaRPr lang="en-US"/>
           </a:p>
@@ -7411,7 +7495,7 @@
           <a:p>
             <a:r>
               <a:rPr lang="sk-SK" smtClean="0"/>
-              <a:t>© 2016 EV3Lessons.com, Last Edit 10/17/2016</a:t>
+              <a:t>© 2016 EV3Lessons.com, Last Edit 10/18/2016</a:t>
             </a:r>
             <a:endParaRPr lang="en-US"/>
           </a:p>
@@ -7647,9 +7731,9 @@
           <a:bodyPr/>
           <a:lstStyle/>
           <a:p>
-            <a:fld id="{5871075C-2929-B140-A434-455333C82D2B}" type="datetime1">
-              <a:rPr lang="en-US" smtClean="0"/>
-              <a:t>10/17/16</a:t>
+            <a:fld id="{DE1057CE-45C3-AC4E-8338-FE58356B1CB1}" type="datetime1">
+              <a:rPr lang="en-US" smtClean="0"/>
+              <a:t>10/18/16</a:t>
             </a:fld>
             <a:endParaRPr lang="en-US"/>
           </a:p>
@@ -7672,7 +7756,7 @@
           <a:p>
             <a:r>
               <a:rPr lang="sk-SK" smtClean="0"/>
-              <a:t>© 2016 EV3Lessons.com, Last Edit 10/17/2016</a:t>
+              <a:t>© 2016 EV3Lessons.com, Last Edit 10/18/2016</a:t>
             </a:r>
             <a:endParaRPr lang="en-US"/>
           </a:p>
@@ -7821,9 +7905,9 @@
           <a:bodyPr/>
           <a:lstStyle/>
           <a:p>
-            <a:fld id="{9D82A136-69D2-5B40-B8D9-5F3739EABB04}" type="datetime1">
-              <a:rPr lang="en-US" smtClean="0"/>
-              <a:t>10/17/16</a:t>
+            <a:fld id="{2F2E95A7-3A28-EC4D-B92E-95BF27C175C3}" type="datetime1">
+              <a:rPr lang="en-US" smtClean="0"/>
+              <a:t>10/18/16</a:t>
             </a:fld>
             <a:endParaRPr lang="en-US"/>
           </a:p>
@@ -7846,7 +7930,7 @@
           <a:p>
             <a:r>
               <a:rPr lang="sk-SK" smtClean="0"/>
-              <a:t>© 2016 EV3Lessons.com, Last Edit 10/17/2016</a:t>
+              <a:t>© 2016 EV3Lessons.com, Last Edit 10/18/2016</a:t>
             </a:r>
             <a:endParaRPr lang="en-US"/>
           </a:p>
@@ -8005,9 +8089,9 @@
           <a:bodyPr/>
           <a:lstStyle/>
           <a:p>
-            <a:fld id="{D4899152-0EBB-8045-81E5-E125A514ECC9}" type="datetime1">
-              <a:rPr lang="en-US" smtClean="0"/>
-              <a:t>10/17/16</a:t>
+            <a:fld id="{0B9C296B-50A0-1C4D-A904-842C5215E8D6}" type="datetime1">
+              <a:rPr lang="en-US" smtClean="0"/>
+              <a:t>10/18/16</a:t>
             </a:fld>
             <a:endParaRPr lang="en-US"/>
           </a:p>
@@ -8030,7 +8114,7 @@
           <a:p>
             <a:r>
               <a:rPr lang="sk-SK" smtClean="0"/>
-              <a:t>© 2016 EV3Lessons.com, Last Edit 10/17/2016</a:t>
+              <a:t>© 2016 EV3Lessons.com, Last Edit 10/18/2016</a:t>
             </a:r>
             <a:endParaRPr lang="en-US"/>
           </a:p>
@@ -8263,9 +8347,9 @@
           <a:bodyPr/>
           <a:lstStyle/>
           <a:p>
-            <a:fld id="{134A76FB-5A60-6040-8B65-6DB79CA47E5D}" type="datetime1">
-              <a:rPr lang="en-US" smtClean="0"/>
-              <a:t>10/17/16</a:t>
+            <a:fld id="{6B1A836D-86EC-F749-99CE-265C2FAB305D}" type="datetime1">
+              <a:rPr lang="en-US" smtClean="0"/>
+              <a:t>10/18/16</a:t>
             </a:fld>
             <a:endParaRPr lang="en-US"/>
           </a:p>
@@ -8288,7 +8372,7 @@
           <a:p>
             <a:r>
               <a:rPr lang="sk-SK" smtClean="0"/>
-              <a:t>© 2016 EV3Lessons.com, Last Edit 10/17/2016</a:t>
+              <a:t>© 2016 EV3Lessons.com, Last Edit 10/18/2016</a:t>
             </a:r>
             <a:endParaRPr lang="en-US"/>
           </a:p>
@@ -9289,9 +9373,9 @@
           <a:bodyPr/>
           <a:lstStyle/>
           <a:p>
-            <a:fld id="{BA1C0731-7FEE-8A44-A644-D50707B0111D}" type="datetime1">
-              <a:rPr lang="en-US" smtClean="0"/>
-              <a:t>10/17/16</a:t>
+            <a:fld id="{BA476F7A-9E18-9E41-BD0F-996FD9C705A8}" type="datetime1">
+              <a:rPr lang="en-US" smtClean="0"/>
+              <a:t>10/18/16</a:t>
             </a:fld>
             <a:endParaRPr lang="en-US"/>
           </a:p>
@@ -9314,7 +9398,7 @@
           <a:p>
             <a:r>
               <a:rPr lang="sk-SK" smtClean="0"/>
-              <a:t>© 2016 EV3Lessons.com, Last Edit 10/17/2016</a:t>
+              <a:t>© 2016 EV3Lessons.com, Last Edit 10/18/2016</a:t>
             </a:r>
             <a:endParaRPr lang="en-US"/>
           </a:p>
@@ -9552,9 +9636,9 @@
           <a:bodyPr/>
           <a:lstStyle/>
           <a:p>
-            <a:fld id="{7E1A7D81-1937-A04F-9986-7B8ED04B0223}" type="datetime1">
-              <a:rPr lang="en-US" smtClean="0"/>
-              <a:t>10/17/16</a:t>
+            <a:fld id="{EDE26A61-5577-6D46-9A0B-ED29078B60B2}" type="datetime1">
+              <a:rPr lang="en-US" smtClean="0"/>
+              <a:t>10/18/16</a:t>
             </a:fld>
             <a:endParaRPr lang="en-US"/>
           </a:p>
@@ -9600,7 +9684,7 @@
           <a:p>
             <a:r>
               <a:rPr lang="sk-SK" smtClean="0"/>
-              <a:t>© 2016 EV3Lessons.com, Last Edit 10/17/2016</a:t>
+              <a:t>© 2016 EV3Lessons.com, Last Edit 10/18/2016</a:t>
             </a:r>
             <a:endParaRPr lang="en-US"/>
           </a:p>
@@ -9849,9 +9933,9 @@
           <a:bodyPr/>
           <a:lstStyle/>
           <a:p>
-            <a:fld id="{7539308E-6AFF-674E-ADD5-FC94B7FF10E4}" type="datetime1">
-              <a:rPr lang="en-US" smtClean="0"/>
-              <a:t>10/17/16</a:t>
+            <a:fld id="{F2CEFA95-14EF-2B46-8634-0B274DB37B93}" type="datetime1">
+              <a:rPr lang="en-US" smtClean="0"/>
+              <a:t>10/18/16</a:t>
             </a:fld>
             <a:endParaRPr lang="en-US"/>
           </a:p>
@@ -9874,7 +9958,7 @@
           <a:p>
             <a:r>
               <a:rPr lang="sk-SK" smtClean="0"/>
-              <a:t>© 2016 EV3Lessons.com, Last Edit 10/17/2016</a:t>
+              <a:t>© 2016 EV3Lessons.com, Last Edit 10/18/2016</a:t>
             </a:r>
             <a:endParaRPr lang="en-US"/>
           </a:p>
@@ -10297,9 +10381,9 @@
           <a:bodyPr/>
           <a:lstStyle/>
           <a:p>
-            <a:fld id="{0CCCA5AA-81C1-B948-BB04-52D2BAA7A7EE}" type="datetime1">
-              <a:rPr lang="en-US" smtClean="0"/>
-              <a:t>10/17/16</a:t>
+            <a:fld id="{8C570174-6825-7D42-B1F1-C6720C7583AD}" type="datetime1">
+              <a:rPr lang="en-US" smtClean="0"/>
+              <a:t>10/18/16</a:t>
             </a:fld>
             <a:endParaRPr lang="en-US"/>
           </a:p>
@@ -10322,7 +10406,7 @@
           <a:p>
             <a:r>
               <a:rPr lang="sk-SK" smtClean="0"/>
-              <a:t>© 2016 EV3Lessons.com, Last Edit 10/17/2016</a:t>
+              <a:t>© 2016 EV3Lessons.com, Last Edit 10/18/2016</a:t>
             </a:r>
             <a:endParaRPr lang="en-US"/>
           </a:p>
@@ -10419,9 +10503,9 @@
           <a:bodyPr/>
           <a:lstStyle/>
           <a:p>
-            <a:fld id="{CBFF9EE3-B11D-BA49-8755-4A21E537AE81}" type="datetime1">
-              <a:rPr lang="en-US" smtClean="0"/>
-              <a:t>10/17/16</a:t>
+            <a:fld id="{B1DA150C-2FAF-7549-B604-83F2E9B0E940}" type="datetime1">
+              <a:rPr lang="en-US" smtClean="0"/>
+              <a:t>10/18/16</a:t>
             </a:fld>
             <a:endParaRPr lang="en-US"/>
           </a:p>
@@ -10444,7 +10528,7 @@
           <a:p>
             <a:r>
               <a:rPr lang="sk-SK" smtClean="0"/>
-              <a:t>© 2016 EV3Lessons.com, Last Edit 10/17/2016</a:t>
+              <a:t>© 2016 EV3Lessons.com, Last Edit 10/18/2016</a:t>
             </a:r>
             <a:endParaRPr lang="en-US"/>
           </a:p>
@@ -10716,9 +10800,9 @@
           <a:bodyPr/>
           <a:lstStyle/>
           <a:p>
-            <a:fld id="{503448F0-9B1A-A347-B2BA-FCC922561B0C}" type="datetime1">
-              <a:rPr lang="en-US" smtClean="0"/>
-              <a:t>10/17/16</a:t>
+            <a:fld id="{1749DB44-8835-0F42-8105-27B8F3FCA8AA}" type="datetime1">
+              <a:rPr lang="en-US" smtClean="0"/>
+              <a:t>10/18/16</a:t>
             </a:fld>
             <a:endParaRPr lang="en-US"/>
           </a:p>
@@ -10741,7 +10825,7 @@
           <a:p>
             <a:r>
               <a:rPr lang="sk-SK" smtClean="0"/>
-              <a:t>© 2016 EV3Lessons.com, Last Edit 10/17/2016</a:t>
+              <a:t>© 2016 EV3Lessons.com, Last Edit 10/18/2016</a:t>
             </a:r>
             <a:endParaRPr lang="en-US"/>
           </a:p>
@@ -10815,9 +10899,9 @@
           <a:bodyPr/>
           <a:lstStyle/>
           <a:p>
-            <a:fld id="{A00AB155-6275-1D43-9B89-BDFA55A27CCE}" type="datetime1">
-              <a:rPr lang="en-US" smtClean="0"/>
-              <a:t>10/17/16</a:t>
+            <a:fld id="{33E126EC-E139-1E43-B8AB-E007346D3A74}" type="datetime1">
+              <a:rPr lang="en-US" smtClean="0"/>
+              <a:t>10/18/16</a:t>
             </a:fld>
             <a:endParaRPr lang="en-US"/>
           </a:p>
@@ -10840,7 +10924,7 @@
           <a:p>
             <a:r>
               <a:rPr lang="sk-SK" smtClean="0"/>
-              <a:t>© 2016 EV3Lessons.com, Last Edit 10/17/2016</a:t>
+              <a:t>© 2016 EV3Lessons.com, Last Edit 10/18/2016</a:t>
             </a:r>
             <a:endParaRPr lang="en-US"/>
           </a:p>
@@ -11066,9 +11150,9 @@
           <a:bodyPr/>
           <a:lstStyle/>
           <a:p>
-            <a:fld id="{256CB14A-6F32-394E-8940-F4FC77BB6F2C}" type="datetime1">
-              <a:rPr lang="en-US" smtClean="0"/>
-              <a:t>10/17/16</a:t>
+            <a:fld id="{C565D44A-3C7A-0B49-ADBA-25B60852B9A8}" type="datetime1">
+              <a:rPr lang="en-US" smtClean="0"/>
+              <a:t>10/18/16</a:t>
             </a:fld>
             <a:endParaRPr lang="en-US"/>
           </a:p>
@@ -11091,7 +11175,7 @@
           <a:p>
             <a:r>
               <a:rPr lang="sk-SK" smtClean="0"/>
-              <a:t>© 2016 EV3Lessons.com, Last Edit 10/17/2016</a:t>
+              <a:t>© 2016 EV3Lessons.com, Last Edit 10/18/2016</a:t>
             </a:r>
             <a:endParaRPr lang="en-US"/>
           </a:p>
@@ -11369,9 +11453,9 @@
           <a:bodyPr/>
           <a:lstStyle/>
           <a:p>
-            <a:fld id="{E37B5E0C-EA16-9E4F-9B16-3697AB80EA26}" type="datetime1">
-              <a:rPr lang="en-US" smtClean="0"/>
-              <a:t>10/17/16</a:t>
+            <a:fld id="{3CBF90F0-D749-3745-AC04-1A8BBB10A221}" type="datetime1">
+              <a:rPr lang="en-US" smtClean="0"/>
+              <a:t>10/18/16</a:t>
             </a:fld>
             <a:endParaRPr lang="en-US"/>
           </a:p>
@@ -11394,7 +11478,7 @@
           <a:p>
             <a:r>
               <a:rPr lang="sk-SK" smtClean="0"/>
-              <a:t>© 2016 EV3Lessons.com, Last Edit 10/17/2016</a:t>
+              <a:t>© 2016 EV3Lessons.com, Last Edit 10/18/2016</a:t>
             </a:r>
             <a:endParaRPr lang="en-US"/>
           </a:p>
@@ -11631,9 +11715,9 @@
           <a:bodyPr/>
           <a:lstStyle/>
           <a:p>
-            <a:fld id="{1A1B24FE-2160-FF45-BB10-7E0C813454A9}" type="datetime1">
-              <a:rPr lang="en-US" smtClean="0"/>
-              <a:t>10/17/16</a:t>
+            <a:fld id="{98B33AA4-3A31-8340-9A32-8797386CA51F}" type="datetime1">
+              <a:rPr lang="en-US" smtClean="0"/>
+              <a:t>10/18/16</a:t>
             </a:fld>
             <a:endParaRPr lang="en-US"/>
           </a:p>
@@ -11656,7 +11740,7 @@
           <a:p>
             <a:r>
               <a:rPr lang="sk-SK" smtClean="0"/>
-              <a:t>© 2016 EV3Lessons.com, Last Edit 10/17/2016</a:t>
+              <a:t>© 2016 EV3Lessons.com, Last Edit 10/18/2016</a:t>
             </a:r>
             <a:endParaRPr lang="en-US"/>
           </a:p>
@@ -11815,9 +11899,9 @@
           <a:bodyPr/>
           <a:lstStyle/>
           <a:p>
-            <a:fld id="{C5E218E5-4E69-C34E-B393-0487B98E2162}" type="datetime1">
-              <a:rPr lang="en-US" smtClean="0"/>
-              <a:t>10/17/16</a:t>
+            <a:fld id="{3A18DB40-93EE-F246-A801-A3DDE29B59F8}" type="datetime1">
+              <a:rPr lang="en-US" smtClean="0"/>
+              <a:t>10/18/16</a:t>
             </a:fld>
             <a:endParaRPr lang="en-US"/>
           </a:p>
@@ -11840,7 +11924,7 @@
           <a:p>
             <a:r>
               <a:rPr lang="sk-SK" smtClean="0"/>
-              <a:t>© 2016 EV3Lessons.com, Last Edit 10/17/2016</a:t>
+              <a:t>© 2016 EV3Lessons.com, Last Edit 10/18/2016</a:t>
             </a:r>
             <a:endParaRPr lang="en-US"/>
           </a:p>
@@ -12032,9 +12116,9 @@
           <a:bodyPr/>
           <a:lstStyle/>
           <a:p>
-            <a:fld id="{0F6207A8-57AD-FC49-A9BB-11F46E59CC76}" type="datetime1">
-              <a:rPr lang="en-US" smtClean="0"/>
-              <a:t>10/17/16</a:t>
+            <a:fld id="{6A46F6FA-972C-A546-883E-E3633EC1BE4F}" type="datetime1">
+              <a:rPr lang="en-US" smtClean="0"/>
+              <a:t>10/18/16</a:t>
             </a:fld>
             <a:endParaRPr lang="en-US"/>
           </a:p>
@@ -12062,7 +12146,7 @@
           <a:p>
             <a:r>
               <a:rPr lang="sk-SK" smtClean="0"/>
-              <a:t>© 2016 EV3Lessons.com, Last Edit 10/17/2016</a:t>
+              <a:t>© 2016 EV3Lessons.com, Last Edit 10/18/2016</a:t>
             </a:r>
             <a:endParaRPr lang="en-US"/>
           </a:p>
@@ -12253,7 +12337,7 @@
           <a:noFill/>
           <a:extLst>
             <a:ext uri="{909E8E84-426E-40dd-AFC4-6F175D3DCCD1}">
-              <a14:hiddenFill xmlns="" xmlns:a14="http://schemas.microsoft.com/office/drawing/2010/main">
+              <a14:hiddenFill xmlns:a14="http://schemas.microsoft.com/office/drawing/2010/main" xmlns="">
                 <a:solidFill>
                   <a:srgbClr val="FFFFFF"/>
                 </a:solidFill>
@@ -13303,9 +13387,9 @@
           <a:bodyPr/>
           <a:lstStyle/>
           <a:p>
-            <a:fld id="{14DB2D34-5AE2-A945-B223-B76432DCCD6C}" type="datetime1">
-              <a:rPr lang="en-US" smtClean="0"/>
-              <a:t>10/17/16</a:t>
+            <a:fld id="{2DE07CE9-894B-A841-8CD8-261ACF046BC4}" type="datetime1">
+              <a:rPr lang="en-US" smtClean="0"/>
+              <a:t>10/18/16</a:t>
             </a:fld>
             <a:endParaRPr lang="en-US"/>
           </a:p>
@@ -13328,7 +13412,7 @@
           <a:p>
             <a:r>
               <a:rPr lang="sk-SK" smtClean="0"/>
-              <a:t>© 2016 EV3Lessons.com, Last Edit 10/17/2016</a:t>
+              <a:t>© 2016 EV3Lessons.com, Last Edit 10/18/2016</a:t>
             </a:r>
             <a:endParaRPr lang="en-US"/>
           </a:p>
@@ -13576,9 +13660,9 @@
           <a:bodyPr/>
           <a:lstStyle/>
           <a:p>
-            <a:fld id="{BE1B7EF9-D017-9643-A9A8-A8FBE28C7D61}" type="datetime1">
-              <a:rPr lang="en-US" smtClean="0"/>
-              <a:t>10/17/16</a:t>
+            <a:fld id="{A3E3579A-DDAE-4E43-B969-A7DFBA90DC0C}" type="datetime1">
+              <a:rPr lang="en-US" smtClean="0"/>
+              <a:t>10/18/16</a:t>
             </a:fld>
             <a:endParaRPr lang="en-US"/>
           </a:p>
@@ -13632,7 +13716,7 @@
           <a:p>
             <a:r>
               <a:rPr lang="sk-SK" smtClean="0"/>
-              <a:t>© 2016 EV3Lessons.com, Last Edit 10/17/2016</a:t>
+              <a:t>© 2016 EV3Lessons.com, Last Edit 10/18/2016</a:t>
             </a:r>
             <a:endParaRPr lang="en-US"/>
           </a:p>
@@ -13881,9 +13965,9 @@
           <a:bodyPr/>
           <a:lstStyle/>
           <a:p>
-            <a:fld id="{B669B042-AEBF-0841-8080-EA33619C55C5}" type="datetime1">
-              <a:rPr lang="en-US" smtClean="0"/>
-              <a:t>10/17/16</a:t>
+            <a:fld id="{7F976FBE-C4A5-EA44-8352-9CCF845C7A6C}" type="datetime1">
+              <a:rPr lang="en-US" smtClean="0"/>
+              <a:t>10/18/16</a:t>
             </a:fld>
             <a:endParaRPr lang="en-US"/>
           </a:p>
@@ -13906,7 +13990,7 @@
           <a:p>
             <a:r>
               <a:rPr lang="sk-SK" smtClean="0"/>
-              <a:t>© 2016 EV3Lessons.com, Last Edit 10/17/2016</a:t>
+              <a:t>© 2016 EV3Lessons.com, Last Edit 10/18/2016</a:t>
             </a:r>
             <a:endParaRPr lang="en-US"/>
           </a:p>
@@ -14344,9 +14428,9 @@
           <a:bodyPr/>
           <a:lstStyle/>
           <a:p>
-            <a:fld id="{C57AFD41-077D-B44F-B0B4-1D53A679E262}" type="datetime1">
-              <a:rPr lang="en-US" smtClean="0"/>
-              <a:t>10/17/16</a:t>
+            <a:fld id="{5BA189DE-22B8-0845-9EC7-37D91619305F}" type="datetime1">
+              <a:rPr lang="en-US" smtClean="0"/>
+              <a:t>10/18/16</a:t>
             </a:fld>
             <a:endParaRPr lang="en-US"/>
           </a:p>
@@ -14369,7 +14453,7 @@
           <a:p>
             <a:r>
               <a:rPr lang="sk-SK" smtClean="0"/>
-              <a:t>© 2016 EV3Lessons.com, Last Edit 10/17/2016</a:t>
+              <a:t>© 2016 EV3Lessons.com, Last Edit 10/18/2016</a:t>
             </a:r>
             <a:endParaRPr lang="en-US"/>
           </a:p>
@@ -14807,9 +14891,9 @@
           <a:bodyPr/>
           <a:lstStyle/>
           <a:p>
-            <a:fld id="{65CAB33D-5B07-CF45-A238-F76E5FB400FE}" type="datetime1">
-              <a:rPr lang="en-US" smtClean="0"/>
-              <a:t>10/17/16</a:t>
+            <a:fld id="{C5AB3096-8F88-C84A-BBDF-1411467E2325}" type="datetime1">
+              <a:rPr lang="en-US" smtClean="0"/>
+              <a:t>10/18/16</a:t>
             </a:fld>
             <a:endParaRPr lang="en-US"/>
           </a:p>
@@ -14832,7 +14916,7 @@
           <a:p>
             <a:r>
               <a:rPr lang="sk-SK" smtClean="0"/>
-              <a:t>© 2016 EV3Lessons.com, Last Edit 10/17/2016</a:t>
+              <a:t>© 2016 EV3Lessons.com, Last Edit 10/18/2016</a:t>
             </a:r>
             <a:endParaRPr lang="en-US"/>
           </a:p>
@@ -14929,9 +15013,9 @@
           <a:bodyPr/>
           <a:lstStyle/>
           <a:p>
-            <a:fld id="{A2BD947B-B4D6-C647-8A9E-238A59517638}" type="datetime1">
-              <a:rPr lang="en-US" smtClean="0"/>
-              <a:t>10/17/16</a:t>
+            <a:fld id="{EBE1EDB1-F22B-6D4C-9FD2-DF6A6E6FDA46}" type="datetime1">
+              <a:rPr lang="en-US" smtClean="0"/>
+              <a:t>10/18/16</a:t>
             </a:fld>
             <a:endParaRPr lang="en-US"/>
           </a:p>
@@ -14954,7 +15038,7 @@
           <a:p>
             <a:r>
               <a:rPr lang="sk-SK" smtClean="0"/>
-              <a:t>© 2016 EV3Lessons.com, Last Edit 10/17/2016</a:t>
+              <a:t>© 2016 EV3Lessons.com, Last Edit 10/18/2016</a:t>
             </a:r>
             <a:endParaRPr lang="en-US"/>
           </a:p>
@@ -15043,9 +15127,9 @@
           <a:bodyPr/>
           <a:lstStyle/>
           <a:p>
-            <a:fld id="{6917A7D9-F882-B144-A829-B18201EF8395}" type="datetime1">
-              <a:rPr lang="en-US" smtClean="0"/>
-              <a:t>10/17/16</a:t>
+            <a:fld id="{E74EC89C-EC5A-ED49-9606-7F9DA7E955CA}" type="datetime1">
+              <a:rPr lang="en-US" smtClean="0"/>
+              <a:t>10/18/16</a:t>
             </a:fld>
             <a:endParaRPr lang="en-US"/>
           </a:p>
@@ -15068,7 +15152,7 @@
           <a:p>
             <a:r>
               <a:rPr lang="sk-SK" smtClean="0"/>
-              <a:t>© 2016 EV3Lessons.com, Last Edit 10/17/2016</a:t>
+              <a:t>© 2016 EV3Lessons.com, Last Edit 10/18/2016</a:t>
             </a:r>
             <a:endParaRPr lang="en-US"/>
           </a:p>
@@ -15302,9 +15386,9 @@
           <a:bodyPr/>
           <a:lstStyle/>
           <a:p>
-            <a:fld id="{6B039781-A5DD-AB41-946B-2522F10FBEE3}" type="datetime1">
-              <a:rPr lang="en-US" smtClean="0"/>
-              <a:t>10/17/16</a:t>
+            <a:fld id="{7B8E4C0E-CEA1-1942-80EB-DF0F37F65261}" type="datetime1">
+              <a:rPr lang="en-US" smtClean="0"/>
+              <a:t>10/18/16</a:t>
             </a:fld>
             <a:endParaRPr lang="en-US"/>
           </a:p>
@@ -15327,7 +15411,7 @@
           <a:p>
             <a:r>
               <a:rPr lang="sk-SK" smtClean="0"/>
-              <a:t>© 2016 EV3Lessons.com, Last Edit 10/17/2016</a:t>
+              <a:t>© 2016 EV3Lessons.com, Last Edit 10/18/2016</a:t>
             </a:r>
             <a:endParaRPr lang="en-US"/>
           </a:p>
@@ -15613,9 +15697,9 @@
           <a:bodyPr/>
           <a:lstStyle/>
           <a:p>
-            <a:fld id="{92FB4532-3C48-B54F-B89D-DBDB9FC5891C}" type="datetime1">
-              <a:rPr lang="en-US" smtClean="0"/>
-              <a:t>10/17/16</a:t>
+            <a:fld id="{C9050912-F988-004A-A54C-6618D6B1FA18}" type="datetime1">
+              <a:rPr lang="en-US" smtClean="0"/>
+              <a:t>10/18/16</a:t>
             </a:fld>
             <a:endParaRPr lang="en-US"/>
           </a:p>
@@ -15638,7 +15722,7 @@
           <a:p>
             <a:r>
               <a:rPr lang="sk-SK" smtClean="0"/>
-              <a:t>© 2016 EV3Lessons.com, Last Edit 10/17/2016</a:t>
+              <a:t>© 2016 EV3Lessons.com, Last Edit 10/18/2016</a:t>
             </a:r>
             <a:endParaRPr lang="en-US"/>
           </a:p>
@@ -15883,9 +15967,9 @@
           <a:bodyPr/>
           <a:lstStyle/>
           <a:p>
-            <a:fld id="{64100668-ED25-BF41-B1E8-5A9B52465564}" type="datetime1">
-              <a:rPr lang="en-US" smtClean="0"/>
-              <a:t>10/17/16</a:t>
+            <a:fld id="{081803CC-74C6-7C4F-AD8D-A81442763901}" type="datetime1">
+              <a:rPr lang="en-US" smtClean="0"/>
+              <a:t>10/18/16</a:t>
             </a:fld>
             <a:endParaRPr lang="en-US"/>
           </a:p>
@@ -15908,7 +15992,7 @@
           <a:p>
             <a:r>
               <a:rPr lang="sk-SK" smtClean="0"/>
-              <a:t>© 2016 EV3Lessons.com, Last Edit 10/17/2016</a:t>
+              <a:t>© 2016 EV3Lessons.com, Last Edit 10/18/2016</a:t>
             </a:r>
             <a:endParaRPr lang="en-US"/>
           </a:p>
@@ -16075,9 +16159,9 @@
           <a:bodyPr/>
           <a:lstStyle/>
           <a:p>
-            <a:fld id="{2A7CF752-12F6-9649-B966-356B5704F786}" type="datetime1">
-              <a:rPr lang="en-US" smtClean="0"/>
-              <a:t>10/17/16</a:t>
+            <a:fld id="{31969BF2-C5E7-1D46-AEE3-8CDD643160C2}" type="datetime1">
+              <a:rPr lang="en-US" smtClean="0"/>
+              <a:t>10/18/16</a:t>
             </a:fld>
             <a:endParaRPr lang="en-US"/>
           </a:p>
@@ -16100,7 +16184,7 @@
           <a:p>
             <a:r>
               <a:rPr lang="sk-SK" smtClean="0"/>
-              <a:t>© 2016 EV3Lessons.com, Last Edit 10/17/2016</a:t>
+              <a:t>© 2016 EV3Lessons.com, Last Edit 10/18/2016</a:t>
             </a:r>
             <a:endParaRPr lang="en-US"/>
           </a:p>
@@ -16279,9 +16363,9 @@
           <a:bodyPr/>
           <a:lstStyle/>
           <a:p>
-            <a:fld id="{43C6B792-3A21-B841-8C50-27B3DCF59E1C}" type="datetime1">
-              <a:rPr lang="en-US" smtClean="0"/>
-              <a:t>10/17/16</a:t>
+            <a:fld id="{42BA678B-8C2E-1540-9586-B8EA848F7C14}" type="datetime1">
+              <a:rPr lang="en-US" smtClean="0"/>
+              <a:t>10/18/16</a:t>
             </a:fld>
             <a:endParaRPr lang="en-US"/>
           </a:p>
@@ -16304,7 +16388,7 @@
           <a:p>
             <a:r>
               <a:rPr lang="sk-SK" smtClean="0"/>
-              <a:t>© 2016 EV3Lessons.com, Last Edit 10/17/2016</a:t>
+              <a:t>© 2016 EV3Lessons.com, Last Edit 10/18/2016</a:t>
             </a:r>
             <a:endParaRPr lang="en-US"/>
           </a:p>
@@ -16453,9 +16537,9 @@
           <a:bodyPr/>
           <a:lstStyle/>
           <a:p>
-            <a:fld id="{4967B33F-7C8B-204E-A3AB-9F54511F1246}" type="datetime1">
-              <a:rPr lang="en-US" smtClean="0"/>
-              <a:t>10/17/16</a:t>
+            <a:fld id="{256FDA91-EF65-B245-BCFB-A220B9C24F65}" type="datetime1">
+              <a:rPr lang="en-US" smtClean="0"/>
+              <a:t>10/18/16</a:t>
             </a:fld>
             <a:endParaRPr lang="en-US"/>
           </a:p>
@@ -16478,7 +16562,7 @@
           <a:p>
             <a:r>
               <a:rPr lang="sk-SK" smtClean="0"/>
-              <a:t>© 2016 EV3Lessons.com, Last Edit 10/17/2016</a:t>
+              <a:t>© 2016 EV3Lessons.com, Last Edit 10/18/2016</a:t>
             </a:r>
             <a:endParaRPr lang="en-US"/>
           </a:p>
@@ -16703,9 +16787,9 @@
           <a:bodyPr/>
           <a:lstStyle/>
           <a:p>
-            <a:fld id="{4FDE9EFE-38FF-BF48-9817-4808EB74CC42}" type="datetime1">
-              <a:rPr lang="en-US" smtClean="0"/>
-              <a:t>10/17/16</a:t>
+            <a:fld id="{F9E038C2-9371-D54B-8ED3-03DA5A06DEC3}" type="datetime1">
+              <a:rPr lang="en-US" smtClean="0"/>
+              <a:t>10/18/16</a:t>
             </a:fld>
             <a:endParaRPr lang="en-US"/>
           </a:p>
@@ -16728,7 +16812,7 @@
           <a:p>
             <a:r>
               <a:rPr lang="sk-SK" smtClean="0"/>
-              <a:t>© 2016 EV3Lessons.com, Last Edit 10/17/2016</a:t>
+              <a:t>© 2016 EV3Lessons.com, Last Edit 10/18/2016</a:t>
             </a:r>
             <a:endParaRPr lang="en-US"/>
           </a:p>
@@ -16939,9 +17023,9 @@
           <a:bodyPr/>
           <a:lstStyle/>
           <a:p>
-            <a:fld id="{849449B4-7B5F-E341-81FE-A8CCE8B57FC6}" type="datetime1">
-              <a:rPr lang="en-US" smtClean="0"/>
-              <a:t>10/17/16</a:t>
+            <a:fld id="{75780184-19FD-474D-9D5A-7E8A6AADB4AB}" type="datetime1">
+              <a:rPr lang="en-US" smtClean="0"/>
+              <a:t>10/18/16</a:t>
             </a:fld>
             <a:endParaRPr lang="en-US"/>
           </a:p>
@@ -16964,7 +17048,7 @@
           <a:p>
             <a:r>
               <a:rPr lang="sk-SK" smtClean="0"/>
-              <a:t>© 2016 EV3Lessons.com, Last Edit 10/17/2016</a:t>
+              <a:t>© 2016 EV3Lessons.com, Last Edit 10/18/2016</a:t>
             </a:r>
             <a:endParaRPr lang="en-US"/>
           </a:p>
@@ -17061,9 +17145,9 @@
           <a:bodyPr/>
           <a:lstStyle/>
           <a:p>
-            <a:fld id="{AC7301EB-036C-9343-93F1-0A0E7BE8342D}" type="datetime1">
-              <a:rPr lang="en-US" smtClean="0"/>
-              <a:t>10/17/16</a:t>
+            <a:fld id="{B58E14B6-273C-5343-9D6F-1AB54B035EDF}" type="datetime1">
+              <a:rPr lang="en-US" smtClean="0"/>
+              <a:t>10/18/16</a:t>
             </a:fld>
             <a:endParaRPr lang="en-US"/>
           </a:p>
@@ -17086,7 +17170,7 @@
           <a:p>
             <a:r>
               <a:rPr lang="sk-SK" smtClean="0"/>
-              <a:t>© 2016 EV3Lessons.com, Last Edit 10/17/2016</a:t>
+              <a:t>© 2016 EV3Lessons.com, Last Edit 10/18/2016</a:t>
             </a:r>
             <a:endParaRPr lang="en-US"/>
           </a:p>
@@ -17432,9 +17516,9 @@
           <a:bodyPr/>
           <a:lstStyle/>
           <a:p>
-            <a:fld id="{B0FFC141-AF8C-9C46-983C-5B7BA9413A58}" type="datetime1">
-              <a:rPr lang="en-US" smtClean="0"/>
-              <a:t>10/17/16</a:t>
+            <a:fld id="{8784F740-69F8-FF4F-AD0A-578F19F76FE4}" type="datetime1">
+              <a:rPr lang="en-US" smtClean="0"/>
+              <a:t>10/18/16</a:t>
             </a:fld>
             <a:endParaRPr lang="en-US"/>
           </a:p>
@@ -17457,7 +17541,7 @@
           <a:p>
             <a:r>
               <a:rPr lang="sk-SK" smtClean="0"/>
-              <a:t>© 2016 EV3Lessons.com, Last Edit 10/17/2016</a:t>
+              <a:t>© 2016 EV3Lessons.com, Last Edit 10/18/2016</a:t>
             </a:r>
             <a:endParaRPr lang="en-US"/>
           </a:p>
@@ -17554,9 +17638,9 @@
           <a:bodyPr/>
           <a:lstStyle/>
           <a:p>
-            <a:fld id="{6EDE24A1-FC8A-E64E-B578-400BFFAA8D1B}" type="datetime1">
-              <a:rPr lang="en-US" smtClean="0"/>
-              <a:t>10/17/16</a:t>
+            <a:fld id="{1C8F529B-D2FD-B84C-81DC-59899FD393DE}" type="datetime1">
+              <a:rPr lang="en-US" smtClean="0"/>
+              <a:t>10/18/16</a:t>
             </a:fld>
             <a:endParaRPr lang="en-US"/>
           </a:p>
@@ -17579,7 +17663,7 @@
           <a:p>
             <a:r>
               <a:rPr lang="sk-SK" smtClean="0"/>
-              <a:t>© 2016 EV3Lessons.com, Last Edit 10/17/2016</a:t>
+              <a:t>© 2016 EV3Lessons.com, Last Edit 10/18/2016</a:t>
             </a:r>
             <a:endParaRPr lang="en-US"/>
           </a:p>
@@ -17653,9 +17737,9 @@
           <a:bodyPr/>
           <a:lstStyle/>
           <a:p>
-            <a:fld id="{EAC27C19-E3A8-6A45-89C0-C9EB6F4A4852}" type="datetime1">
-              <a:rPr lang="en-US" smtClean="0"/>
-              <a:t>10/17/16</a:t>
+            <a:fld id="{CB7656A5-BC9B-9D43-9B5F-2C11DF4D04A4}" type="datetime1">
+              <a:rPr lang="en-US" smtClean="0"/>
+              <a:t>10/18/16</a:t>
             </a:fld>
             <a:endParaRPr lang="en-US"/>
           </a:p>
@@ -17678,7 +17762,7 @@
           <a:p>
             <a:r>
               <a:rPr lang="sk-SK" smtClean="0"/>
-              <a:t>© 2016 EV3Lessons.com, Last Edit 10/17/2016</a:t>
+              <a:t>© 2016 EV3Lessons.com, Last Edit 10/18/2016</a:t>
             </a:r>
             <a:endParaRPr lang="en-US"/>
           </a:p>
@@ -17934,9 +18018,9 @@
           <a:bodyPr/>
           <a:lstStyle/>
           <a:p>
-            <a:fld id="{5A9D4B85-7D0A-D94C-B729-9464FFDF277A}" type="datetime1">
-              <a:rPr lang="en-US" smtClean="0"/>
-              <a:t>10/17/16</a:t>
+            <a:fld id="{E0CA8F05-ECDF-664D-81C1-7E86AC0BB0AE}" type="datetime1">
+              <a:rPr lang="en-US" smtClean="0"/>
+              <a:t>10/18/16</a:t>
             </a:fld>
             <a:endParaRPr lang="en-US"/>
           </a:p>
@@ -17959,7 +18043,7 @@
           <a:p>
             <a:r>
               <a:rPr lang="sk-SK" smtClean="0"/>
-              <a:t>© 2016 EV3Lessons.com, Last Edit 10/17/2016</a:t>
+              <a:t>© 2016 EV3Lessons.com, Last Edit 10/18/2016</a:t>
             </a:r>
             <a:endParaRPr lang="en-US"/>
           </a:p>
@@ -18195,9 +18279,9 @@
           <a:bodyPr/>
           <a:lstStyle/>
           <a:p>
-            <a:fld id="{4681DB27-9CF7-3040-ADF9-7C3D48C14010}" type="datetime1">
-              <a:rPr lang="en-US" smtClean="0"/>
-              <a:t>10/17/16</a:t>
+            <a:fld id="{2DA4D887-9503-674E-BE82-83C56B3BFA62}" type="datetime1">
+              <a:rPr lang="en-US" smtClean="0"/>
+              <a:t>10/18/16</a:t>
             </a:fld>
             <a:endParaRPr lang="en-US"/>
           </a:p>
@@ -18220,7 +18304,7 @@
           <a:p>
             <a:r>
               <a:rPr lang="sk-SK" smtClean="0"/>
-              <a:t>© 2016 EV3Lessons.com, Last Edit 10/17/2016</a:t>
+              <a:t>© 2016 EV3Lessons.com, Last Edit 10/18/2016</a:t>
             </a:r>
             <a:endParaRPr lang="en-US"/>
           </a:p>
@@ -18369,9 +18453,9 @@
           <a:bodyPr/>
           <a:lstStyle/>
           <a:p>
-            <a:fld id="{F34FF91A-24C7-A244-8308-03BCFAF47C29}" type="datetime1">
-              <a:rPr lang="en-US" smtClean="0"/>
-              <a:t>10/17/16</a:t>
+            <a:fld id="{C23F7296-5E2B-2D49-9997-03B2E677912D}" type="datetime1">
+              <a:rPr lang="en-US" smtClean="0"/>
+              <a:t>10/18/16</a:t>
             </a:fld>
             <a:endParaRPr lang="en-US"/>
           </a:p>
@@ -18394,7 +18478,7 @@
           <a:p>
             <a:r>
               <a:rPr lang="sk-SK" smtClean="0"/>
-              <a:t>© 2016 EV3Lessons.com, Last Edit 10/17/2016</a:t>
+              <a:t>© 2016 EV3Lessons.com, Last Edit 10/18/2016</a:t>
             </a:r>
             <a:endParaRPr lang="en-US"/>
           </a:p>
@@ -18553,9 +18637,9 @@
           <a:bodyPr/>
           <a:lstStyle/>
           <a:p>
-            <a:fld id="{624BFC6B-5CDC-5146-A795-64FCE170E247}" type="datetime1">
-              <a:rPr lang="en-US" smtClean="0"/>
-              <a:t>10/17/16</a:t>
+            <a:fld id="{34C927BB-2F1D-1B46-87F4-9D56ACF67290}" type="datetime1">
+              <a:rPr lang="en-US" smtClean="0"/>
+              <a:t>10/18/16</a:t>
             </a:fld>
             <a:endParaRPr lang="en-US"/>
           </a:p>
@@ -18578,7 +18662,7 @@
           <a:p>
             <a:r>
               <a:rPr lang="sk-SK" smtClean="0"/>
-              <a:t>© 2016 EV3Lessons.com, Last Edit 10/17/2016</a:t>
+              <a:t>© 2016 EV3Lessons.com, Last Edit 10/18/2016</a:t>
             </a:r>
             <a:endParaRPr lang="en-US"/>
           </a:p>
@@ -18652,9 +18736,9 @@
           <a:bodyPr/>
           <a:lstStyle/>
           <a:p>
-            <a:fld id="{E8F752DE-2C38-BB4E-B549-A58F426D0BAE}" type="datetime1">
-              <a:rPr lang="en-US" smtClean="0"/>
-              <a:t>10/17/16</a:t>
+            <a:fld id="{F9BBF52E-5F4E-DB47-A695-B7AC34943325}" type="datetime1">
+              <a:rPr lang="en-US" smtClean="0"/>
+              <a:t>10/18/16</a:t>
             </a:fld>
             <a:endParaRPr lang="en-US"/>
           </a:p>
@@ -18677,7 +18761,7 @@
           <a:p>
             <a:r>
               <a:rPr lang="sk-SK" smtClean="0"/>
-              <a:t>© 2016 EV3Lessons.com, Last Edit 10/17/2016</a:t>
+              <a:t>© 2016 EV3Lessons.com, Last Edit 10/18/2016</a:t>
             </a:r>
             <a:endParaRPr lang="en-US"/>
           </a:p>
@@ -18903,9 +18987,9 @@
           <a:bodyPr/>
           <a:lstStyle/>
           <a:p>
-            <a:fld id="{2B0FC0D1-0268-9445-B6F5-38B8609297DD}" type="datetime1">
-              <a:rPr lang="en-US" smtClean="0"/>
-              <a:t>10/17/16</a:t>
+            <a:fld id="{6978ED6B-2251-1942-9E67-79B8705BBBC1}" type="datetime1">
+              <a:rPr lang="en-US" smtClean="0"/>
+              <a:t>10/18/16</a:t>
             </a:fld>
             <a:endParaRPr lang="en-US"/>
           </a:p>
@@ -18928,7 +19012,7 @@
           <a:p>
             <a:r>
               <a:rPr lang="sk-SK" smtClean="0"/>
-              <a:t>© 2016 EV3Lessons.com, Last Edit 10/17/2016</a:t>
+              <a:t>© 2016 EV3Lessons.com, Last Edit 10/18/2016</a:t>
             </a:r>
             <a:endParaRPr lang="en-US"/>
           </a:p>
@@ -19206,9 +19290,9 @@
           <a:bodyPr/>
           <a:lstStyle/>
           <a:p>
-            <a:fld id="{8A78C7CB-2DD2-F94E-A11F-7F34CE65B0B8}" type="datetime1">
-              <a:rPr lang="en-US" smtClean="0"/>
-              <a:t>10/17/16</a:t>
+            <a:fld id="{1F440DAE-8A6C-4F43-96CB-F525709CCAA3}" type="datetime1">
+              <a:rPr lang="en-US" smtClean="0"/>
+              <a:t>10/18/16</a:t>
             </a:fld>
             <a:endParaRPr lang="en-US"/>
           </a:p>
@@ -19231,7 +19315,7 @@
           <a:p>
             <a:r>
               <a:rPr lang="sk-SK" smtClean="0"/>
-              <a:t>© 2016 EV3Lessons.com, Last Edit 10/17/2016</a:t>
+              <a:t>© 2016 EV3Lessons.com, Last Edit 10/18/2016</a:t>
             </a:r>
             <a:endParaRPr lang="en-US"/>
           </a:p>
@@ -19509,9 +19593,9 @@
             </a:lvl1pPr>
           </a:lstStyle>
           <a:p>
-            <a:fld id="{18D46C1B-9CD8-8444-B937-1394455B910C}" type="datetime1">
-              <a:rPr lang="en-US" smtClean="0"/>
-              <a:t>10/17/16</a:t>
+            <a:fld id="{B8C93E34-5C7A-0F43-9E4F-06E6760709E1}" type="datetime1">
+              <a:rPr lang="en-US" smtClean="0"/>
+              <a:t>10/18/16</a:t>
             </a:fld>
             <a:endParaRPr lang="en-US"/>
           </a:p>
@@ -19550,7 +19634,7 @@
           <a:p>
             <a:r>
               <a:rPr lang="sk-SK" smtClean="0"/>
-              <a:t>© 2016 EV3Lessons.com, Last Edit 10/17/2016</a:t>
+              <a:t>© 2016 EV3Lessons.com, Last Edit 10/18/2016</a:t>
             </a:r>
             <a:endParaRPr lang="en-US"/>
           </a:p>
@@ -20462,9 +20546,9 @@
             </a:lvl1pPr>
           </a:lstStyle>
           <a:p>
-            <a:fld id="{44F8AEF9-D6F1-F64D-B537-F8AC85DF4262}" type="datetime1">
-              <a:rPr lang="en-US" smtClean="0"/>
-              <a:t>10/17/16</a:t>
+            <a:fld id="{2CAAFB42-3480-7A47-886A-33C45F53FB96}" type="datetime1">
+              <a:rPr lang="en-US" smtClean="0"/>
+              <a:t>10/18/16</a:t>
             </a:fld>
             <a:endParaRPr lang="en-US"/>
           </a:p>
@@ -20503,7 +20587,7 @@
           <a:p>
             <a:r>
               <a:rPr lang="sk-SK" smtClean="0"/>
-              <a:t>© 2016 EV3Lessons.com, Last Edit 10/17/2016</a:t>
+              <a:t>© 2016 EV3Lessons.com, Last Edit 10/18/2016</a:t>
             </a:r>
             <a:endParaRPr lang="en-US"/>
           </a:p>
@@ -21530,9 +21614,9 @@
             </a:lvl1pPr>
           </a:lstStyle>
           <a:p>
-            <a:fld id="{2C680D08-8A5E-BD47-AA49-65287214E8B6}" type="datetime1">
-              <a:rPr lang="en-US" smtClean="0"/>
-              <a:t>10/17/16</a:t>
+            <a:fld id="{4986EEDC-3481-AF46-B982-85D97F34AA35}" type="datetime1">
+              <a:rPr lang="en-US" smtClean="0"/>
+              <a:t>10/18/16</a:t>
             </a:fld>
             <a:endParaRPr lang="en-US"/>
           </a:p>
@@ -21573,7 +21657,7 @@
           <a:p>
             <a:r>
               <a:rPr lang="sk-SK" smtClean="0"/>
-              <a:t>© 2016 EV3Lessons.com, Last Edit 10/17/2016</a:t>
+              <a:t>© 2016 EV3Lessons.com, Last Edit 10/18/2016</a:t>
             </a:r>
             <a:endParaRPr lang="en-US"/>
           </a:p>
@@ -22073,9 +22157,9 @@
             </a:lvl1pPr>
           </a:lstStyle>
           <a:p>
-            <a:fld id="{7518E7E8-62FB-7D4D-8FCF-E1ABFE74BDA3}" type="datetime1">
-              <a:rPr lang="en-US" smtClean="0"/>
-              <a:t>10/17/16</a:t>
+            <a:fld id="{CFC19486-466B-D544-A70B-F010200A9085}" type="datetime1">
+              <a:rPr lang="en-US" smtClean="0"/>
+              <a:t>10/18/16</a:t>
             </a:fld>
             <a:endParaRPr lang="en-US"/>
           </a:p>
@@ -22114,7 +22198,7 @@
           <a:p>
             <a:r>
               <a:rPr lang="sk-SK" smtClean="0"/>
-              <a:t>© 2016 EV3Lessons.com, Last Edit 10/17/2016</a:t>
+              <a:t>© 2016 EV3Lessons.com, Last Edit 10/18/2016</a:t>
             </a:r>
             <a:endParaRPr lang="en-US"/>
           </a:p>
@@ -23443,9 +23527,9 @@
             </a:lvl1pPr>
           </a:lstStyle>
           <a:p>
-            <a:fld id="{30362A09-7B30-D542-BDDF-6760E3B25B72}" type="datetime1">
-              <a:rPr lang="en-US" smtClean="0"/>
-              <a:t>10/17/16</a:t>
+            <a:fld id="{88B89251-5A3E-7A40-A44E-652B62FBA553}" type="datetime1">
+              <a:rPr lang="en-US" smtClean="0"/>
+              <a:t>10/18/16</a:t>
             </a:fld>
             <a:endParaRPr lang="en-US"/>
           </a:p>
@@ -23484,7 +23568,7 @@
           <a:p>
             <a:r>
               <a:rPr lang="sk-SK" smtClean="0"/>
-              <a:t>© 2016 EV3Lessons.com, Last Edit 10/17/2016</a:t>
+              <a:t>© 2016 EV3Lessons.com, Last Edit 10/18/2016</a:t>
             </a:r>
             <a:endParaRPr lang="en-US"/>
           </a:p>
@@ -24533,9 +24617,9 @@
             </a:lvl1pPr>
           </a:lstStyle>
           <a:p>
-            <a:fld id="{3855923E-1DF5-4646-92A0-D2A926F08CBD}" type="datetime1">
-              <a:rPr lang="en-US" smtClean="0"/>
-              <a:t>10/17/16</a:t>
+            <a:fld id="{8C91D27B-C120-484F-80BE-82C95304C4BB}" type="datetime1">
+              <a:rPr lang="en-US" smtClean="0"/>
+              <a:t>10/18/16</a:t>
             </a:fld>
             <a:endParaRPr lang="en-US"/>
           </a:p>
@@ -24576,7 +24660,7 @@
           <a:p>
             <a:r>
               <a:rPr lang="sk-SK" smtClean="0"/>
-              <a:t>© 2016 EV3Lessons.com, Last Edit 10/17/2016</a:t>
+              <a:t>© 2016 EV3Lessons.com, Last Edit 10/18/2016</a:t>
             </a:r>
             <a:endParaRPr lang="en-US"/>
           </a:p>
@@ -24969,39 +25053,31 @@
             </a:br>
             <a:r>
               <a:rPr lang="en-US" dirty="0" smtClean="0"/>
-              <a:t>(a.k.a. the VM Instruction Break Erro</a:t>
-            </a:r>
+              <a:t>(a.k.a. the VM Instruction Break Error)</a:t>
+            </a:r>
+            <a:endParaRPr lang="en-US" dirty="0"/>
+          </a:p>
+        </p:txBody>
+      </p:sp>
+      <p:sp>
+        <p:nvSpPr>
+          <p:cNvPr id="3" name="Title 2"/>
+          <p:cNvSpPr>
+            <a:spLocks noGrp="1"/>
+          </p:cNvSpPr>
+          <p:nvPr>
+            <p:ph type="ctrTitle"/>
+          </p:nvPr>
+        </p:nvSpPr>
+        <p:spPr/>
+        <p:txBody>
+          <a:bodyPr/>
+          <a:lstStyle/>
+          <a:p>
+            <a:pPr algn="ctr"/>
             <a:r>
               <a:rPr lang="en-US" dirty="0" smtClean="0"/>
-              <a:t>r)</a:t>
-            </a:r>
-            <a:endParaRPr lang="en-US" dirty="0"/>
-          </a:p>
-        </p:txBody>
-      </p:sp>
-      <p:sp>
-        <p:nvSpPr>
-          <p:cNvPr id="3" name="Title 2"/>
-          <p:cNvSpPr>
-            <a:spLocks noGrp="1"/>
-          </p:cNvSpPr>
-          <p:nvPr>
-            <p:ph type="ctrTitle"/>
-          </p:nvPr>
-        </p:nvSpPr>
-        <p:spPr/>
-        <p:txBody>
-          <a:bodyPr/>
-          <a:lstStyle/>
-          <a:p>
-            <a:pPr algn="ctr"/>
-            <a:r>
-              <a:rPr lang="en-US" dirty="0" smtClean="0"/>
-              <a:t>DEBUGGING </a:t>
-            </a:r>
-            <a:r>
-              <a:rPr lang="en-US" dirty="0" smtClean="0"/>
-              <a:t>Lesson</a:t>
+              <a:t>DEBUGGING Lesson</a:t>
             </a:r>
             <a:endParaRPr lang="en-US" dirty="0"/>
           </a:p>
@@ -25113,7 +25189,7 @@
           <a:p>
             <a:r>
               <a:rPr lang="sk-SK" smtClean="0"/>
-              <a:t>© 2016 EV3Lessons.com, Last Edit 10/17/2016</a:t>
+              <a:t>© 2016 EV3Lessons.com, Last Edit 10/18/2016</a:t>
             </a:r>
             <a:endParaRPr lang="en-US"/>
           </a:p>
@@ -25761,7 +25837,7 @@
           <a:p>
             <a:r>
               <a:rPr lang="sk-SK" smtClean="0"/>
-              <a:t>© 2016 EV3Lessons.com, Last Edit 10/17/2016</a:t>
+              <a:t>© 2016 EV3Lessons.com, Last Edit 10/18/2016</a:t>
             </a:r>
             <a:endParaRPr lang="en-US"/>
           </a:p>
@@ -26328,7 +26404,7 @@
           <a:p>
             <a:r>
               <a:rPr lang="sk-SK" smtClean="0"/>
-              <a:t>© 2016 EV3Lessons.com, Last Edit 10/17/2016</a:t>
+              <a:t>© 2016 EV3Lessons.com, Last Edit 10/18/2016</a:t>
             </a:r>
             <a:endParaRPr lang="en-US"/>
           </a:p>
@@ -26499,7 +26575,7 @@
           <a:p>
             <a:r>
               <a:rPr lang="sk-SK" smtClean="0"/>
-              <a:t>© 2016 EV3Lessons.com, Last Edit 10/17/2016</a:t>
+              <a:t>© 2016 EV3Lessons.com, Last Edit 10/18/2016</a:t>
             </a:r>
             <a:endParaRPr lang="en-US"/>
           </a:p>
@@ -26651,7 +26727,7 @@
           <a:p>
             <a:r>
               <a:rPr lang="sk-SK" smtClean="0"/>
-              <a:t>© 2016 EV3Lessons.com, Last Edit 10/17/2016</a:t>
+              <a:t>© 2016 EV3Lessons.com, Last Edit 10/18/2016</a:t>
             </a:r>
             <a:endParaRPr lang="en-US"/>
           </a:p>
@@ -26806,7 +26882,7 @@
           <a:p>
             <a:r>
               <a:rPr lang="sk-SK" smtClean="0"/>
-              <a:t>© 2016 EV3Lessons.com, Last Edit 10/17/2016</a:t>
+              <a:t>© 2016 EV3Lessons.com, Last Edit 10/18/2016</a:t>
             </a:r>
             <a:endParaRPr lang="en-US"/>
           </a:p>
@@ -26861,7 +26937,7 @@
           <a:effectLst/>
           <a:extLst>
             <a:ext uri="{91240B29-F687-4f45-9708-019B960494DF}">
-              <a14:hiddenLine xmlns="" xmlns:a14="http://schemas.microsoft.com/office/drawing/2010/main" w="9525">
+              <a14:hiddenLine xmlns:a14="http://schemas.microsoft.com/office/drawing/2010/main" xmlns="" w="9525">
                 <a:solidFill>
                   <a:schemeClr val="tx1"/>
                 </a:solidFill>
@@ -26871,7 +26947,7 @@
               </a14:hiddenLine>
             </a:ext>
             <a:ext uri="{AF507438-7753-43e0-B8FC-AC1667EBCBE1}">
-              <a14:hiddenEffects xmlns="" xmlns:a14="http://schemas.microsoft.com/office/drawing/2010/main">
+              <a14:hiddenEffects xmlns:a14="http://schemas.microsoft.com/office/drawing/2010/main" xmlns="">
                 <a:effectLst>
                   <a:outerShdw dist="35921" dir="2700000" algn="ctr" rotWithShape="0">
                     <a:schemeClr val="bg2"/>
@@ -27224,7 +27300,7 @@
           <a:noFill/>
           <a:extLst>
             <a:ext uri="{909E8E84-426E-40dd-AFC4-6F175D3DCCD1}">
-              <a14:hiddenFill xmlns="" xmlns:a14="http://schemas.microsoft.com/office/drawing/2010/main">
+              <a14:hiddenFill xmlns:a14="http://schemas.microsoft.com/office/drawing/2010/main" xmlns="">
                 <a:solidFill>
                   <a:srgbClr val="FFFFFF"/>
                 </a:solidFill>
@@ -27324,7 +27400,15 @@
             </a:pPr>
             <a:r>
               <a:rPr lang="en-US" dirty="0" smtClean="0"/>
-              <a:t>We first encountered the “VM Instruction Break” error on our brick during the fall of 2013 during the Nature’s Fury FLL season. We searched online for any documentation about this error, but could not find any. We were the first to report this problem on the FLL Forum.</a:t>
+              <a:t>We first encountered the “VM </a:t>
+            </a:r>
+            <a:r>
+              <a:rPr lang="en-US" dirty="0" smtClean="0"/>
+              <a:t>Program Instruction </a:t>
+            </a:r>
+            <a:r>
+              <a:rPr lang="en-US" dirty="0" smtClean="0"/>
+              <a:t>Break” error on our brick during the fall of 2013 during the Nature’s Fury FLL season. We searched online for any documentation about this error, but could not find any. We were the first to report this problem on the FLL Forum.</a:t>
             </a:r>
           </a:p>
           <a:p>
@@ -27377,7 +27461,7 @@
           <a:p>
             <a:r>
               <a:rPr lang="sk-SK" smtClean="0"/>
-              <a:t>© 2016 EV3Lessons.com, Last Edit 10/17/2016</a:t>
+              <a:t>© 2016 EV3Lessons.com, Last Edit 10/18/2016</a:t>
             </a:r>
             <a:endParaRPr lang="en-US"/>
           </a:p>
@@ -27471,8 +27555,8 @@
         </p:nvSpPr>
         <p:spPr>
           <a:xfrm>
-            <a:off x="457199" y="1056904"/>
-            <a:ext cx="8245475" cy="5435971"/>
+            <a:off x="457200" y="1056904"/>
+            <a:ext cx="4095136" cy="5435971"/>
           </a:xfrm>
         </p:spPr>
         <p:txBody>
@@ -27487,7 +27571,15 @@
             </a:pPr>
             <a:r>
               <a:rPr lang="en-US" sz="1800" dirty="0" smtClean="0"/>
-              <a:t>The robot stops in the middle of a program and displays “VM Instruction Break” on the screen</a:t>
+              <a:t>The robot stops in the middle of a program and displays “</a:t>
+            </a:r>
+            <a:r>
+              <a:rPr lang="en-US" sz="1800" dirty="0" smtClean="0"/>
+              <a:t>VM Program </a:t>
+            </a:r>
+            <a:r>
+              <a:rPr lang="en-US" sz="1800" dirty="0" smtClean="0"/>
+              <a:t>Instruction Break” on the screen</a:t>
             </a:r>
           </a:p>
           <a:p>
@@ -27539,7 +27631,7 @@
           <a:p>
             <a:r>
               <a:rPr lang="sk-SK" smtClean="0"/>
-              <a:t>© 2016 EV3Lessons.com, Last Edit 10/17/2016</a:t>
+              <a:t>© 2016 EV3Lessons.com, Last Edit 10/18/2016</a:t>
             </a:r>
             <a:endParaRPr lang="en-US"/>
           </a:p>
@@ -27568,6 +27660,71 @@
           </a:p>
         </p:txBody>
       </p:sp>
+      <p:sp>
+        <p:nvSpPr>
+          <p:cNvPr id="8" name="TextBox 7"/>
+          <p:cNvSpPr txBox="1"/>
+          <p:nvPr/>
+        </p:nvSpPr>
+        <p:spPr>
+          <a:xfrm>
+            <a:off x="4744309" y="5845340"/>
+            <a:ext cx="3746727" cy="338554"/>
+          </a:xfrm>
+          <a:prstGeom prst="rect">
+            <a:avLst/>
+          </a:prstGeom>
+          <a:noFill/>
+        </p:spPr>
+        <p:txBody>
+          <a:bodyPr wrap="square" rtlCol="0">
+            <a:spAutoFit/>
+          </a:bodyPr>
+          <a:lstStyle/>
+          <a:p>
+            <a:pPr algn="ctr"/>
+            <a:r>
+              <a:rPr lang="en-US" sz="1600" dirty="0" smtClean="0"/>
+              <a:t>Image provided by David </a:t>
+            </a:r>
+            <a:r>
+              <a:rPr lang="en-US" sz="1600" dirty="0" err="1" smtClean="0"/>
+              <a:t>Gilday</a:t>
+            </a:r>
+            <a:endParaRPr lang="en-US" sz="1600" dirty="0"/>
+          </a:p>
+        </p:txBody>
+      </p:sp>
+      <p:pic>
+        <p:nvPicPr>
+          <p:cNvPr id="9" name="Picture 8"/>
+          <p:cNvPicPr>
+            <a:picLocks noChangeAspect="1"/>
+          </p:cNvPicPr>
+          <p:nvPr/>
+        </p:nvPicPr>
+        <p:blipFill>
+          <a:blip r:embed="rId3">
+            <a:extLst>
+              <a:ext uri="{28A0092B-C50C-407E-A947-70E740481C1C}">
+                <a14:useLocalDpi xmlns:a14="http://schemas.microsoft.com/office/drawing/2010/main" val="0"/>
+              </a:ext>
+            </a:extLst>
+          </a:blip>
+          <a:stretch>
+            <a:fillRect/>
+          </a:stretch>
+        </p:blipFill>
+        <p:spPr>
+          <a:xfrm>
+            <a:off x="5000110" y="1081610"/>
+            <a:ext cx="3254789" cy="4793226"/>
+          </a:xfrm>
+          <a:prstGeom prst="rect">
+            <a:avLst/>
+          </a:prstGeom>
+        </p:spPr>
+      </p:pic>
     </p:spTree>
     <p:extLst>
       <p:ext uri="{BB962C8B-B14F-4D97-AF65-F5344CB8AC3E}">
@@ -27710,7 +27867,7 @@
           <a:p>
             <a:r>
               <a:rPr lang="sk-SK" smtClean="0"/>
-              <a:t>© 2016 EV3Lessons.com, Last Edit 10/17/2016</a:t>
+              <a:t>© 2016 EV3Lessons.com, Last Edit 10/18/2016</a:t>
             </a:r>
             <a:endParaRPr lang="en-US"/>
           </a:p>
@@ -27873,7 +28030,7 @@
           <a:p>
             <a:r>
               <a:rPr lang="sk-SK" smtClean="0"/>
-              <a:t>© 2016 EV3Lessons.com, Last Edit 10/17/2016</a:t>
+              <a:t>© 2016 EV3Lessons.com, Last Edit 10/18/2016</a:t>
             </a:r>
             <a:endParaRPr lang="en-US"/>
           </a:p>
@@ -28374,7 +28531,7 @@
           <a:p>
             <a:r>
               <a:rPr lang="sk-SK" smtClean="0"/>
-              <a:t>© 2016 EV3Lessons.com, Last Edit 10/17/2016</a:t>
+              <a:t>© 2016 EV3Lessons.com, Last Edit 10/18/2016</a:t>
             </a:r>
             <a:endParaRPr lang="en-US"/>
           </a:p>
@@ -28934,7 +29091,7 @@
           <a:p>
             <a:r>
               <a:rPr lang="sk-SK" smtClean="0"/>
-              <a:t>© 2016 EV3Lessons.com, Last Edit 10/17/2016</a:t>
+              <a:t>© 2016 EV3Lessons.com, Last Edit 10/18/2016</a:t>
             </a:r>
             <a:endParaRPr lang="en-US"/>
           </a:p>
@@ -29063,7 +29220,7 @@
           <a:p>
             <a:r>
               <a:rPr lang="sk-SK" smtClean="0"/>
-              <a:t>© 2016 EV3Lessons.com, Last Edit 10/17/2016</a:t>
+              <a:t>© 2016 EV3Lessons.com, Last Edit 10/18/2016</a:t>
             </a:r>
             <a:endParaRPr lang="en-US"/>
           </a:p>
@@ -29227,7 +29384,11 @@
             <a:pPr algn="ctr"/>
             <a:r>
               <a:rPr lang="en-US" sz="1600" dirty="0" smtClean="0"/>
-              <a:t>Try again</a:t>
+              <a:t>Try </a:t>
+            </a:r>
+            <a:r>
+              <a:rPr lang="en-US" sz="1600" dirty="0" smtClean="0"/>
+              <a:t>again.</a:t>
             </a:r>
             <a:endParaRPr lang="en-US" sz="1600" dirty="0"/>
           </a:p>
@@ -29273,12 +29434,12 @@
           <a:p>
             <a:pPr algn="ctr"/>
             <a:r>
-              <a:rPr lang="en-US" sz="1600" smtClean="0"/>
+              <a:rPr lang="en-US" sz="1600" dirty="0" smtClean="0"/>
               <a:t>Stop all the </a:t>
             </a:r>
             <a:r>
               <a:rPr lang="en-US" sz="1600" dirty="0" smtClean="0"/>
-              <a:t>motors</a:t>
+              <a:t>motors.</a:t>
             </a:r>
             <a:endParaRPr lang="en-US" sz="1600" dirty="0"/>
           </a:p>
@@ -29647,7 +29808,11 @@
             <a:pPr algn="ctr"/>
             <a:r>
               <a:rPr lang="en-US" sz="1600" dirty="0" smtClean="0"/>
-              <a:t>Try again</a:t>
+              <a:t>Try </a:t>
+            </a:r>
+            <a:r>
+              <a:rPr lang="en-US" sz="1600" dirty="0" smtClean="0"/>
+              <a:t>again.</a:t>
             </a:r>
             <a:endParaRPr lang="en-US" sz="1600" dirty="0"/>
           </a:p>
@@ -29693,12 +29858,12 @@
           <a:p>
             <a:pPr algn="ctr"/>
             <a:r>
-              <a:rPr lang="en-US" sz="1600" smtClean="0"/>
+              <a:rPr lang="en-US" sz="1600" dirty="0" smtClean="0"/>
               <a:t>Stop all the </a:t>
             </a:r>
             <a:r>
               <a:rPr lang="en-US" sz="1600" dirty="0" smtClean="0"/>
-              <a:t>motors</a:t>
+              <a:t>motors.</a:t>
             </a:r>
             <a:endParaRPr lang="en-US" sz="1600" dirty="0"/>
           </a:p>
@@ -30243,7 +30408,7 @@
           <a:p>
             <a:r>
               <a:rPr lang="sk-SK" smtClean="0"/>
-              <a:t>© 2016 EV3Lessons.com, Last Edit 10/17/2016</a:t>
+              <a:t>© 2016 EV3Lessons.com, Last Edit 10/18/2016</a:t>
             </a:r>
             <a:endParaRPr lang="en-US"/>
           </a:p>

</xml_diff>

<commit_message>
Retail software available added
</commit_message>
<xml_diff>
--- a/translations/en-us/beyond/BranchingError.pptx
+++ b/translations/en-us/beyond/BranchingError.pptx
@@ -230,7 +230,7 @@
           <a:p>
             <a:fld id="{E354B44E-40A3-0E46-B16A-9BF1250A248B}" type="datetimeFigureOut">
               <a:rPr lang="en-US" smtClean="0"/>
-              <a:t>10/18/16</a:t>
+              <a:t>10/19/16</a:t>
             </a:fld>
             <a:endParaRPr lang="en-US"/>
           </a:p>
@@ -396,7 +396,7 @@
           <a:p>
             <a:fld id="{C86AD16C-2DB4-6642-BAD4-9ED973A087A0}" type="datetimeFigureOut">
               <a:rPr lang="en-US" smtClean="0"/>
-              <a:t>10/18/16</a:t>
+              <a:t>10/19/16</a:t>
             </a:fld>
             <a:endParaRPr lang="en-US"/>
           </a:p>
@@ -1110,7 +1110,7 @@
           <a:p>
             <a:fld id="{FD05E093-ED86-2146-9551-BA44ED13EC02}" type="datetime1">
               <a:rPr lang="en-US" smtClean="0"/>
-              <a:t>10/18/16</a:t>
+              <a:t>10/19/16</a:t>
             </a:fld>
             <a:endParaRPr lang="en-US"/>
           </a:p>
@@ -1709,7 +1709,7 @@
           <a:p>
             <a:fld id="{D7BAC967-79F1-3045-AC00-BDD8144DE932}" type="datetime1">
               <a:rPr lang="en-US" smtClean="0"/>
-              <a:t>10/18/16</a:t>
+              <a:t>10/19/16</a:t>
             </a:fld>
             <a:endParaRPr lang="en-US"/>
           </a:p>
@@ -1893,7 +1893,7 @@
           <a:p>
             <a:fld id="{166BB710-88B0-B647-99DF-975987E001A2}" type="datetime1">
               <a:rPr lang="en-US" smtClean="0"/>
-              <a:t>10/18/16</a:t>
+              <a:t>10/19/16</a:t>
             </a:fld>
             <a:endParaRPr lang="en-US"/>
           </a:p>
@@ -2110,7 +2110,7 @@
           <a:p>
             <a:fld id="{CD92D860-516E-034D-9467-249867CD21EC}" type="datetime1">
               <a:rPr lang="en-US" smtClean="0"/>
-              <a:t>10/18/16</a:t>
+              <a:t>10/19/16</a:t>
             </a:fld>
             <a:endParaRPr lang="en-US"/>
           </a:p>
@@ -2329,7 +2329,7 @@
           <a:noFill/>
           <a:extLst>
             <a:ext uri="{909E8E84-426E-40dd-AFC4-6F175D3DCCD1}">
-              <a14:hiddenFill xmlns="" xmlns:a14="http://schemas.microsoft.com/office/drawing/2010/main">
+              <a14:hiddenFill xmlns:a14="http://schemas.microsoft.com/office/drawing/2010/main" xmlns="">
                 <a:solidFill>
                   <a:srgbClr val="FFFFFF"/>
                 </a:solidFill>
@@ -2964,7 +2964,7 @@
           <a:p>
             <a:fld id="{21DF594E-2FA9-6B4B-987B-567CF26F06D5}" type="datetime1">
               <a:rPr lang="en-US" smtClean="0"/>
-              <a:t>10/18/16</a:t>
+              <a:t>10/19/16</a:t>
             </a:fld>
             <a:endParaRPr lang="en-US"/>
           </a:p>
@@ -3237,7 +3237,7 @@
           <a:p>
             <a:fld id="{F1E587C1-9FAA-7E4D-9180-ABB3A32185A2}" type="datetime1">
               <a:rPr lang="en-US" smtClean="0"/>
-              <a:t>10/18/16</a:t>
+              <a:t>10/19/16</a:t>
             </a:fld>
             <a:endParaRPr lang="en-US"/>
           </a:p>
@@ -3542,7 +3542,7 @@
           <a:p>
             <a:fld id="{A5AFF2E5-5E27-2748-A205-6CA6CB4AF064}" type="datetime1">
               <a:rPr lang="en-US" smtClean="0"/>
-              <a:t>10/18/16</a:t>
+              <a:t>10/19/16</a:t>
             </a:fld>
             <a:endParaRPr lang="en-US"/>
           </a:p>
@@ -4005,7 +4005,7 @@
           <a:p>
             <a:fld id="{D59E0700-1495-FA40-92CA-EF439C7F0C60}" type="datetime1">
               <a:rPr lang="en-US" smtClean="0"/>
-              <a:t>10/18/16</a:t>
+              <a:t>10/19/16</a:t>
             </a:fld>
             <a:endParaRPr lang="en-US"/>
           </a:p>
@@ -4142,7 +4142,7 @@
           <a:p>
             <a:fld id="{57CD7F4B-998A-E248-9389-D5A59CCBC8BE}" type="datetime1">
               <a:rPr lang="en-US" smtClean="0"/>
-              <a:t>10/18/16</a:t>
+              <a:t>10/19/16</a:t>
             </a:fld>
             <a:endParaRPr lang="en-US"/>
           </a:p>
@@ -4256,7 +4256,7 @@
           <a:p>
             <a:fld id="{1DBBB98A-C4EE-0A4F-9CF5-4D145830DE6B}" type="datetime1">
               <a:rPr lang="en-US" smtClean="0"/>
-              <a:t>10/18/16</a:t>
+              <a:t>10/19/16</a:t>
             </a:fld>
             <a:endParaRPr lang="en-US"/>
           </a:p>
@@ -4515,7 +4515,7 @@
           <a:p>
             <a:fld id="{545942EB-BDDD-DA47-B957-9EF2539A6072}" type="datetime1">
               <a:rPr lang="en-US" smtClean="0"/>
-              <a:t>10/18/16</a:t>
+              <a:t>10/19/16</a:t>
             </a:fld>
             <a:endParaRPr lang="en-US"/>
           </a:p>
@@ -4730,7 +4730,7 @@
           <a:p>
             <a:fld id="{0D0D8D12-238D-AE44-9E0C-997468207ACD}" type="datetime1">
               <a:rPr lang="en-US" smtClean="0"/>
-              <a:t>10/18/16</a:t>
+              <a:t>10/19/16</a:t>
             </a:fld>
             <a:endParaRPr lang="en-US"/>
           </a:p>
@@ -5015,7 +5015,7 @@
           <a:p>
             <a:fld id="{62ACD900-06AD-D94E-81A6-025F2D0F7A8A}" type="datetime1">
               <a:rPr lang="en-US" smtClean="0"/>
-              <a:t>10/18/16</a:t>
+              <a:t>10/19/16</a:t>
             </a:fld>
             <a:endParaRPr lang="en-US"/>
           </a:p>
@@ -5285,7 +5285,7 @@
           <a:p>
             <a:fld id="{6A6DE80D-2F90-1643-BD00-A66E8C56EDA1}" type="datetime1">
               <a:rPr lang="en-US" smtClean="0"/>
-              <a:t>10/18/16</a:t>
+              <a:t>10/19/16</a:t>
             </a:fld>
             <a:endParaRPr lang="en-US"/>
           </a:p>
@@ -5477,7 +5477,7 @@
           <a:p>
             <a:fld id="{B0D9E542-CE7E-C842-B5ED-0CA4976B5FF0}" type="datetime1">
               <a:rPr lang="en-US" smtClean="0"/>
-              <a:t>10/18/16</a:t>
+              <a:t>10/19/16</a:t>
             </a:fld>
             <a:endParaRPr lang="en-US"/>
           </a:p>
@@ -5681,7 +5681,7 @@
           <a:p>
             <a:fld id="{D9F59D03-6F35-F941-A3EC-63D8CF8238F0}" type="datetime1">
               <a:rPr lang="en-US" smtClean="0"/>
-              <a:t>10/18/16</a:t>
+              <a:t>10/19/16</a:t>
             </a:fld>
             <a:endParaRPr lang="en-US"/>
           </a:p>
@@ -5855,7 +5855,7 @@
           <a:p>
             <a:fld id="{0274EC29-3731-7E42-A6E0-9B812E405A7E}" type="datetime1">
               <a:rPr lang="en-US" smtClean="0"/>
-              <a:t>10/18/16</a:t>
+              <a:t>10/19/16</a:t>
             </a:fld>
             <a:endParaRPr lang="en-US"/>
           </a:p>
@@ -6105,7 +6105,7 @@
           <a:p>
             <a:fld id="{9C8F15D9-B0F4-7649-86A2-D42B02B8D8E3}" type="datetime1">
               <a:rPr lang="en-US" smtClean="0"/>
-              <a:t>10/18/16</a:t>
+              <a:t>10/19/16</a:t>
             </a:fld>
             <a:endParaRPr lang="en-US"/>
           </a:p>
@@ -6341,7 +6341,7 @@
           <a:p>
             <a:fld id="{10EE3CA3-6BD8-C64B-AFAA-8C863F458724}" type="datetime1">
               <a:rPr lang="en-US" smtClean="0"/>
-              <a:t>10/18/16</a:t>
+              <a:t>10/19/16</a:t>
             </a:fld>
             <a:endParaRPr lang="en-US"/>
           </a:p>
@@ -6712,7 +6712,7 @@
           <a:p>
             <a:fld id="{3F7BD0D3-610B-2B4A-938D-05A7896D30DF}" type="datetime1">
               <a:rPr lang="en-US" smtClean="0"/>
-              <a:t>10/18/16</a:t>
+              <a:t>10/19/16</a:t>
             </a:fld>
             <a:endParaRPr lang="en-US"/>
           </a:p>
@@ -6834,7 +6834,7 @@
           <a:p>
             <a:fld id="{7A11C149-D740-E344-8CCB-A12884967E04}" type="datetime1">
               <a:rPr lang="en-US" smtClean="0"/>
-              <a:t>10/18/16</a:t>
+              <a:t>10/19/16</a:t>
             </a:fld>
             <a:endParaRPr lang="en-US"/>
           </a:p>
@@ -6933,7 +6933,7 @@
           <a:p>
             <a:fld id="{2375A2B2-8B5E-6645-AD63-3130E483748F}" type="datetime1">
               <a:rPr lang="en-US" smtClean="0"/>
-              <a:t>10/18/16</a:t>
+              <a:t>10/19/16</a:t>
             </a:fld>
             <a:endParaRPr lang="en-US"/>
           </a:p>
@@ -7191,7 +7191,7 @@
           <a:p>
             <a:fld id="{0F101BC8-CCA2-834F-95E9-84E71FD7B50D}" type="datetime1">
               <a:rPr lang="en-US" smtClean="0"/>
-              <a:t>10/18/16</a:t>
+              <a:t>10/19/16</a:t>
             </a:fld>
             <a:endParaRPr lang="en-US"/>
           </a:p>
@@ -7472,7 +7472,7 @@
           <a:p>
             <a:fld id="{09721406-ED4F-8B45-A549-188C9603D847}" type="datetime1">
               <a:rPr lang="en-US" smtClean="0"/>
-              <a:t>10/18/16</a:t>
+              <a:t>10/19/16</a:t>
             </a:fld>
             <a:endParaRPr lang="en-US"/>
           </a:p>
@@ -7733,7 +7733,7 @@
           <a:p>
             <a:fld id="{DE1057CE-45C3-AC4E-8338-FE58356B1CB1}" type="datetime1">
               <a:rPr lang="en-US" smtClean="0"/>
-              <a:t>10/18/16</a:t>
+              <a:t>10/19/16</a:t>
             </a:fld>
             <a:endParaRPr lang="en-US"/>
           </a:p>
@@ -7907,7 +7907,7 @@
           <a:p>
             <a:fld id="{2F2E95A7-3A28-EC4D-B92E-95BF27C175C3}" type="datetime1">
               <a:rPr lang="en-US" smtClean="0"/>
-              <a:t>10/18/16</a:t>
+              <a:t>10/19/16</a:t>
             </a:fld>
             <a:endParaRPr lang="en-US"/>
           </a:p>
@@ -8091,7 +8091,7 @@
           <a:p>
             <a:fld id="{0B9C296B-50A0-1C4D-A904-842C5215E8D6}" type="datetime1">
               <a:rPr lang="en-US" smtClean="0"/>
-              <a:t>10/18/16</a:t>
+              <a:t>10/19/16</a:t>
             </a:fld>
             <a:endParaRPr lang="en-US"/>
           </a:p>
@@ -8349,7 +8349,7 @@
           <a:p>
             <a:fld id="{6B1A836D-86EC-F749-99CE-265C2FAB305D}" type="datetime1">
               <a:rPr lang="en-US" smtClean="0"/>
-              <a:t>10/18/16</a:t>
+              <a:t>10/19/16</a:t>
             </a:fld>
             <a:endParaRPr lang="en-US"/>
           </a:p>
@@ -9375,7 +9375,7 @@
           <a:p>
             <a:fld id="{BA476F7A-9E18-9E41-BD0F-996FD9C705A8}" type="datetime1">
               <a:rPr lang="en-US" smtClean="0"/>
-              <a:t>10/18/16</a:t>
+              <a:t>10/19/16</a:t>
             </a:fld>
             <a:endParaRPr lang="en-US"/>
           </a:p>
@@ -9638,7 +9638,7 @@
           <a:p>
             <a:fld id="{EDE26A61-5577-6D46-9A0B-ED29078B60B2}" type="datetime1">
               <a:rPr lang="en-US" smtClean="0"/>
-              <a:t>10/18/16</a:t>
+              <a:t>10/19/16</a:t>
             </a:fld>
             <a:endParaRPr lang="en-US"/>
           </a:p>
@@ -9935,7 +9935,7 @@
           <a:p>
             <a:fld id="{F2CEFA95-14EF-2B46-8634-0B274DB37B93}" type="datetime1">
               <a:rPr lang="en-US" smtClean="0"/>
-              <a:t>10/18/16</a:t>
+              <a:t>10/19/16</a:t>
             </a:fld>
             <a:endParaRPr lang="en-US"/>
           </a:p>
@@ -10383,7 +10383,7 @@
           <a:p>
             <a:fld id="{8C570174-6825-7D42-B1F1-C6720C7583AD}" type="datetime1">
               <a:rPr lang="en-US" smtClean="0"/>
-              <a:t>10/18/16</a:t>
+              <a:t>10/19/16</a:t>
             </a:fld>
             <a:endParaRPr lang="en-US"/>
           </a:p>
@@ -10505,7 +10505,7 @@
           <a:p>
             <a:fld id="{B1DA150C-2FAF-7549-B604-83F2E9B0E940}" type="datetime1">
               <a:rPr lang="en-US" smtClean="0"/>
-              <a:t>10/18/16</a:t>
+              <a:t>10/19/16</a:t>
             </a:fld>
             <a:endParaRPr lang="en-US"/>
           </a:p>
@@ -10802,7 +10802,7 @@
           <a:p>
             <a:fld id="{1749DB44-8835-0F42-8105-27B8F3FCA8AA}" type="datetime1">
               <a:rPr lang="en-US" smtClean="0"/>
-              <a:t>10/18/16</a:t>
+              <a:t>10/19/16</a:t>
             </a:fld>
             <a:endParaRPr lang="en-US"/>
           </a:p>
@@ -10901,7 +10901,7 @@
           <a:p>
             <a:fld id="{33E126EC-E139-1E43-B8AB-E007346D3A74}" type="datetime1">
               <a:rPr lang="en-US" smtClean="0"/>
-              <a:t>10/18/16</a:t>
+              <a:t>10/19/16</a:t>
             </a:fld>
             <a:endParaRPr lang="en-US"/>
           </a:p>
@@ -11152,7 +11152,7 @@
           <a:p>
             <a:fld id="{C565D44A-3C7A-0B49-ADBA-25B60852B9A8}" type="datetime1">
               <a:rPr lang="en-US" smtClean="0"/>
-              <a:t>10/18/16</a:t>
+              <a:t>10/19/16</a:t>
             </a:fld>
             <a:endParaRPr lang="en-US"/>
           </a:p>
@@ -11455,7 +11455,7 @@
           <a:p>
             <a:fld id="{3CBF90F0-D749-3745-AC04-1A8BBB10A221}" type="datetime1">
               <a:rPr lang="en-US" smtClean="0"/>
-              <a:t>10/18/16</a:t>
+              <a:t>10/19/16</a:t>
             </a:fld>
             <a:endParaRPr lang="en-US"/>
           </a:p>
@@ -11717,7 +11717,7 @@
           <a:p>
             <a:fld id="{98B33AA4-3A31-8340-9A32-8797386CA51F}" type="datetime1">
               <a:rPr lang="en-US" smtClean="0"/>
-              <a:t>10/18/16</a:t>
+              <a:t>10/19/16</a:t>
             </a:fld>
             <a:endParaRPr lang="en-US"/>
           </a:p>
@@ -11901,7 +11901,7 @@
           <a:p>
             <a:fld id="{3A18DB40-93EE-F246-A801-A3DDE29B59F8}" type="datetime1">
               <a:rPr lang="en-US" smtClean="0"/>
-              <a:t>10/18/16</a:t>
+              <a:t>10/19/16</a:t>
             </a:fld>
             <a:endParaRPr lang="en-US"/>
           </a:p>
@@ -12118,7 +12118,7 @@
           <a:p>
             <a:fld id="{6A46F6FA-972C-A546-883E-E3633EC1BE4F}" type="datetime1">
               <a:rPr lang="en-US" smtClean="0"/>
-              <a:t>10/18/16</a:t>
+              <a:t>10/19/16</a:t>
             </a:fld>
             <a:endParaRPr lang="en-US"/>
           </a:p>
@@ -12337,7 +12337,7 @@
           <a:noFill/>
           <a:extLst>
             <a:ext uri="{909E8E84-426E-40dd-AFC4-6F175D3DCCD1}">
-              <a14:hiddenFill xmlns:a14="http://schemas.microsoft.com/office/drawing/2010/main" xmlns="">
+              <a14:hiddenFill xmlns="" xmlns:a14="http://schemas.microsoft.com/office/drawing/2010/main">
                 <a:solidFill>
                   <a:srgbClr val="FFFFFF"/>
                 </a:solidFill>
@@ -13389,7 +13389,7 @@
           <a:p>
             <a:fld id="{2DE07CE9-894B-A841-8CD8-261ACF046BC4}" type="datetime1">
               <a:rPr lang="en-US" smtClean="0"/>
-              <a:t>10/18/16</a:t>
+              <a:t>10/19/16</a:t>
             </a:fld>
             <a:endParaRPr lang="en-US"/>
           </a:p>
@@ -13662,7 +13662,7 @@
           <a:p>
             <a:fld id="{A3E3579A-DDAE-4E43-B969-A7DFBA90DC0C}" type="datetime1">
               <a:rPr lang="en-US" smtClean="0"/>
-              <a:t>10/18/16</a:t>
+              <a:t>10/19/16</a:t>
             </a:fld>
             <a:endParaRPr lang="en-US"/>
           </a:p>
@@ -13967,7 +13967,7 @@
           <a:p>
             <a:fld id="{7F976FBE-C4A5-EA44-8352-9CCF845C7A6C}" type="datetime1">
               <a:rPr lang="en-US" smtClean="0"/>
-              <a:t>10/18/16</a:t>
+              <a:t>10/19/16</a:t>
             </a:fld>
             <a:endParaRPr lang="en-US"/>
           </a:p>
@@ -14430,7 +14430,7 @@
           <a:p>
             <a:fld id="{5BA189DE-22B8-0845-9EC7-37D91619305F}" type="datetime1">
               <a:rPr lang="en-US" smtClean="0"/>
-              <a:t>10/18/16</a:t>
+              <a:t>10/19/16</a:t>
             </a:fld>
             <a:endParaRPr lang="en-US"/>
           </a:p>
@@ -14893,7 +14893,7 @@
           <a:p>
             <a:fld id="{C5AB3096-8F88-C84A-BBDF-1411467E2325}" type="datetime1">
               <a:rPr lang="en-US" smtClean="0"/>
-              <a:t>10/18/16</a:t>
+              <a:t>10/19/16</a:t>
             </a:fld>
             <a:endParaRPr lang="en-US"/>
           </a:p>
@@ -15015,7 +15015,7 @@
           <a:p>
             <a:fld id="{EBE1EDB1-F22B-6D4C-9FD2-DF6A6E6FDA46}" type="datetime1">
               <a:rPr lang="en-US" smtClean="0"/>
-              <a:t>10/18/16</a:t>
+              <a:t>10/19/16</a:t>
             </a:fld>
             <a:endParaRPr lang="en-US"/>
           </a:p>
@@ -15129,7 +15129,7 @@
           <a:p>
             <a:fld id="{E74EC89C-EC5A-ED49-9606-7F9DA7E955CA}" type="datetime1">
               <a:rPr lang="en-US" smtClean="0"/>
-              <a:t>10/18/16</a:t>
+              <a:t>10/19/16</a:t>
             </a:fld>
             <a:endParaRPr lang="en-US"/>
           </a:p>
@@ -15388,7 +15388,7 @@
           <a:p>
             <a:fld id="{7B8E4C0E-CEA1-1942-80EB-DF0F37F65261}" type="datetime1">
               <a:rPr lang="en-US" smtClean="0"/>
-              <a:t>10/18/16</a:t>
+              <a:t>10/19/16</a:t>
             </a:fld>
             <a:endParaRPr lang="en-US"/>
           </a:p>
@@ -15699,7 +15699,7 @@
           <a:p>
             <a:fld id="{C9050912-F988-004A-A54C-6618D6B1FA18}" type="datetime1">
               <a:rPr lang="en-US" smtClean="0"/>
-              <a:t>10/18/16</a:t>
+              <a:t>10/19/16</a:t>
             </a:fld>
             <a:endParaRPr lang="en-US"/>
           </a:p>
@@ -15969,7 +15969,7 @@
           <a:p>
             <a:fld id="{081803CC-74C6-7C4F-AD8D-A81442763901}" type="datetime1">
               <a:rPr lang="en-US" smtClean="0"/>
-              <a:t>10/18/16</a:t>
+              <a:t>10/19/16</a:t>
             </a:fld>
             <a:endParaRPr lang="en-US"/>
           </a:p>
@@ -16161,7 +16161,7 @@
           <a:p>
             <a:fld id="{31969BF2-C5E7-1D46-AEE3-8CDD643160C2}" type="datetime1">
               <a:rPr lang="en-US" smtClean="0"/>
-              <a:t>10/18/16</a:t>
+              <a:t>10/19/16</a:t>
             </a:fld>
             <a:endParaRPr lang="en-US"/>
           </a:p>
@@ -16365,7 +16365,7 @@
           <a:p>
             <a:fld id="{42BA678B-8C2E-1540-9586-B8EA848F7C14}" type="datetime1">
               <a:rPr lang="en-US" smtClean="0"/>
-              <a:t>10/18/16</a:t>
+              <a:t>10/19/16</a:t>
             </a:fld>
             <a:endParaRPr lang="en-US"/>
           </a:p>
@@ -16539,7 +16539,7 @@
           <a:p>
             <a:fld id="{256FDA91-EF65-B245-BCFB-A220B9C24F65}" type="datetime1">
               <a:rPr lang="en-US" smtClean="0"/>
-              <a:t>10/18/16</a:t>
+              <a:t>10/19/16</a:t>
             </a:fld>
             <a:endParaRPr lang="en-US"/>
           </a:p>
@@ -16789,7 +16789,7 @@
           <a:p>
             <a:fld id="{F9E038C2-9371-D54B-8ED3-03DA5A06DEC3}" type="datetime1">
               <a:rPr lang="en-US" smtClean="0"/>
-              <a:t>10/18/16</a:t>
+              <a:t>10/19/16</a:t>
             </a:fld>
             <a:endParaRPr lang="en-US"/>
           </a:p>
@@ -17025,7 +17025,7 @@
           <a:p>
             <a:fld id="{75780184-19FD-474D-9D5A-7E8A6AADB4AB}" type="datetime1">
               <a:rPr lang="en-US" smtClean="0"/>
-              <a:t>10/18/16</a:t>
+              <a:t>10/19/16</a:t>
             </a:fld>
             <a:endParaRPr lang="en-US"/>
           </a:p>
@@ -17147,7 +17147,7 @@
           <a:p>
             <a:fld id="{B58E14B6-273C-5343-9D6F-1AB54B035EDF}" type="datetime1">
               <a:rPr lang="en-US" smtClean="0"/>
-              <a:t>10/18/16</a:t>
+              <a:t>10/19/16</a:t>
             </a:fld>
             <a:endParaRPr lang="en-US"/>
           </a:p>
@@ -17518,7 +17518,7 @@
           <a:p>
             <a:fld id="{8784F740-69F8-FF4F-AD0A-578F19F76FE4}" type="datetime1">
               <a:rPr lang="en-US" smtClean="0"/>
-              <a:t>10/18/16</a:t>
+              <a:t>10/19/16</a:t>
             </a:fld>
             <a:endParaRPr lang="en-US"/>
           </a:p>
@@ -17640,7 +17640,7 @@
           <a:p>
             <a:fld id="{1C8F529B-D2FD-B84C-81DC-59899FD393DE}" type="datetime1">
               <a:rPr lang="en-US" smtClean="0"/>
-              <a:t>10/18/16</a:t>
+              <a:t>10/19/16</a:t>
             </a:fld>
             <a:endParaRPr lang="en-US"/>
           </a:p>
@@ -17739,7 +17739,7 @@
           <a:p>
             <a:fld id="{CB7656A5-BC9B-9D43-9B5F-2C11DF4D04A4}" type="datetime1">
               <a:rPr lang="en-US" smtClean="0"/>
-              <a:t>10/18/16</a:t>
+              <a:t>10/19/16</a:t>
             </a:fld>
             <a:endParaRPr lang="en-US"/>
           </a:p>
@@ -18020,7 +18020,7 @@
           <a:p>
             <a:fld id="{E0CA8F05-ECDF-664D-81C1-7E86AC0BB0AE}" type="datetime1">
               <a:rPr lang="en-US" smtClean="0"/>
-              <a:t>10/18/16</a:t>
+              <a:t>10/19/16</a:t>
             </a:fld>
             <a:endParaRPr lang="en-US"/>
           </a:p>
@@ -18281,7 +18281,7 @@
           <a:p>
             <a:fld id="{2DA4D887-9503-674E-BE82-83C56B3BFA62}" type="datetime1">
               <a:rPr lang="en-US" smtClean="0"/>
-              <a:t>10/18/16</a:t>
+              <a:t>10/19/16</a:t>
             </a:fld>
             <a:endParaRPr lang="en-US"/>
           </a:p>
@@ -18455,7 +18455,7 @@
           <a:p>
             <a:fld id="{C23F7296-5E2B-2D49-9997-03B2E677912D}" type="datetime1">
               <a:rPr lang="en-US" smtClean="0"/>
-              <a:t>10/18/16</a:t>
+              <a:t>10/19/16</a:t>
             </a:fld>
             <a:endParaRPr lang="en-US"/>
           </a:p>
@@ -18639,7 +18639,7 @@
           <a:p>
             <a:fld id="{34C927BB-2F1D-1B46-87F4-9D56ACF67290}" type="datetime1">
               <a:rPr lang="en-US" smtClean="0"/>
-              <a:t>10/18/16</a:t>
+              <a:t>10/19/16</a:t>
             </a:fld>
             <a:endParaRPr lang="en-US"/>
           </a:p>
@@ -18738,7 +18738,7 @@
           <a:p>
             <a:fld id="{F9BBF52E-5F4E-DB47-A695-B7AC34943325}" type="datetime1">
               <a:rPr lang="en-US" smtClean="0"/>
-              <a:t>10/18/16</a:t>
+              <a:t>10/19/16</a:t>
             </a:fld>
             <a:endParaRPr lang="en-US"/>
           </a:p>
@@ -18989,7 +18989,7 @@
           <a:p>
             <a:fld id="{6978ED6B-2251-1942-9E67-79B8705BBBC1}" type="datetime1">
               <a:rPr lang="en-US" smtClean="0"/>
-              <a:t>10/18/16</a:t>
+              <a:t>10/19/16</a:t>
             </a:fld>
             <a:endParaRPr lang="en-US"/>
           </a:p>
@@ -19292,7 +19292,7 @@
           <a:p>
             <a:fld id="{1F440DAE-8A6C-4F43-96CB-F525709CCAA3}" type="datetime1">
               <a:rPr lang="en-US" smtClean="0"/>
-              <a:t>10/18/16</a:t>
+              <a:t>10/19/16</a:t>
             </a:fld>
             <a:endParaRPr lang="en-US"/>
           </a:p>
@@ -19595,7 +19595,7 @@
           <a:p>
             <a:fld id="{B8C93E34-5C7A-0F43-9E4F-06E6760709E1}" type="datetime1">
               <a:rPr lang="en-US" smtClean="0"/>
-              <a:t>10/18/16</a:t>
+              <a:t>10/19/16</a:t>
             </a:fld>
             <a:endParaRPr lang="en-US"/>
           </a:p>
@@ -20548,7 +20548,7 @@
           <a:p>
             <a:fld id="{2CAAFB42-3480-7A47-886A-33C45F53FB96}" type="datetime1">
               <a:rPr lang="en-US" smtClean="0"/>
-              <a:t>10/18/16</a:t>
+              <a:t>10/19/16</a:t>
             </a:fld>
             <a:endParaRPr lang="en-US"/>
           </a:p>
@@ -21616,7 +21616,7 @@
           <a:p>
             <a:fld id="{4986EEDC-3481-AF46-B982-85D97F34AA35}" type="datetime1">
               <a:rPr lang="en-US" smtClean="0"/>
-              <a:t>10/18/16</a:t>
+              <a:t>10/19/16</a:t>
             </a:fld>
             <a:endParaRPr lang="en-US"/>
           </a:p>
@@ -22159,7 +22159,7 @@
           <a:p>
             <a:fld id="{CFC19486-466B-D544-A70B-F010200A9085}" type="datetime1">
               <a:rPr lang="en-US" smtClean="0"/>
-              <a:t>10/18/16</a:t>
+              <a:t>10/19/16</a:t>
             </a:fld>
             <a:endParaRPr lang="en-US"/>
           </a:p>
@@ -23529,7 +23529,7 @@
           <a:p>
             <a:fld id="{88B89251-5A3E-7A40-A44E-652B62FBA553}" type="datetime1">
               <a:rPr lang="en-US" smtClean="0"/>
-              <a:t>10/18/16</a:t>
+              <a:t>10/19/16</a:t>
             </a:fld>
             <a:endParaRPr lang="en-US"/>
           </a:p>
@@ -24619,7 +24619,7 @@
           <a:p>
             <a:fld id="{8C91D27B-C120-484F-80BE-82C95304C4BB}" type="datetime1">
               <a:rPr lang="en-US" smtClean="0"/>
-              <a:t>10/18/16</a:t>
+              <a:t>10/19/16</a:t>
             </a:fld>
             <a:endParaRPr lang="en-US"/>
           </a:p>
@@ -26361,8 +26361,54 @@
             </a:pPr>
             <a:r>
               <a:rPr lang="en-US" dirty="0" smtClean="0"/>
-              <a:t>LEGO is expected to release an update to the EV3 programming software soon with a bug fix (not yet released as of 10/17/2016)</a:t>
-            </a:r>
+              <a:t>LEGO </a:t>
+            </a:r>
+            <a:r>
+              <a:rPr lang="en-US" dirty="0" smtClean="0"/>
+              <a:t>has </a:t>
+            </a:r>
+            <a:r>
+              <a:rPr lang="en-US" dirty="0" smtClean="0"/>
+              <a:t>released </a:t>
+            </a:r>
+            <a:r>
+              <a:rPr lang="en-US" dirty="0" smtClean="0"/>
+              <a:t>an update to the EV3 programming </a:t>
+            </a:r>
+            <a:r>
+              <a:rPr lang="en-US" dirty="0" smtClean="0"/>
+              <a:t>software </a:t>
+            </a:r>
+            <a:r>
+              <a:rPr lang="en-US" dirty="0" smtClean="0"/>
+              <a:t>with a bug fix </a:t>
+            </a:r>
+            <a:endParaRPr lang="en-US" dirty="0" smtClean="0"/>
+          </a:p>
+          <a:p>
+            <a:pPr marL="800100" lvl="1" indent="-342900">
+              <a:buFont typeface="Arial" charset="0"/>
+              <a:buChar char="•"/>
+            </a:pPr>
+            <a:r>
+              <a:rPr lang="en-US" dirty="0" smtClean="0"/>
+              <a:t>As of of 10/19/2016</a:t>
+            </a:r>
+            <a:r>
+              <a:rPr lang="en-US" dirty="0" smtClean="0"/>
+              <a:t>, Retail V. 1.2.2 is available for download</a:t>
+            </a:r>
+          </a:p>
+          <a:p>
+            <a:pPr marL="800100" lvl="1" indent="-342900">
+              <a:buFont typeface="Arial" charset="0"/>
+              <a:buChar char="•"/>
+            </a:pPr>
+            <a:r>
+              <a:rPr lang="en-US" dirty="0" smtClean="0"/>
+              <a:t>Edu version of the software coming soon</a:t>
+            </a:r>
+            <a:endParaRPr lang="en-US" dirty="0" smtClean="0"/>
           </a:p>
           <a:p>
             <a:pPr marL="342900" indent="-342900">
@@ -26370,9 +26416,34 @@
               <a:buChar char="•"/>
             </a:pPr>
             <a:r>
+              <a:rPr lang="en-US" dirty="0"/>
+              <a:t>D</a:t>
+            </a:r>
+            <a:r>
               <a:rPr lang="en-US" dirty="0" smtClean="0"/>
-              <a:t>When this update is released, you should download and install it on your PC.</a:t>
-            </a:r>
+              <a:t>ownload </a:t>
+            </a:r>
+            <a:r>
+              <a:rPr lang="en-US" dirty="0" smtClean="0"/>
+              <a:t>and install </a:t>
+            </a:r>
+            <a:r>
+              <a:rPr lang="en-US" dirty="0" smtClean="0"/>
+              <a:t>the update </a:t>
+            </a:r>
+            <a:r>
+              <a:rPr lang="en-US" dirty="0" smtClean="0"/>
+              <a:t>on </a:t>
+            </a:r>
+            <a:r>
+              <a:rPr lang="en-US" dirty="0" smtClean="0"/>
+              <a:t>your </a:t>
+            </a:r>
+            <a:r>
+              <a:rPr lang="en-US" dirty="0" smtClean="0"/>
+              <a:t>PC</a:t>
+            </a:r>
+            <a:endParaRPr lang="en-US" dirty="0" smtClean="0"/>
           </a:p>
           <a:p>
             <a:pPr marL="342900" indent="-342900">
@@ -26693,11 +26764,15 @@
             </a:r>
             <a:r>
               <a:rPr lang="en-US" sz="3200" dirty="0"/>
-              <a:t>the community </a:t>
+              <a:t>the </a:t>
             </a:r>
             <a:r>
               <a:rPr lang="en-US" sz="3200" dirty="0" smtClean="0"/>
-              <a:t>and LEGO who </a:t>
+              <a:t>community, National Instruments, and </a:t>
+            </a:r>
+            <a:r>
+              <a:rPr lang="en-US" sz="3200" dirty="0" smtClean="0"/>
+              <a:t>LEGO who </a:t>
             </a:r>
             <a:r>
               <a:rPr lang="en-US" sz="3200" dirty="0"/>
@@ -26937,7 +27012,7 @@
           <a:effectLst/>
           <a:extLst>
             <a:ext uri="{91240B29-F687-4f45-9708-019B960494DF}">
-              <a14:hiddenLine xmlns:a14="http://schemas.microsoft.com/office/drawing/2010/main" xmlns="" w="9525">
+              <a14:hiddenLine xmlns="" xmlns:a14="http://schemas.microsoft.com/office/drawing/2010/main" w="9525">
                 <a:solidFill>
                   <a:schemeClr val="tx1"/>
                 </a:solidFill>
@@ -26947,7 +27022,7 @@
               </a14:hiddenLine>
             </a:ext>
             <a:ext uri="{AF507438-7753-43e0-B8FC-AC1667EBCBE1}">
-              <a14:hiddenEffects xmlns:a14="http://schemas.microsoft.com/office/drawing/2010/main" xmlns="">
+              <a14:hiddenEffects xmlns="" xmlns:a14="http://schemas.microsoft.com/office/drawing/2010/main">
                 <a:effectLst>
                   <a:outerShdw dist="35921" dir="2700000" algn="ctr" rotWithShape="0">
                     <a:schemeClr val="bg2"/>
@@ -27300,7 +27375,7 @@
           <a:noFill/>
           <a:extLst>
             <a:ext uri="{909E8E84-426E-40dd-AFC4-6F175D3DCCD1}">
-              <a14:hiddenFill xmlns:a14="http://schemas.microsoft.com/office/drawing/2010/main" xmlns="">
+              <a14:hiddenFill xmlns="" xmlns:a14="http://schemas.microsoft.com/office/drawing/2010/main">
                 <a:solidFill>
                   <a:srgbClr val="FFFFFF"/>
                 </a:solidFill>
@@ -27400,15 +27475,7 @@
             </a:pPr>
             <a:r>
               <a:rPr lang="en-US" dirty="0" smtClean="0"/>
-              <a:t>We first encountered the “VM </a:t>
-            </a:r>
-            <a:r>
-              <a:rPr lang="en-US" dirty="0" smtClean="0"/>
-              <a:t>Program Instruction </a:t>
-            </a:r>
-            <a:r>
-              <a:rPr lang="en-US" dirty="0" smtClean="0"/>
-              <a:t>Break” error on our brick during the fall of 2013 during the Nature’s Fury FLL season. We searched online for any documentation about this error, but could not find any. We were the first to report this problem on the FLL Forum.</a:t>
+              <a:t>We first encountered the “VM Program Instruction Break” error on our brick during the fall of 2013 during the Nature’s Fury FLL season. We searched online for any documentation about this error, but could not find any. We were the first to report this problem on the FLL Forum.</a:t>
             </a:r>
           </a:p>
           <a:p>
@@ -27571,15 +27638,7 @@
             </a:pPr>
             <a:r>
               <a:rPr lang="en-US" sz="1800" dirty="0" smtClean="0"/>
-              <a:t>The robot stops in the middle of a program and displays “</a:t>
-            </a:r>
-            <a:r>
-              <a:rPr lang="en-US" sz="1800" dirty="0" smtClean="0"/>
-              <a:t>VM Program </a:t>
-            </a:r>
-            <a:r>
-              <a:rPr lang="en-US" sz="1800" dirty="0" smtClean="0"/>
-              <a:t>Instruction Break” on the screen</a:t>
+              <a:t>The robot stops in the middle of a program and displays “VM Program Instruction Break” on the screen</a:t>
             </a:r>
           </a:p>
           <a:p>
@@ -29024,7 +29083,15 @@
             </a:pPr>
             <a:r>
               <a:rPr lang="en-US" sz="1800" dirty="0" smtClean="0"/>
-              <a:t>Normally, your EV3 executes a sequences of instructions in sequential order</a:t>
+              <a:t>Normally, your EV3 executes </a:t>
+            </a:r>
+            <a:r>
+              <a:rPr lang="en-US" sz="1800" dirty="0" smtClean="0"/>
+              <a:t>instructions </a:t>
+            </a:r>
+            <a:r>
+              <a:rPr lang="en-US" sz="1800" dirty="0" smtClean="0"/>
+              <a:t>in sequential order</a:t>
             </a:r>
           </a:p>
           <a:p>
@@ -29384,11 +29451,7 @@
             <a:pPr algn="ctr"/>
             <a:r>
               <a:rPr lang="en-US" sz="1600" dirty="0" smtClean="0"/>
-              <a:t>Try </a:t>
-            </a:r>
-            <a:r>
-              <a:rPr lang="en-US" sz="1600" dirty="0" smtClean="0"/>
-              <a:t>again.</a:t>
+              <a:t>Try again.</a:t>
             </a:r>
             <a:endParaRPr lang="en-US" sz="1600" dirty="0"/>
           </a:p>
@@ -29435,11 +29498,7 @@
             <a:pPr algn="ctr"/>
             <a:r>
               <a:rPr lang="en-US" sz="1600" dirty="0" smtClean="0"/>
-              <a:t>Stop all the </a:t>
-            </a:r>
-            <a:r>
-              <a:rPr lang="en-US" sz="1600" dirty="0" smtClean="0"/>
-              <a:t>motors.</a:t>
+              <a:t>Stop all the motors.</a:t>
             </a:r>
             <a:endParaRPr lang="en-US" sz="1600" dirty="0"/>
           </a:p>
@@ -29808,11 +29867,7 @@
             <a:pPr algn="ctr"/>
             <a:r>
               <a:rPr lang="en-US" sz="1600" dirty="0" smtClean="0"/>
-              <a:t>Try </a:t>
-            </a:r>
-            <a:r>
-              <a:rPr lang="en-US" sz="1600" dirty="0" smtClean="0"/>
-              <a:t>again.</a:t>
+              <a:t>Try again.</a:t>
             </a:r>
             <a:endParaRPr lang="en-US" sz="1600" dirty="0"/>
           </a:p>
@@ -29859,11 +29914,7 @@
             <a:pPr algn="ctr"/>
             <a:r>
               <a:rPr lang="en-US" sz="1600" dirty="0" smtClean="0"/>
-              <a:t>Stop all the </a:t>
-            </a:r>
-            <a:r>
-              <a:rPr lang="en-US" sz="1600" dirty="0" smtClean="0"/>
-              <a:t>motors.</a:t>
+              <a:t>Stop all the motors.</a:t>
             </a:r>
             <a:endParaRPr lang="en-US" sz="1600" dirty="0"/>
           </a:p>

</xml_diff>

<commit_message>
Software available in Branching error lesson updated
</commit_message>
<xml_diff>
--- a/translations/en-us/beyond/BranchingError.pptx
+++ b/translations/en-us/beyond/BranchingError.pptx
@@ -230,7 +230,7 @@
           <a:p>
             <a:fld id="{E354B44E-40A3-0E46-B16A-9BF1250A248B}" type="datetimeFigureOut">
               <a:rPr lang="en-US" smtClean="0"/>
-              <a:t>10/19/16</a:t>
+              <a:t>10/25/16</a:t>
             </a:fld>
             <a:endParaRPr lang="en-US"/>
           </a:p>
@@ -396,7 +396,7 @@
           <a:p>
             <a:fld id="{C86AD16C-2DB4-6642-BAD4-9ED973A087A0}" type="datetimeFigureOut">
               <a:rPr lang="en-US" smtClean="0"/>
-              <a:t>10/19/16</a:t>
+              <a:t>10/25/16</a:t>
             </a:fld>
             <a:endParaRPr lang="en-US"/>
           </a:p>
@@ -730,7 +730,7 @@
           <a:p>
             <a:fld id="{1E5BF589-3978-3C45-966B-D7B7A71F2A02}" type="slidenum">
               <a:rPr lang="en-US" smtClean="0"/>
-              <a:t>3</a:t>
+              <a:t>1</a:t>
             </a:fld>
             <a:endParaRPr lang="en-US"/>
           </a:p>
@@ -739,7 +739,7 @@
     </p:spTree>
     <p:extLst>
       <p:ext uri="{BB962C8B-B14F-4D97-AF65-F5344CB8AC3E}">
-        <p14:creationId xmlns:p14="http://schemas.microsoft.com/office/powerpoint/2010/main" val="1495297923"/>
+        <p14:creationId xmlns:p14="http://schemas.microsoft.com/office/powerpoint/2010/main" val="662679372"/>
       </p:ext>
     </p:extLst>
   </p:cSld>
@@ -814,6 +814,90 @@
           <a:p>
             <a:fld id="{1E5BF589-3978-3C45-966B-D7B7A71F2A02}" type="slidenum">
               <a:rPr lang="en-US" smtClean="0"/>
+              <a:t>3</a:t>
+            </a:fld>
+            <a:endParaRPr lang="en-US"/>
+          </a:p>
+        </p:txBody>
+      </p:sp>
+    </p:spTree>
+    <p:extLst>
+      <p:ext uri="{BB962C8B-B14F-4D97-AF65-F5344CB8AC3E}">
+        <p14:creationId xmlns:p14="http://schemas.microsoft.com/office/powerpoint/2010/main" val="1495297923"/>
+      </p:ext>
+    </p:extLst>
+  </p:cSld>
+  <p:clrMapOvr>
+    <a:masterClrMapping/>
+  </p:clrMapOvr>
+</p:notes>
+</file>
+
+<file path=ppt/notesSlides/notesSlide3.xml><?xml version="1.0" encoding="utf-8"?>
+<p:notes xmlns:a="http://schemas.openxmlformats.org/drawingml/2006/main" xmlns:r="http://schemas.openxmlformats.org/officeDocument/2006/relationships" xmlns:p="http://schemas.openxmlformats.org/presentationml/2006/main">
+  <p:cSld>
+    <p:spTree>
+      <p:nvGrpSpPr>
+        <p:cNvPr id="1" name=""/>
+        <p:cNvGrpSpPr/>
+        <p:nvPr/>
+      </p:nvGrpSpPr>
+      <p:grpSpPr>
+        <a:xfrm>
+          <a:off x="0" y="0"/>
+          <a:ext cx="0" cy="0"/>
+          <a:chOff x="0" y="0"/>
+          <a:chExt cx="0" cy="0"/>
+        </a:xfrm>
+      </p:grpSpPr>
+      <p:sp>
+        <p:nvSpPr>
+          <p:cNvPr id="2" name="Slide Image Placeholder 1"/>
+          <p:cNvSpPr>
+            <a:spLocks noGrp="1" noRot="1" noChangeAspect="1"/>
+          </p:cNvSpPr>
+          <p:nvPr>
+            <p:ph type="sldImg"/>
+          </p:nvPr>
+        </p:nvSpPr>
+        <p:spPr/>
+      </p:sp>
+      <p:sp>
+        <p:nvSpPr>
+          <p:cNvPr id="3" name="Notes Placeholder 2"/>
+          <p:cNvSpPr>
+            <a:spLocks noGrp="1"/>
+          </p:cNvSpPr>
+          <p:nvPr>
+            <p:ph type="body" idx="1"/>
+          </p:nvPr>
+        </p:nvSpPr>
+        <p:spPr/>
+        <p:txBody>
+          <a:bodyPr/>
+          <a:lstStyle/>
+          <a:p>
+            <a:endParaRPr lang="en-US"/>
+          </a:p>
+        </p:txBody>
+      </p:sp>
+      <p:sp>
+        <p:nvSpPr>
+          <p:cNvPr id="4" name="Slide Number Placeholder 3"/>
+          <p:cNvSpPr>
+            <a:spLocks noGrp="1"/>
+          </p:cNvSpPr>
+          <p:nvPr>
+            <p:ph type="sldNum" sz="quarter" idx="10"/>
+          </p:nvPr>
+        </p:nvSpPr>
+        <p:spPr/>
+        <p:txBody>
+          <a:bodyPr/>
+          <a:lstStyle/>
+          <a:p>
+            <a:fld id="{1E5BF589-3978-3C45-966B-D7B7A71F2A02}" type="slidenum">
+              <a:rPr lang="en-US" smtClean="0"/>
               <a:t>11</a:t>
             </a:fld>
             <a:endParaRPr lang="en-US"/>
@@ -833,7 +917,7 @@
 </p:notes>
 </file>
 
-<file path=ppt/notesSlides/notesSlide3.xml><?xml version="1.0" encoding="utf-8"?>
+<file path=ppt/notesSlides/notesSlide4.xml><?xml version="1.0" encoding="utf-8"?>
 <p:notes xmlns:a="http://schemas.openxmlformats.org/drawingml/2006/main" xmlns:r="http://schemas.openxmlformats.org/officeDocument/2006/relationships" xmlns:p="http://schemas.openxmlformats.org/presentationml/2006/main">
   <p:cSld>
     <p:spTree>
@@ -1108,9 +1192,9 @@
           <a:bodyPr/>
           <a:lstStyle/>
           <a:p>
-            <a:fld id="{FD05E093-ED86-2146-9551-BA44ED13EC02}" type="datetime1">
-              <a:rPr lang="en-US" smtClean="0"/>
-              <a:t>10/19/16</a:t>
+            <a:fld id="{B1675704-DB52-3842-BBCE-E1D34BFEEE09}" type="datetime1">
+              <a:rPr lang="en-US" smtClean="0"/>
+              <a:t>10/25/16</a:t>
             </a:fld>
             <a:endParaRPr lang="en-US"/>
           </a:p>
@@ -1133,7 +1217,7 @@
           <a:p>
             <a:r>
               <a:rPr lang="sk-SK" smtClean="0"/>
-              <a:t>© 2016 EV3Lessons.com, Last Edit 10/18/2016</a:t>
+              <a:t>© 2016 EV3Lessons.com, Last Edit 10/25/2016</a:t>
             </a:r>
             <a:endParaRPr lang="en-US"/>
           </a:p>
@@ -1707,9 +1791,9 @@
           <a:bodyPr/>
           <a:lstStyle/>
           <a:p>
-            <a:fld id="{D7BAC967-79F1-3045-AC00-BDD8144DE932}" type="datetime1">
-              <a:rPr lang="en-US" smtClean="0"/>
-              <a:t>10/19/16</a:t>
+            <a:fld id="{C349341B-7ECA-C445-830A-BB829DDCCED0}" type="datetime1">
+              <a:rPr lang="en-US" smtClean="0"/>
+              <a:t>10/25/16</a:t>
             </a:fld>
             <a:endParaRPr lang="en-US"/>
           </a:p>
@@ -1732,7 +1816,7 @@
           <a:p>
             <a:r>
               <a:rPr lang="sk-SK" smtClean="0"/>
-              <a:t>© 2016 EV3Lessons.com, Last Edit 10/18/2016</a:t>
+              <a:t>© 2016 EV3Lessons.com, Last Edit 10/25/2016</a:t>
             </a:r>
             <a:endParaRPr lang="en-US"/>
           </a:p>
@@ -1891,9 +1975,9 @@
           <a:bodyPr/>
           <a:lstStyle/>
           <a:p>
-            <a:fld id="{166BB710-88B0-B647-99DF-975987E001A2}" type="datetime1">
-              <a:rPr lang="en-US" smtClean="0"/>
-              <a:t>10/19/16</a:t>
+            <a:fld id="{3EB95306-B051-4042-BF25-6AE0EB453531}" type="datetime1">
+              <a:rPr lang="en-US" smtClean="0"/>
+              <a:t>10/25/16</a:t>
             </a:fld>
             <a:endParaRPr lang="en-US"/>
           </a:p>
@@ -1916,7 +2000,7 @@
           <a:p>
             <a:r>
               <a:rPr lang="sk-SK" smtClean="0"/>
-              <a:t>© 2016 EV3Lessons.com, Last Edit 10/18/2016</a:t>
+              <a:t>© 2016 EV3Lessons.com, Last Edit 10/25/2016</a:t>
             </a:r>
             <a:endParaRPr lang="en-US"/>
           </a:p>
@@ -2108,9 +2192,9 @@
           <a:bodyPr/>
           <a:lstStyle/>
           <a:p>
-            <a:fld id="{CD92D860-516E-034D-9467-249867CD21EC}" type="datetime1">
-              <a:rPr lang="en-US" smtClean="0"/>
-              <a:t>10/19/16</a:t>
+            <a:fld id="{5D9DFB19-2C33-2C42-B529-1006C07247F9}" type="datetime1">
+              <a:rPr lang="en-US" smtClean="0"/>
+              <a:t>10/25/16</a:t>
             </a:fld>
             <a:endParaRPr lang="en-US"/>
           </a:p>
@@ -2138,7 +2222,7 @@
           <a:p>
             <a:r>
               <a:rPr lang="sk-SK" smtClean="0"/>
-              <a:t>© 2016 EV3Lessons.com, Last Edit 10/18/2016</a:t>
+              <a:t>© 2016 EV3Lessons.com, Last Edit 10/25/2016</a:t>
             </a:r>
             <a:endParaRPr lang="en-US"/>
           </a:p>
@@ -2329,7 +2413,7 @@
           <a:noFill/>
           <a:extLst>
             <a:ext uri="{909E8E84-426E-40dd-AFC4-6F175D3DCCD1}">
-              <a14:hiddenFill xmlns:a14="http://schemas.microsoft.com/office/drawing/2010/main" xmlns="">
+              <a14:hiddenFill xmlns="" xmlns:a14="http://schemas.microsoft.com/office/drawing/2010/main">
                 <a:solidFill>
                   <a:srgbClr val="FFFFFF"/>
                 </a:solidFill>
@@ -2962,9 +3046,9 @@
           <a:bodyPr/>
           <a:lstStyle/>
           <a:p>
-            <a:fld id="{21DF594E-2FA9-6B4B-987B-567CF26F06D5}" type="datetime1">
-              <a:rPr lang="en-US" smtClean="0"/>
-              <a:t>10/19/16</a:t>
+            <a:fld id="{27834582-753C-5B42-9EC2-D5AC237EFBD0}" type="datetime1">
+              <a:rPr lang="en-US" smtClean="0"/>
+              <a:t>10/25/16</a:t>
             </a:fld>
             <a:endParaRPr lang="en-US"/>
           </a:p>
@@ -2987,7 +3071,7 @@
           <a:p>
             <a:r>
               <a:rPr lang="sk-SK" smtClean="0"/>
-              <a:t>© 2016 EV3Lessons.com, Last Edit 10/18/2016</a:t>
+              <a:t>© 2016 EV3Lessons.com, Last Edit 10/25/2016</a:t>
             </a:r>
             <a:endParaRPr lang="en-US"/>
           </a:p>
@@ -3235,9 +3319,9 @@
           <a:bodyPr/>
           <a:lstStyle/>
           <a:p>
-            <a:fld id="{F1E587C1-9FAA-7E4D-9180-ABB3A32185A2}" type="datetime1">
-              <a:rPr lang="en-US" smtClean="0"/>
-              <a:t>10/19/16</a:t>
+            <a:fld id="{3D332314-DDAB-904D-B2A5-3B995C45FBEB}" type="datetime1">
+              <a:rPr lang="en-US" smtClean="0"/>
+              <a:t>10/25/16</a:t>
             </a:fld>
             <a:endParaRPr lang="en-US"/>
           </a:p>
@@ -3291,7 +3375,7 @@
           <a:p>
             <a:r>
               <a:rPr lang="sk-SK" smtClean="0"/>
-              <a:t>© 2016 EV3Lessons.com, Last Edit 10/18/2016</a:t>
+              <a:t>© 2016 EV3Lessons.com, Last Edit 10/25/2016</a:t>
             </a:r>
             <a:endParaRPr lang="en-US"/>
           </a:p>
@@ -3540,9 +3624,9 @@
           <a:bodyPr/>
           <a:lstStyle/>
           <a:p>
-            <a:fld id="{A5AFF2E5-5E27-2748-A205-6CA6CB4AF064}" type="datetime1">
-              <a:rPr lang="en-US" smtClean="0"/>
-              <a:t>10/19/16</a:t>
+            <a:fld id="{4533636D-D7CF-AD4E-9F72-78DF857BA708}" type="datetime1">
+              <a:rPr lang="en-US" smtClean="0"/>
+              <a:t>10/25/16</a:t>
             </a:fld>
             <a:endParaRPr lang="en-US"/>
           </a:p>
@@ -3565,7 +3649,7 @@
           <a:p>
             <a:r>
               <a:rPr lang="sk-SK" smtClean="0"/>
-              <a:t>© 2016 EV3Lessons.com, Last Edit 10/18/2016</a:t>
+              <a:t>© 2016 EV3Lessons.com, Last Edit 10/25/2016</a:t>
             </a:r>
             <a:endParaRPr lang="en-US"/>
           </a:p>
@@ -4003,9 +4087,9 @@
           <a:bodyPr/>
           <a:lstStyle/>
           <a:p>
-            <a:fld id="{D59E0700-1495-FA40-92CA-EF439C7F0C60}" type="datetime1">
-              <a:rPr lang="en-US" smtClean="0"/>
-              <a:t>10/19/16</a:t>
+            <a:fld id="{57769A6D-B495-984F-BBEC-50BC0AD00832}" type="datetime1">
+              <a:rPr lang="en-US" smtClean="0"/>
+              <a:t>10/25/16</a:t>
             </a:fld>
             <a:endParaRPr lang="en-US"/>
           </a:p>
@@ -4028,7 +4112,7 @@
           <a:p>
             <a:r>
               <a:rPr lang="sk-SK" smtClean="0"/>
-              <a:t>© 2016 EV3Lessons.com, Last Edit 10/18/2016</a:t>
+              <a:t>© 2016 EV3Lessons.com, Last Edit 10/25/2016</a:t>
             </a:r>
             <a:endParaRPr lang="en-US"/>
           </a:p>
@@ -4140,9 +4224,9 @@
           <a:bodyPr/>
           <a:lstStyle/>
           <a:p>
-            <a:fld id="{57CD7F4B-998A-E248-9389-D5A59CCBC8BE}" type="datetime1">
-              <a:rPr lang="en-US" smtClean="0"/>
-              <a:t>10/19/16</a:t>
+            <a:fld id="{3664F8F6-3BFD-904A-9A37-C280D2797B35}" type="datetime1">
+              <a:rPr lang="en-US" smtClean="0"/>
+              <a:t>10/25/16</a:t>
             </a:fld>
             <a:endParaRPr lang="en-US"/>
           </a:p>
@@ -4165,7 +4249,7 @@
           <a:p>
             <a:r>
               <a:rPr lang="sk-SK" smtClean="0"/>
-              <a:t>© 2016 EV3Lessons.com, Last Edit 10/18/2016</a:t>
+              <a:t>© 2016 EV3Lessons.com, Last Edit 10/25/2016</a:t>
             </a:r>
             <a:endParaRPr lang="en-US"/>
           </a:p>
@@ -4254,9 +4338,9 @@
           <a:bodyPr/>
           <a:lstStyle/>
           <a:p>
-            <a:fld id="{1DBBB98A-C4EE-0A4F-9CF5-4D145830DE6B}" type="datetime1">
-              <a:rPr lang="en-US" smtClean="0"/>
-              <a:t>10/19/16</a:t>
+            <a:fld id="{C43D43E8-B15D-E248-BF35-4E8E7481057C}" type="datetime1">
+              <a:rPr lang="en-US" smtClean="0"/>
+              <a:t>10/25/16</a:t>
             </a:fld>
             <a:endParaRPr lang="en-US"/>
           </a:p>
@@ -4279,7 +4363,7 @@
           <a:p>
             <a:r>
               <a:rPr lang="sk-SK" smtClean="0"/>
-              <a:t>© 2016 EV3Lessons.com, Last Edit 10/18/2016</a:t>
+              <a:t>© 2016 EV3Lessons.com, Last Edit 10/25/2016</a:t>
             </a:r>
             <a:endParaRPr lang="en-US"/>
           </a:p>
@@ -4513,9 +4597,9 @@
           <a:bodyPr/>
           <a:lstStyle/>
           <a:p>
-            <a:fld id="{545942EB-BDDD-DA47-B957-9EF2539A6072}" type="datetime1">
-              <a:rPr lang="en-US" smtClean="0"/>
-              <a:t>10/19/16</a:t>
+            <a:fld id="{17DDB90E-73C4-D04D-8FD9-9EE92D4C0CEC}" type="datetime1">
+              <a:rPr lang="en-US" smtClean="0"/>
+              <a:t>10/25/16</a:t>
             </a:fld>
             <a:endParaRPr lang="en-US"/>
           </a:p>
@@ -4538,7 +4622,7 @@
           <a:p>
             <a:r>
               <a:rPr lang="sk-SK" smtClean="0"/>
-              <a:t>© 2016 EV3Lessons.com, Last Edit 10/18/2016</a:t>
+              <a:t>© 2016 EV3Lessons.com, Last Edit 10/25/2016</a:t>
             </a:r>
             <a:endParaRPr lang="en-US"/>
           </a:p>
@@ -4728,9 +4812,9 @@
           <a:bodyPr/>
           <a:lstStyle/>
           <a:p>
-            <a:fld id="{0D0D8D12-238D-AE44-9E0C-997468207ACD}" type="datetime1">
-              <a:rPr lang="en-US" smtClean="0"/>
-              <a:t>10/19/16</a:t>
+            <a:fld id="{A3D96614-7DEE-DF4C-9CBA-3E17F7B55FF1}" type="datetime1">
+              <a:rPr lang="en-US" smtClean="0"/>
+              <a:t>10/25/16</a:t>
             </a:fld>
             <a:endParaRPr lang="en-US"/>
           </a:p>
@@ -4753,7 +4837,7 @@
           <a:p>
             <a:r>
               <a:rPr lang="sk-SK" smtClean="0"/>
-              <a:t>© 2016 EV3Lessons.com, Last Edit 10/18/2016</a:t>
+              <a:t>© 2016 EV3Lessons.com, Last Edit 10/25/2016</a:t>
             </a:r>
             <a:endParaRPr lang="en-US"/>
           </a:p>
@@ -5013,9 +5097,9 @@
           <a:bodyPr/>
           <a:lstStyle/>
           <a:p>
-            <a:fld id="{62ACD900-06AD-D94E-81A6-025F2D0F7A8A}" type="datetime1">
-              <a:rPr lang="en-US" smtClean="0"/>
-              <a:t>10/19/16</a:t>
+            <a:fld id="{B81A21EF-9F6B-6C4E-8E00-E5B71D2A3E61}" type="datetime1">
+              <a:rPr lang="en-US" smtClean="0"/>
+              <a:t>10/25/16</a:t>
             </a:fld>
             <a:endParaRPr lang="en-US"/>
           </a:p>
@@ -5038,7 +5122,7 @@
           <a:p>
             <a:r>
               <a:rPr lang="sk-SK" smtClean="0"/>
-              <a:t>© 2016 EV3Lessons.com, Last Edit 10/18/2016</a:t>
+              <a:t>© 2016 EV3Lessons.com, Last Edit 10/25/2016</a:t>
             </a:r>
             <a:endParaRPr lang="en-US"/>
           </a:p>
@@ -5283,9 +5367,9 @@
           <a:bodyPr/>
           <a:lstStyle/>
           <a:p>
-            <a:fld id="{6A6DE80D-2F90-1643-BD00-A66E8C56EDA1}" type="datetime1">
-              <a:rPr lang="en-US" smtClean="0"/>
-              <a:t>10/19/16</a:t>
+            <a:fld id="{3C9A5DFA-D2DD-0F49-B414-685A851B4F7A}" type="datetime1">
+              <a:rPr lang="en-US" smtClean="0"/>
+              <a:t>10/25/16</a:t>
             </a:fld>
             <a:endParaRPr lang="en-US"/>
           </a:p>
@@ -5308,7 +5392,7 @@
           <a:p>
             <a:r>
               <a:rPr lang="sk-SK" smtClean="0"/>
-              <a:t>© 2016 EV3Lessons.com, Last Edit 10/18/2016</a:t>
+              <a:t>© 2016 EV3Lessons.com, Last Edit 10/25/2016</a:t>
             </a:r>
             <a:endParaRPr lang="en-US"/>
           </a:p>
@@ -5475,9 +5559,9 @@
           <a:bodyPr/>
           <a:lstStyle/>
           <a:p>
-            <a:fld id="{B0D9E542-CE7E-C842-B5ED-0CA4976B5FF0}" type="datetime1">
-              <a:rPr lang="en-US" smtClean="0"/>
-              <a:t>10/19/16</a:t>
+            <a:fld id="{3F362537-4549-1D48-B954-F7AE940BDDB1}" type="datetime1">
+              <a:rPr lang="en-US" smtClean="0"/>
+              <a:t>10/25/16</a:t>
             </a:fld>
             <a:endParaRPr lang="en-US"/>
           </a:p>
@@ -5500,7 +5584,7 @@
           <a:p>
             <a:r>
               <a:rPr lang="sk-SK" smtClean="0"/>
-              <a:t>© 2016 EV3Lessons.com, Last Edit 10/18/2016</a:t>
+              <a:t>© 2016 EV3Lessons.com, Last Edit 10/25/2016</a:t>
             </a:r>
             <a:endParaRPr lang="en-US"/>
           </a:p>
@@ -5679,9 +5763,9 @@
           <a:bodyPr/>
           <a:lstStyle/>
           <a:p>
-            <a:fld id="{D9F59D03-6F35-F941-A3EC-63D8CF8238F0}" type="datetime1">
-              <a:rPr lang="en-US" smtClean="0"/>
-              <a:t>10/19/16</a:t>
+            <a:fld id="{43EF9D6A-4532-FC4B-B906-E2D0429C0548}" type="datetime1">
+              <a:rPr lang="en-US" smtClean="0"/>
+              <a:t>10/25/16</a:t>
             </a:fld>
             <a:endParaRPr lang="en-US"/>
           </a:p>
@@ -5704,7 +5788,7 @@
           <a:p>
             <a:r>
               <a:rPr lang="sk-SK" smtClean="0"/>
-              <a:t>© 2016 EV3Lessons.com, Last Edit 10/18/2016</a:t>
+              <a:t>© 2016 EV3Lessons.com, Last Edit 10/25/2016</a:t>
             </a:r>
             <a:endParaRPr lang="en-US"/>
           </a:p>
@@ -5853,9 +5937,9 @@
           <a:bodyPr/>
           <a:lstStyle/>
           <a:p>
-            <a:fld id="{0274EC29-3731-7E42-A6E0-9B812E405A7E}" type="datetime1">
-              <a:rPr lang="en-US" smtClean="0"/>
-              <a:t>10/19/16</a:t>
+            <a:fld id="{E3743AF7-BC7B-5940-A7E8-FCF781E19DD4}" type="datetime1">
+              <a:rPr lang="en-US" smtClean="0"/>
+              <a:t>10/25/16</a:t>
             </a:fld>
             <a:endParaRPr lang="en-US"/>
           </a:p>
@@ -5878,7 +5962,7 @@
           <a:p>
             <a:r>
               <a:rPr lang="sk-SK" smtClean="0"/>
-              <a:t>© 2016 EV3Lessons.com, Last Edit 10/18/2016</a:t>
+              <a:t>© 2016 EV3Lessons.com, Last Edit 10/25/2016</a:t>
             </a:r>
             <a:endParaRPr lang="en-US"/>
           </a:p>
@@ -6103,9 +6187,9 @@
           <a:bodyPr/>
           <a:lstStyle/>
           <a:p>
-            <a:fld id="{9C8F15D9-B0F4-7649-86A2-D42B02B8D8E3}" type="datetime1">
-              <a:rPr lang="en-US" smtClean="0"/>
-              <a:t>10/19/16</a:t>
+            <a:fld id="{D7FA16A5-6D07-2342-B4D8-B5A2C9EAA399}" type="datetime1">
+              <a:rPr lang="en-US" smtClean="0"/>
+              <a:t>10/25/16</a:t>
             </a:fld>
             <a:endParaRPr lang="en-US"/>
           </a:p>
@@ -6128,7 +6212,7 @@
           <a:p>
             <a:r>
               <a:rPr lang="sk-SK" smtClean="0"/>
-              <a:t>© 2016 EV3Lessons.com, Last Edit 10/18/2016</a:t>
+              <a:t>© 2016 EV3Lessons.com, Last Edit 10/25/2016</a:t>
             </a:r>
             <a:endParaRPr lang="en-US"/>
           </a:p>
@@ -6339,9 +6423,9 @@
           <a:bodyPr/>
           <a:lstStyle/>
           <a:p>
-            <a:fld id="{10EE3CA3-6BD8-C64B-AFAA-8C863F458724}" type="datetime1">
-              <a:rPr lang="en-US" smtClean="0"/>
-              <a:t>10/19/16</a:t>
+            <a:fld id="{670F85FD-30DF-A34F-926A-66AAD0BAA992}" type="datetime1">
+              <a:rPr lang="en-US" smtClean="0"/>
+              <a:t>10/25/16</a:t>
             </a:fld>
             <a:endParaRPr lang="en-US"/>
           </a:p>
@@ -6364,7 +6448,7 @@
           <a:p>
             <a:r>
               <a:rPr lang="sk-SK" smtClean="0"/>
-              <a:t>© 2016 EV3Lessons.com, Last Edit 10/18/2016</a:t>
+              <a:t>© 2016 EV3Lessons.com, Last Edit 10/25/2016</a:t>
             </a:r>
             <a:endParaRPr lang="en-US"/>
           </a:p>
@@ -6710,9 +6794,9 @@
           <a:bodyPr/>
           <a:lstStyle/>
           <a:p>
-            <a:fld id="{3F7BD0D3-610B-2B4A-938D-05A7896D30DF}" type="datetime1">
-              <a:rPr lang="en-US" smtClean="0"/>
-              <a:t>10/19/16</a:t>
+            <a:fld id="{9FD2E301-97BE-9C4B-AB23-08C8584C031A}" type="datetime1">
+              <a:rPr lang="en-US" smtClean="0"/>
+              <a:t>10/25/16</a:t>
             </a:fld>
             <a:endParaRPr lang="en-US"/>
           </a:p>
@@ -6735,7 +6819,7 @@
           <a:p>
             <a:r>
               <a:rPr lang="sk-SK" smtClean="0"/>
-              <a:t>© 2016 EV3Lessons.com, Last Edit 10/18/2016</a:t>
+              <a:t>© 2016 EV3Lessons.com, Last Edit 10/25/2016</a:t>
             </a:r>
             <a:endParaRPr lang="en-US"/>
           </a:p>
@@ -6832,9 +6916,9 @@
           <a:bodyPr/>
           <a:lstStyle/>
           <a:p>
-            <a:fld id="{7A11C149-D740-E344-8CCB-A12884967E04}" type="datetime1">
-              <a:rPr lang="en-US" smtClean="0"/>
-              <a:t>10/19/16</a:t>
+            <a:fld id="{15B4D11A-E5CC-5A48-82A1-1947C1CD0D74}" type="datetime1">
+              <a:rPr lang="en-US" smtClean="0"/>
+              <a:t>10/25/16</a:t>
             </a:fld>
             <a:endParaRPr lang="en-US"/>
           </a:p>
@@ -6857,7 +6941,7 @@
           <a:p>
             <a:r>
               <a:rPr lang="sk-SK" smtClean="0"/>
-              <a:t>© 2016 EV3Lessons.com, Last Edit 10/18/2016</a:t>
+              <a:t>© 2016 EV3Lessons.com, Last Edit 10/25/2016</a:t>
             </a:r>
             <a:endParaRPr lang="en-US"/>
           </a:p>
@@ -6931,9 +7015,9 @@
           <a:bodyPr/>
           <a:lstStyle/>
           <a:p>
-            <a:fld id="{2375A2B2-8B5E-6645-AD63-3130E483748F}" type="datetime1">
-              <a:rPr lang="en-US" smtClean="0"/>
-              <a:t>10/19/16</a:t>
+            <a:fld id="{6E81E40D-2086-624C-B723-D4C2EDE47EC3}" type="datetime1">
+              <a:rPr lang="en-US" smtClean="0"/>
+              <a:t>10/25/16</a:t>
             </a:fld>
             <a:endParaRPr lang="en-US"/>
           </a:p>
@@ -6956,7 +7040,7 @@
           <a:p>
             <a:r>
               <a:rPr lang="sk-SK" smtClean="0"/>
-              <a:t>© 2016 EV3Lessons.com, Last Edit 10/18/2016</a:t>
+              <a:t>© 2016 EV3Lessons.com, Last Edit 10/25/2016</a:t>
             </a:r>
             <a:endParaRPr lang="en-US"/>
           </a:p>
@@ -7189,9 +7273,9 @@
           <a:bodyPr/>
           <a:lstStyle/>
           <a:p>
-            <a:fld id="{0F101BC8-CCA2-834F-95E9-84E71FD7B50D}" type="datetime1">
-              <a:rPr lang="en-US" smtClean="0"/>
-              <a:t>10/19/16</a:t>
+            <a:fld id="{C10283B3-A60F-1C4B-9A6D-3B5D301C08A3}" type="datetime1">
+              <a:rPr lang="en-US" smtClean="0"/>
+              <a:t>10/25/16</a:t>
             </a:fld>
             <a:endParaRPr lang="en-US"/>
           </a:p>
@@ -7237,7 +7321,7 @@
           <a:p>
             <a:r>
               <a:rPr lang="sk-SK" smtClean="0"/>
-              <a:t>© 2016 EV3Lessons.com, Last Edit 10/18/2016</a:t>
+              <a:t>© 2016 EV3Lessons.com, Last Edit 10/25/2016</a:t>
             </a:r>
             <a:endParaRPr lang="en-US"/>
           </a:p>
@@ -7470,9 +7554,9 @@
           <a:bodyPr/>
           <a:lstStyle/>
           <a:p>
-            <a:fld id="{09721406-ED4F-8B45-A549-188C9603D847}" type="datetime1">
-              <a:rPr lang="en-US" smtClean="0"/>
-              <a:t>10/19/16</a:t>
+            <a:fld id="{D2B71B34-060D-9147-B45F-34C41517BE52}" type="datetime1">
+              <a:rPr lang="en-US" smtClean="0"/>
+              <a:t>10/25/16</a:t>
             </a:fld>
             <a:endParaRPr lang="en-US"/>
           </a:p>
@@ -7495,7 +7579,7 @@
           <a:p>
             <a:r>
               <a:rPr lang="sk-SK" smtClean="0"/>
-              <a:t>© 2016 EV3Lessons.com, Last Edit 10/18/2016</a:t>
+              <a:t>© 2016 EV3Lessons.com, Last Edit 10/25/2016</a:t>
             </a:r>
             <a:endParaRPr lang="en-US"/>
           </a:p>
@@ -7731,9 +7815,9 @@
           <a:bodyPr/>
           <a:lstStyle/>
           <a:p>
-            <a:fld id="{DE1057CE-45C3-AC4E-8338-FE58356B1CB1}" type="datetime1">
-              <a:rPr lang="en-US" smtClean="0"/>
-              <a:t>10/19/16</a:t>
+            <a:fld id="{F803A078-64D6-F249-8FCC-5B4056048E99}" type="datetime1">
+              <a:rPr lang="en-US" smtClean="0"/>
+              <a:t>10/25/16</a:t>
             </a:fld>
             <a:endParaRPr lang="en-US"/>
           </a:p>
@@ -7756,7 +7840,7 @@
           <a:p>
             <a:r>
               <a:rPr lang="sk-SK" smtClean="0"/>
-              <a:t>© 2016 EV3Lessons.com, Last Edit 10/18/2016</a:t>
+              <a:t>© 2016 EV3Lessons.com, Last Edit 10/25/2016</a:t>
             </a:r>
             <a:endParaRPr lang="en-US"/>
           </a:p>
@@ -7905,9 +7989,9 @@
           <a:bodyPr/>
           <a:lstStyle/>
           <a:p>
-            <a:fld id="{2F2E95A7-3A28-EC4D-B92E-95BF27C175C3}" type="datetime1">
-              <a:rPr lang="en-US" smtClean="0"/>
-              <a:t>10/19/16</a:t>
+            <a:fld id="{C7EB252A-5D5A-9643-ADA9-1C35A84B7E19}" type="datetime1">
+              <a:rPr lang="en-US" smtClean="0"/>
+              <a:t>10/25/16</a:t>
             </a:fld>
             <a:endParaRPr lang="en-US"/>
           </a:p>
@@ -7930,7 +8014,7 @@
           <a:p>
             <a:r>
               <a:rPr lang="sk-SK" smtClean="0"/>
-              <a:t>© 2016 EV3Lessons.com, Last Edit 10/18/2016</a:t>
+              <a:t>© 2016 EV3Lessons.com, Last Edit 10/25/2016</a:t>
             </a:r>
             <a:endParaRPr lang="en-US"/>
           </a:p>
@@ -8089,9 +8173,9 @@
           <a:bodyPr/>
           <a:lstStyle/>
           <a:p>
-            <a:fld id="{0B9C296B-50A0-1C4D-A904-842C5215E8D6}" type="datetime1">
-              <a:rPr lang="en-US" smtClean="0"/>
-              <a:t>10/19/16</a:t>
+            <a:fld id="{17376346-366F-3A44-BA50-6344199BE0C5}" type="datetime1">
+              <a:rPr lang="en-US" smtClean="0"/>
+              <a:t>10/25/16</a:t>
             </a:fld>
             <a:endParaRPr lang="en-US"/>
           </a:p>
@@ -8114,7 +8198,7 @@
           <a:p>
             <a:r>
               <a:rPr lang="sk-SK" smtClean="0"/>
-              <a:t>© 2016 EV3Lessons.com, Last Edit 10/18/2016</a:t>
+              <a:t>© 2016 EV3Lessons.com, Last Edit 10/25/2016</a:t>
             </a:r>
             <a:endParaRPr lang="en-US"/>
           </a:p>
@@ -8347,9 +8431,9 @@
           <a:bodyPr/>
           <a:lstStyle/>
           <a:p>
-            <a:fld id="{6B1A836D-86EC-F749-99CE-265C2FAB305D}" type="datetime1">
-              <a:rPr lang="en-US" smtClean="0"/>
-              <a:t>10/19/16</a:t>
+            <a:fld id="{12703193-5248-EC43-9A1C-7BB4FE57EFB7}" type="datetime1">
+              <a:rPr lang="en-US" smtClean="0"/>
+              <a:t>10/25/16</a:t>
             </a:fld>
             <a:endParaRPr lang="en-US"/>
           </a:p>
@@ -8372,7 +8456,7 @@
           <a:p>
             <a:r>
               <a:rPr lang="sk-SK" smtClean="0"/>
-              <a:t>© 2016 EV3Lessons.com, Last Edit 10/18/2016</a:t>
+              <a:t>© 2016 EV3Lessons.com, Last Edit 10/25/2016</a:t>
             </a:r>
             <a:endParaRPr lang="en-US"/>
           </a:p>
@@ -9373,9 +9457,9 @@
           <a:bodyPr/>
           <a:lstStyle/>
           <a:p>
-            <a:fld id="{BA476F7A-9E18-9E41-BD0F-996FD9C705A8}" type="datetime1">
-              <a:rPr lang="en-US" smtClean="0"/>
-              <a:t>10/19/16</a:t>
+            <a:fld id="{77479DF3-C901-904D-A024-957A7EDC7BD9}" type="datetime1">
+              <a:rPr lang="en-US" smtClean="0"/>
+              <a:t>10/25/16</a:t>
             </a:fld>
             <a:endParaRPr lang="en-US"/>
           </a:p>
@@ -9398,7 +9482,7 @@
           <a:p>
             <a:r>
               <a:rPr lang="sk-SK" smtClean="0"/>
-              <a:t>© 2016 EV3Lessons.com, Last Edit 10/18/2016</a:t>
+              <a:t>© 2016 EV3Lessons.com, Last Edit 10/25/2016</a:t>
             </a:r>
             <a:endParaRPr lang="en-US"/>
           </a:p>
@@ -9636,9 +9720,9 @@
           <a:bodyPr/>
           <a:lstStyle/>
           <a:p>
-            <a:fld id="{EDE26A61-5577-6D46-9A0B-ED29078B60B2}" type="datetime1">
-              <a:rPr lang="en-US" smtClean="0"/>
-              <a:t>10/19/16</a:t>
+            <a:fld id="{5FB86142-4831-1B47-855A-6D274D41EB2E}" type="datetime1">
+              <a:rPr lang="en-US" smtClean="0"/>
+              <a:t>10/25/16</a:t>
             </a:fld>
             <a:endParaRPr lang="en-US"/>
           </a:p>
@@ -9684,7 +9768,7 @@
           <a:p>
             <a:r>
               <a:rPr lang="sk-SK" smtClean="0"/>
-              <a:t>© 2016 EV3Lessons.com, Last Edit 10/18/2016</a:t>
+              <a:t>© 2016 EV3Lessons.com, Last Edit 10/25/2016</a:t>
             </a:r>
             <a:endParaRPr lang="en-US"/>
           </a:p>
@@ -9933,9 +10017,9 @@
           <a:bodyPr/>
           <a:lstStyle/>
           <a:p>
-            <a:fld id="{F2CEFA95-14EF-2B46-8634-0B274DB37B93}" type="datetime1">
-              <a:rPr lang="en-US" smtClean="0"/>
-              <a:t>10/19/16</a:t>
+            <a:fld id="{6387F603-7F94-6341-848E-2E1ED4E4B66B}" type="datetime1">
+              <a:rPr lang="en-US" smtClean="0"/>
+              <a:t>10/25/16</a:t>
             </a:fld>
             <a:endParaRPr lang="en-US"/>
           </a:p>
@@ -9958,7 +10042,7 @@
           <a:p>
             <a:r>
               <a:rPr lang="sk-SK" smtClean="0"/>
-              <a:t>© 2016 EV3Lessons.com, Last Edit 10/18/2016</a:t>
+              <a:t>© 2016 EV3Lessons.com, Last Edit 10/25/2016</a:t>
             </a:r>
             <a:endParaRPr lang="en-US"/>
           </a:p>
@@ -10381,9 +10465,9 @@
           <a:bodyPr/>
           <a:lstStyle/>
           <a:p>
-            <a:fld id="{8C570174-6825-7D42-B1F1-C6720C7583AD}" type="datetime1">
-              <a:rPr lang="en-US" smtClean="0"/>
-              <a:t>10/19/16</a:t>
+            <a:fld id="{1BD168B0-18D8-C840-BAAE-6F4B779BAB4C}" type="datetime1">
+              <a:rPr lang="en-US" smtClean="0"/>
+              <a:t>10/25/16</a:t>
             </a:fld>
             <a:endParaRPr lang="en-US"/>
           </a:p>
@@ -10406,7 +10490,7 @@
           <a:p>
             <a:r>
               <a:rPr lang="sk-SK" smtClean="0"/>
-              <a:t>© 2016 EV3Lessons.com, Last Edit 10/18/2016</a:t>
+              <a:t>© 2016 EV3Lessons.com, Last Edit 10/25/2016</a:t>
             </a:r>
             <a:endParaRPr lang="en-US"/>
           </a:p>
@@ -10503,9 +10587,9 @@
           <a:bodyPr/>
           <a:lstStyle/>
           <a:p>
-            <a:fld id="{B1DA150C-2FAF-7549-B604-83F2E9B0E940}" type="datetime1">
-              <a:rPr lang="en-US" smtClean="0"/>
-              <a:t>10/19/16</a:t>
+            <a:fld id="{2B121DF4-DE14-6F49-9862-940BCE537123}" type="datetime1">
+              <a:rPr lang="en-US" smtClean="0"/>
+              <a:t>10/25/16</a:t>
             </a:fld>
             <a:endParaRPr lang="en-US"/>
           </a:p>
@@ -10528,7 +10612,7 @@
           <a:p>
             <a:r>
               <a:rPr lang="sk-SK" smtClean="0"/>
-              <a:t>© 2016 EV3Lessons.com, Last Edit 10/18/2016</a:t>
+              <a:t>© 2016 EV3Lessons.com, Last Edit 10/25/2016</a:t>
             </a:r>
             <a:endParaRPr lang="en-US"/>
           </a:p>
@@ -10800,9 +10884,9 @@
           <a:bodyPr/>
           <a:lstStyle/>
           <a:p>
-            <a:fld id="{1749DB44-8835-0F42-8105-27B8F3FCA8AA}" type="datetime1">
-              <a:rPr lang="en-US" smtClean="0"/>
-              <a:t>10/19/16</a:t>
+            <a:fld id="{FA0CB2D9-B8CC-0943-A0BD-5A501AAB5A20}" type="datetime1">
+              <a:rPr lang="en-US" smtClean="0"/>
+              <a:t>10/25/16</a:t>
             </a:fld>
             <a:endParaRPr lang="en-US"/>
           </a:p>
@@ -10825,7 +10909,7 @@
           <a:p>
             <a:r>
               <a:rPr lang="sk-SK" smtClean="0"/>
-              <a:t>© 2016 EV3Lessons.com, Last Edit 10/18/2016</a:t>
+              <a:t>© 2016 EV3Lessons.com, Last Edit 10/25/2016</a:t>
             </a:r>
             <a:endParaRPr lang="en-US"/>
           </a:p>
@@ -10899,9 +10983,9 @@
           <a:bodyPr/>
           <a:lstStyle/>
           <a:p>
-            <a:fld id="{33E126EC-E139-1E43-B8AB-E007346D3A74}" type="datetime1">
-              <a:rPr lang="en-US" smtClean="0"/>
-              <a:t>10/19/16</a:t>
+            <a:fld id="{31162784-FE60-F140-B2EF-4B4B47971D9D}" type="datetime1">
+              <a:rPr lang="en-US" smtClean="0"/>
+              <a:t>10/25/16</a:t>
             </a:fld>
             <a:endParaRPr lang="en-US"/>
           </a:p>
@@ -10924,7 +11008,7 @@
           <a:p>
             <a:r>
               <a:rPr lang="sk-SK" smtClean="0"/>
-              <a:t>© 2016 EV3Lessons.com, Last Edit 10/18/2016</a:t>
+              <a:t>© 2016 EV3Lessons.com, Last Edit 10/25/2016</a:t>
             </a:r>
             <a:endParaRPr lang="en-US"/>
           </a:p>
@@ -11150,9 +11234,9 @@
           <a:bodyPr/>
           <a:lstStyle/>
           <a:p>
-            <a:fld id="{C565D44A-3C7A-0B49-ADBA-25B60852B9A8}" type="datetime1">
-              <a:rPr lang="en-US" smtClean="0"/>
-              <a:t>10/19/16</a:t>
+            <a:fld id="{DA487161-BB2D-F040-B875-9C5217520089}" type="datetime1">
+              <a:rPr lang="en-US" smtClean="0"/>
+              <a:t>10/25/16</a:t>
             </a:fld>
             <a:endParaRPr lang="en-US"/>
           </a:p>
@@ -11175,7 +11259,7 @@
           <a:p>
             <a:r>
               <a:rPr lang="sk-SK" smtClean="0"/>
-              <a:t>© 2016 EV3Lessons.com, Last Edit 10/18/2016</a:t>
+              <a:t>© 2016 EV3Lessons.com, Last Edit 10/25/2016</a:t>
             </a:r>
             <a:endParaRPr lang="en-US"/>
           </a:p>
@@ -11453,9 +11537,9 @@
           <a:bodyPr/>
           <a:lstStyle/>
           <a:p>
-            <a:fld id="{3CBF90F0-D749-3745-AC04-1A8BBB10A221}" type="datetime1">
-              <a:rPr lang="en-US" smtClean="0"/>
-              <a:t>10/19/16</a:t>
+            <a:fld id="{0653F1CA-1A97-794C-94B4-291CE72AA6BE}" type="datetime1">
+              <a:rPr lang="en-US" smtClean="0"/>
+              <a:t>10/25/16</a:t>
             </a:fld>
             <a:endParaRPr lang="en-US"/>
           </a:p>
@@ -11478,7 +11562,7 @@
           <a:p>
             <a:r>
               <a:rPr lang="sk-SK" smtClean="0"/>
-              <a:t>© 2016 EV3Lessons.com, Last Edit 10/18/2016</a:t>
+              <a:t>© 2016 EV3Lessons.com, Last Edit 10/25/2016</a:t>
             </a:r>
             <a:endParaRPr lang="en-US"/>
           </a:p>
@@ -11715,9 +11799,9 @@
           <a:bodyPr/>
           <a:lstStyle/>
           <a:p>
-            <a:fld id="{98B33AA4-3A31-8340-9A32-8797386CA51F}" type="datetime1">
-              <a:rPr lang="en-US" smtClean="0"/>
-              <a:t>10/19/16</a:t>
+            <a:fld id="{5A8E5E2B-E1A5-4746-963E-2F337D2AA1E3}" type="datetime1">
+              <a:rPr lang="en-US" smtClean="0"/>
+              <a:t>10/25/16</a:t>
             </a:fld>
             <a:endParaRPr lang="en-US"/>
           </a:p>
@@ -11740,7 +11824,7 @@
           <a:p>
             <a:r>
               <a:rPr lang="sk-SK" smtClean="0"/>
-              <a:t>© 2016 EV3Lessons.com, Last Edit 10/18/2016</a:t>
+              <a:t>© 2016 EV3Lessons.com, Last Edit 10/25/2016</a:t>
             </a:r>
             <a:endParaRPr lang="en-US"/>
           </a:p>
@@ -11899,9 +11983,9 @@
           <a:bodyPr/>
           <a:lstStyle/>
           <a:p>
-            <a:fld id="{3A18DB40-93EE-F246-A801-A3DDE29B59F8}" type="datetime1">
-              <a:rPr lang="en-US" smtClean="0"/>
-              <a:t>10/19/16</a:t>
+            <a:fld id="{0DAA3540-2E21-E146-B9F1-0D0E2DF1B93C}" type="datetime1">
+              <a:rPr lang="en-US" smtClean="0"/>
+              <a:t>10/25/16</a:t>
             </a:fld>
             <a:endParaRPr lang="en-US"/>
           </a:p>
@@ -11924,7 +12008,7 @@
           <a:p>
             <a:r>
               <a:rPr lang="sk-SK" smtClean="0"/>
-              <a:t>© 2016 EV3Lessons.com, Last Edit 10/18/2016</a:t>
+              <a:t>© 2016 EV3Lessons.com, Last Edit 10/25/2016</a:t>
             </a:r>
             <a:endParaRPr lang="en-US"/>
           </a:p>
@@ -12116,9 +12200,9 @@
           <a:bodyPr/>
           <a:lstStyle/>
           <a:p>
-            <a:fld id="{6A46F6FA-972C-A546-883E-E3633EC1BE4F}" type="datetime1">
-              <a:rPr lang="en-US" smtClean="0"/>
-              <a:t>10/19/16</a:t>
+            <a:fld id="{C2E9C9B9-3FDE-7A4A-BC6F-F9B42B1CD962}" type="datetime1">
+              <a:rPr lang="en-US" smtClean="0"/>
+              <a:t>10/25/16</a:t>
             </a:fld>
             <a:endParaRPr lang="en-US"/>
           </a:p>
@@ -12146,7 +12230,7 @@
           <a:p>
             <a:r>
               <a:rPr lang="sk-SK" smtClean="0"/>
-              <a:t>© 2016 EV3Lessons.com, Last Edit 10/18/2016</a:t>
+              <a:t>© 2016 EV3Lessons.com, Last Edit 10/25/2016</a:t>
             </a:r>
             <a:endParaRPr lang="en-US"/>
           </a:p>
@@ -12337,7 +12421,7 @@
           <a:noFill/>
           <a:extLst>
             <a:ext uri="{909E8E84-426E-40dd-AFC4-6F175D3DCCD1}">
-              <a14:hiddenFill xmlns="" xmlns:a14="http://schemas.microsoft.com/office/drawing/2010/main">
+              <a14:hiddenFill xmlns:a14="http://schemas.microsoft.com/office/drawing/2010/main" xmlns="">
                 <a:solidFill>
                   <a:srgbClr val="FFFFFF"/>
                 </a:solidFill>
@@ -13387,9 +13471,9 @@
           <a:bodyPr/>
           <a:lstStyle/>
           <a:p>
-            <a:fld id="{2DE07CE9-894B-A841-8CD8-261ACF046BC4}" type="datetime1">
-              <a:rPr lang="en-US" smtClean="0"/>
-              <a:t>10/19/16</a:t>
+            <a:fld id="{A21489D5-EBD3-124B-A5A6-13B95D72FB49}" type="datetime1">
+              <a:rPr lang="en-US" smtClean="0"/>
+              <a:t>10/25/16</a:t>
             </a:fld>
             <a:endParaRPr lang="en-US"/>
           </a:p>
@@ -13412,7 +13496,7 @@
           <a:p>
             <a:r>
               <a:rPr lang="sk-SK" smtClean="0"/>
-              <a:t>© 2016 EV3Lessons.com, Last Edit 10/18/2016</a:t>
+              <a:t>© 2016 EV3Lessons.com, Last Edit 10/25/2016</a:t>
             </a:r>
             <a:endParaRPr lang="en-US"/>
           </a:p>
@@ -13660,9 +13744,9 @@
           <a:bodyPr/>
           <a:lstStyle/>
           <a:p>
-            <a:fld id="{A3E3579A-DDAE-4E43-B969-A7DFBA90DC0C}" type="datetime1">
-              <a:rPr lang="en-US" smtClean="0"/>
-              <a:t>10/19/16</a:t>
+            <a:fld id="{345963FA-D69B-7548-AF2B-512326842D37}" type="datetime1">
+              <a:rPr lang="en-US" smtClean="0"/>
+              <a:t>10/25/16</a:t>
             </a:fld>
             <a:endParaRPr lang="en-US"/>
           </a:p>
@@ -13716,7 +13800,7 @@
           <a:p>
             <a:r>
               <a:rPr lang="sk-SK" smtClean="0"/>
-              <a:t>© 2016 EV3Lessons.com, Last Edit 10/18/2016</a:t>
+              <a:t>© 2016 EV3Lessons.com, Last Edit 10/25/2016</a:t>
             </a:r>
             <a:endParaRPr lang="en-US"/>
           </a:p>
@@ -13965,9 +14049,9 @@
           <a:bodyPr/>
           <a:lstStyle/>
           <a:p>
-            <a:fld id="{7F976FBE-C4A5-EA44-8352-9CCF845C7A6C}" type="datetime1">
-              <a:rPr lang="en-US" smtClean="0"/>
-              <a:t>10/19/16</a:t>
+            <a:fld id="{834CBC10-1041-1B48-AFA7-3C0805AB596D}" type="datetime1">
+              <a:rPr lang="en-US" smtClean="0"/>
+              <a:t>10/25/16</a:t>
             </a:fld>
             <a:endParaRPr lang="en-US"/>
           </a:p>
@@ -13990,7 +14074,7 @@
           <a:p>
             <a:r>
               <a:rPr lang="sk-SK" smtClean="0"/>
-              <a:t>© 2016 EV3Lessons.com, Last Edit 10/18/2016</a:t>
+              <a:t>© 2016 EV3Lessons.com, Last Edit 10/25/2016</a:t>
             </a:r>
             <a:endParaRPr lang="en-US"/>
           </a:p>
@@ -14428,9 +14512,9 @@
           <a:bodyPr/>
           <a:lstStyle/>
           <a:p>
-            <a:fld id="{5BA189DE-22B8-0845-9EC7-37D91619305F}" type="datetime1">
-              <a:rPr lang="en-US" smtClean="0"/>
-              <a:t>10/19/16</a:t>
+            <a:fld id="{3531DCC6-0306-504B-8325-91FED725A111}" type="datetime1">
+              <a:rPr lang="en-US" smtClean="0"/>
+              <a:t>10/25/16</a:t>
             </a:fld>
             <a:endParaRPr lang="en-US"/>
           </a:p>
@@ -14453,7 +14537,7 @@
           <a:p>
             <a:r>
               <a:rPr lang="sk-SK" smtClean="0"/>
-              <a:t>© 2016 EV3Lessons.com, Last Edit 10/18/2016</a:t>
+              <a:t>© 2016 EV3Lessons.com, Last Edit 10/25/2016</a:t>
             </a:r>
             <a:endParaRPr lang="en-US"/>
           </a:p>
@@ -14891,9 +14975,9 @@
           <a:bodyPr/>
           <a:lstStyle/>
           <a:p>
-            <a:fld id="{C5AB3096-8F88-C84A-BBDF-1411467E2325}" type="datetime1">
-              <a:rPr lang="en-US" smtClean="0"/>
-              <a:t>10/19/16</a:t>
+            <a:fld id="{C614CA23-3DC0-E845-BF08-35973C2EF420}" type="datetime1">
+              <a:rPr lang="en-US" smtClean="0"/>
+              <a:t>10/25/16</a:t>
             </a:fld>
             <a:endParaRPr lang="en-US"/>
           </a:p>
@@ -14916,7 +15000,7 @@
           <a:p>
             <a:r>
               <a:rPr lang="sk-SK" smtClean="0"/>
-              <a:t>© 2016 EV3Lessons.com, Last Edit 10/18/2016</a:t>
+              <a:t>© 2016 EV3Lessons.com, Last Edit 10/25/2016</a:t>
             </a:r>
             <a:endParaRPr lang="en-US"/>
           </a:p>
@@ -15013,9 +15097,9 @@
           <a:bodyPr/>
           <a:lstStyle/>
           <a:p>
-            <a:fld id="{EBE1EDB1-F22B-6D4C-9FD2-DF6A6E6FDA46}" type="datetime1">
-              <a:rPr lang="en-US" smtClean="0"/>
-              <a:t>10/19/16</a:t>
+            <a:fld id="{B7BAA11F-2390-E849-9C97-A556CD425061}" type="datetime1">
+              <a:rPr lang="en-US" smtClean="0"/>
+              <a:t>10/25/16</a:t>
             </a:fld>
             <a:endParaRPr lang="en-US"/>
           </a:p>
@@ -15038,7 +15122,7 @@
           <a:p>
             <a:r>
               <a:rPr lang="sk-SK" smtClean="0"/>
-              <a:t>© 2016 EV3Lessons.com, Last Edit 10/18/2016</a:t>
+              <a:t>© 2016 EV3Lessons.com, Last Edit 10/25/2016</a:t>
             </a:r>
             <a:endParaRPr lang="en-US"/>
           </a:p>
@@ -15127,9 +15211,9 @@
           <a:bodyPr/>
           <a:lstStyle/>
           <a:p>
-            <a:fld id="{E74EC89C-EC5A-ED49-9606-7F9DA7E955CA}" type="datetime1">
-              <a:rPr lang="en-US" smtClean="0"/>
-              <a:t>10/19/16</a:t>
+            <a:fld id="{0D0FA187-AD6B-5346-9F54-0B781FFB6A70}" type="datetime1">
+              <a:rPr lang="en-US" smtClean="0"/>
+              <a:t>10/25/16</a:t>
             </a:fld>
             <a:endParaRPr lang="en-US"/>
           </a:p>
@@ -15152,7 +15236,7 @@
           <a:p>
             <a:r>
               <a:rPr lang="sk-SK" smtClean="0"/>
-              <a:t>© 2016 EV3Lessons.com, Last Edit 10/18/2016</a:t>
+              <a:t>© 2016 EV3Lessons.com, Last Edit 10/25/2016</a:t>
             </a:r>
             <a:endParaRPr lang="en-US"/>
           </a:p>
@@ -15386,9 +15470,9 @@
           <a:bodyPr/>
           <a:lstStyle/>
           <a:p>
-            <a:fld id="{7B8E4C0E-CEA1-1942-80EB-DF0F37F65261}" type="datetime1">
-              <a:rPr lang="en-US" smtClean="0"/>
-              <a:t>10/19/16</a:t>
+            <a:fld id="{B3823067-1B62-114B-8B6C-4CB1D0E29CC3}" type="datetime1">
+              <a:rPr lang="en-US" smtClean="0"/>
+              <a:t>10/25/16</a:t>
             </a:fld>
             <a:endParaRPr lang="en-US"/>
           </a:p>
@@ -15411,7 +15495,7 @@
           <a:p>
             <a:r>
               <a:rPr lang="sk-SK" smtClean="0"/>
-              <a:t>© 2016 EV3Lessons.com, Last Edit 10/18/2016</a:t>
+              <a:t>© 2016 EV3Lessons.com, Last Edit 10/25/2016</a:t>
             </a:r>
             <a:endParaRPr lang="en-US"/>
           </a:p>
@@ -15697,9 +15781,9 @@
           <a:bodyPr/>
           <a:lstStyle/>
           <a:p>
-            <a:fld id="{C9050912-F988-004A-A54C-6618D6B1FA18}" type="datetime1">
-              <a:rPr lang="en-US" smtClean="0"/>
-              <a:t>10/19/16</a:t>
+            <a:fld id="{01EC54E6-514B-514A-A73C-F53B4056F5A0}" type="datetime1">
+              <a:rPr lang="en-US" smtClean="0"/>
+              <a:t>10/25/16</a:t>
             </a:fld>
             <a:endParaRPr lang="en-US"/>
           </a:p>
@@ -15722,7 +15806,7 @@
           <a:p>
             <a:r>
               <a:rPr lang="sk-SK" smtClean="0"/>
-              <a:t>© 2016 EV3Lessons.com, Last Edit 10/18/2016</a:t>
+              <a:t>© 2016 EV3Lessons.com, Last Edit 10/25/2016</a:t>
             </a:r>
             <a:endParaRPr lang="en-US"/>
           </a:p>
@@ -15967,9 +16051,9 @@
           <a:bodyPr/>
           <a:lstStyle/>
           <a:p>
-            <a:fld id="{081803CC-74C6-7C4F-AD8D-A81442763901}" type="datetime1">
-              <a:rPr lang="en-US" smtClean="0"/>
-              <a:t>10/19/16</a:t>
+            <a:fld id="{7DDD5498-EA94-8D4E-B019-2B5A8234B7A3}" type="datetime1">
+              <a:rPr lang="en-US" smtClean="0"/>
+              <a:t>10/25/16</a:t>
             </a:fld>
             <a:endParaRPr lang="en-US"/>
           </a:p>
@@ -15992,7 +16076,7 @@
           <a:p>
             <a:r>
               <a:rPr lang="sk-SK" smtClean="0"/>
-              <a:t>© 2016 EV3Lessons.com, Last Edit 10/18/2016</a:t>
+              <a:t>© 2016 EV3Lessons.com, Last Edit 10/25/2016</a:t>
             </a:r>
             <a:endParaRPr lang="en-US"/>
           </a:p>
@@ -16159,9 +16243,9 @@
           <a:bodyPr/>
           <a:lstStyle/>
           <a:p>
-            <a:fld id="{31969BF2-C5E7-1D46-AEE3-8CDD643160C2}" type="datetime1">
-              <a:rPr lang="en-US" smtClean="0"/>
-              <a:t>10/19/16</a:t>
+            <a:fld id="{3B34EBEB-8957-B94E-9DD3-50EE4903CDF7}" type="datetime1">
+              <a:rPr lang="en-US" smtClean="0"/>
+              <a:t>10/25/16</a:t>
             </a:fld>
             <a:endParaRPr lang="en-US"/>
           </a:p>
@@ -16184,7 +16268,7 @@
           <a:p>
             <a:r>
               <a:rPr lang="sk-SK" smtClean="0"/>
-              <a:t>© 2016 EV3Lessons.com, Last Edit 10/18/2016</a:t>
+              <a:t>© 2016 EV3Lessons.com, Last Edit 10/25/2016</a:t>
             </a:r>
             <a:endParaRPr lang="en-US"/>
           </a:p>
@@ -16363,9 +16447,9 @@
           <a:bodyPr/>
           <a:lstStyle/>
           <a:p>
-            <a:fld id="{42BA678B-8C2E-1540-9586-B8EA848F7C14}" type="datetime1">
-              <a:rPr lang="en-US" smtClean="0"/>
-              <a:t>10/19/16</a:t>
+            <a:fld id="{A1B67706-E1AE-AA4D-81B5-B913F17070AD}" type="datetime1">
+              <a:rPr lang="en-US" smtClean="0"/>
+              <a:t>10/25/16</a:t>
             </a:fld>
             <a:endParaRPr lang="en-US"/>
           </a:p>
@@ -16388,7 +16472,7 @@
           <a:p>
             <a:r>
               <a:rPr lang="sk-SK" smtClean="0"/>
-              <a:t>© 2016 EV3Lessons.com, Last Edit 10/18/2016</a:t>
+              <a:t>© 2016 EV3Lessons.com, Last Edit 10/25/2016</a:t>
             </a:r>
             <a:endParaRPr lang="en-US"/>
           </a:p>
@@ -16537,9 +16621,9 @@
           <a:bodyPr/>
           <a:lstStyle/>
           <a:p>
-            <a:fld id="{256FDA91-EF65-B245-BCFB-A220B9C24F65}" type="datetime1">
-              <a:rPr lang="en-US" smtClean="0"/>
-              <a:t>10/19/16</a:t>
+            <a:fld id="{3F9728FA-8CF9-DA4F-BE5E-8C8D5A6E0CED}" type="datetime1">
+              <a:rPr lang="en-US" smtClean="0"/>
+              <a:t>10/25/16</a:t>
             </a:fld>
             <a:endParaRPr lang="en-US"/>
           </a:p>
@@ -16562,7 +16646,7 @@
           <a:p>
             <a:r>
               <a:rPr lang="sk-SK" smtClean="0"/>
-              <a:t>© 2016 EV3Lessons.com, Last Edit 10/18/2016</a:t>
+              <a:t>© 2016 EV3Lessons.com, Last Edit 10/25/2016</a:t>
             </a:r>
             <a:endParaRPr lang="en-US"/>
           </a:p>
@@ -16787,9 +16871,9 @@
           <a:bodyPr/>
           <a:lstStyle/>
           <a:p>
-            <a:fld id="{F9E038C2-9371-D54B-8ED3-03DA5A06DEC3}" type="datetime1">
-              <a:rPr lang="en-US" smtClean="0"/>
-              <a:t>10/19/16</a:t>
+            <a:fld id="{EA3ED1DB-CBB1-8042-8953-4A9D7653EB95}" type="datetime1">
+              <a:rPr lang="en-US" smtClean="0"/>
+              <a:t>10/25/16</a:t>
             </a:fld>
             <a:endParaRPr lang="en-US"/>
           </a:p>
@@ -16812,7 +16896,7 @@
           <a:p>
             <a:r>
               <a:rPr lang="sk-SK" smtClean="0"/>
-              <a:t>© 2016 EV3Lessons.com, Last Edit 10/18/2016</a:t>
+              <a:t>© 2016 EV3Lessons.com, Last Edit 10/25/2016</a:t>
             </a:r>
             <a:endParaRPr lang="en-US"/>
           </a:p>
@@ -17023,9 +17107,9 @@
           <a:bodyPr/>
           <a:lstStyle/>
           <a:p>
-            <a:fld id="{75780184-19FD-474D-9D5A-7E8A6AADB4AB}" type="datetime1">
-              <a:rPr lang="en-US" smtClean="0"/>
-              <a:t>10/19/16</a:t>
+            <a:fld id="{60BF7219-7BBD-A04A-B8AA-0EB7A300F401}" type="datetime1">
+              <a:rPr lang="en-US" smtClean="0"/>
+              <a:t>10/25/16</a:t>
             </a:fld>
             <a:endParaRPr lang="en-US"/>
           </a:p>
@@ -17048,7 +17132,7 @@
           <a:p>
             <a:r>
               <a:rPr lang="sk-SK" smtClean="0"/>
-              <a:t>© 2016 EV3Lessons.com, Last Edit 10/18/2016</a:t>
+              <a:t>© 2016 EV3Lessons.com, Last Edit 10/25/2016</a:t>
             </a:r>
             <a:endParaRPr lang="en-US"/>
           </a:p>
@@ -17145,9 +17229,9 @@
           <a:bodyPr/>
           <a:lstStyle/>
           <a:p>
-            <a:fld id="{B58E14B6-273C-5343-9D6F-1AB54B035EDF}" type="datetime1">
-              <a:rPr lang="en-US" smtClean="0"/>
-              <a:t>10/19/16</a:t>
+            <a:fld id="{461DD567-9B7E-CA40-A529-310EE1240C21}" type="datetime1">
+              <a:rPr lang="en-US" smtClean="0"/>
+              <a:t>10/25/16</a:t>
             </a:fld>
             <a:endParaRPr lang="en-US"/>
           </a:p>
@@ -17170,7 +17254,7 @@
           <a:p>
             <a:r>
               <a:rPr lang="sk-SK" smtClean="0"/>
-              <a:t>© 2016 EV3Lessons.com, Last Edit 10/18/2016</a:t>
+              <a:t>© 2016 EV3Lessons.com, Last Edit 10/25/2016</a:t>
             </a:r>
             <a:endParaRPr lang="en-US"/>
           </a:p>
@@ -17516,9 +17600,9 @@
           <a:bodyPr/>
           <a:lstStyle/>
           <a:p>
-            <a:fld id="{8784F740-69F8-FF4F-AD0A-578F19F76FE4}" type="datetime1">
-              <a:rPr lang="en-US" smtClean="0"/>
-              <a:t>10/19/16</a:t>
+            <a:fld id="{16CBC1CA-B7A3-A54E-9DCF-C67D203A80F3}" type="datetime1">
+              <a:rPr lang="en-US" smtClean="0"/>
+              <a:t>10/25/16</a:t>
             </a:fld>
             <a:endParaRPr lang="en-US"/>
           </a:p>
@@ -17541,7 +17625,7 @@
           <a:p>
             <a:r>
               <a:rPr lang="sk-SK" smtClean="0"/>
-              <a:t>© 2016 EV3Lessons.com, Last Edit 10/18/2016</a:t>
+              <a:t>© 2016 EV3Lessons.com, Last Edit 10/25/2016</a:t>
             </a:r>
             <a:endParaRPr lang="en-US"/>
           </a:p>
@@ -17638,9 +17722,9 @@
           <a:bodyPr/>
           <a:lstStyle/>
           <a:p>
-            <a:fld id="{1C8F529B-D2FD-B84C-81DC-59899FD393DE}" type="datetime1">
-              <a:rPr lang="en-US" smtClean="0"/>
-              <a:t>10/19/16</a:t>
+            <a:fld id="{CEC6A59D-30E4-6D4A-BC9F-DEF7F3C49CBE}" type="datetime1">
+              <a:rPr lang="en-US" smtClean="0"/>
+              <a:t>10/25/16</a:t>
             </a:fld>
             <a:endParaRPr lang="en-US"/>
           </a:p>
@@ -17663,7 +17747,7 @@
           <a:p>
             <a:r>
               <a:rPr lang="sk-SK" smtClean="0"/>
-              <a:t>© 2016 EV3Lessons.com, Last Edit 10/18/2016</a:t>
+              <a:t>© 2016 EV3Lessons.com, Last Edit 10/25/2016</a:t>
             </a:r>
             <a:endParaRPr lang="en-US"/>
           </a:p>
@@ -17737,9 +17821,9 @@
           <a:bodyPr/>
           <a:lstStyle/>
           <a:p>
-            <a:fld id="{CB7656A5-BC9B-9D43-9B5F-2C11DF4D04A4}" type="datetime1">
-              <a:rPr lang="en-US" smtClean="0"/>
-              <a:t>10/19/16</a:t>
+            <a:fld id="{77A0845E-062A-1442-88AD-DA618666320B}" type="datetime1">
+              <a:rPr lang="en-US" smtClean="0"/>
+              <a:t>10/25/16</a:t>
             </a:fld>
             <a:endParaRPr lang="en-US"/>
           </a:p>
@@ -17762,7 +17846,7 @@
           <a:p>
             <a:r>
               <a:rPr lang="sk-SK" smtClean="0"/>
-              <a:t>© 2016 EV3Lessons.com, Last Edit 10/18/2016</a:t>
+              <a:t>© 2016 EV3Lessons.com, Last Edit 10/25/2016</a:t>
             </a:r>
             <a:endParaRPr lang="en-US"/>
           </a:p>
@@ -18018,9 +18102,9 @@
           <a:bodyPr/>
           <a:lstStyle/>
           <a:p>
-            <a:fld id="{E0CA8F05-ECDF-664D-81C1-7E86AC0BB0AE}" type="datetime1">
-              <a:rPr lang="en-US" smtClean="0"/>
-              <a:t>10/19/16</a:t>
+            <a:fld id="{30427897-B8DF-554A-992C-01BE3A48866A}" type="datetime1">
+              <a:rPr lang="en-US" smtClean="0"/>
+              <a:t>10/25/16</a:t>
             </a:fld>
             <a:endParaRPr lang="en-US"/>
           </a:p>
@@ -18043,7 +18127,7 @@
           <a:p>
             <a:r>
               <a:rPr lang="sk-SK" smtClean="0"/>
-              <a:t>© 2016 EV3Lessons.com, Last Edit 10/18/2016</a:t>
+              <a:t>© 2016 EV3Lessons.com, Last Edit 10/25/2016</a:t>
             </a:r>
             <a:endParaRPr lang="en-US"/>
           </a:p>
@@ -18279,9 +18363,9 @@
           <a:bodyPr/>
           <a:lstStyle/>
           <a:p>
-            <a:fld id="{2DA4D887-9503-674E-BE82-83C56B3BFA62}" type="datetime1">
-              <a:rPr lang="en-US" smtClean="0"/>
-              <a:t>10/19/16</a:t>
+            <a:fld id="{0FCAE6AE-9C74-7E4E-B2BA-33F129DCFA74}" type="datetime1">
+              <a:rPr lang="en-US" smtClean="0"/>
+              <a:t>10/25/16</a:t>
             </a:fld>
             <a:endParaRPr lang="en-US"/>
           </a:p>
@@ -18304,7 +18388,7 @@
           <a:p>
             <a:r>
               <a:rPr lang="sk-SK" smtClean="0"/>
-              <a:t>© 2016 EV3Lessons.com, Last Edit 10/18/2016</a:t>
+              <a:t>© 2016 EV3Lessons.com, Last Edit 10/25/2016</a:t>
             </a:r>
             <a:endParaRPr lang="en-US"/>
           </a:p>
@@ -18453,9 +18537,9 @@
           <a:bodyPr/>
           <a:lstStyle/>
           <a:p>
-            <a:fld id="{C23F7296-5E2B-2D49-9997-03B2E677912D}" type="datetime1">
-              <a:rPr lang="en-US" smtClean="0"/>
-              <a:t>10/19/16</a:t>
+            <a:fld id="{3196B5D2-C756-2844-8796-14207EA56DDC}" type="datetime1">
+              <a:rPr lang="en-US" smtClean="0"/>
+              <a:t>10/25/16</a:t>
             </a:fld>
             <a:endParaRPr lang="en-US"/>
           </a:p>
@@ -18478,7 +18562,7 @@
           <a:p>
             <a:r>
               <a:rPr lang="sk-SK" smtClean="0"/>
-              <a:t>© 2016 EV3Lessons.com, Last Edit 10/18/2016</a:t>
+              <a:t>© 2016 EV3Lessons.com, Last Edit 10/25/2016</a:t>
             </a:r>
             <a:endParaRPr lang="en-US"/>
           </a:p>
@@ -18637,9 +18721,9 @@
           <a:bodyPr/>
           <a:lstStyle/>
           <a:p>
-            <a:fld id="{34C927BB-2F1D-1B46-87F4-9D56ACF67290}" type="datetime1">
-              <a:rPr lang="en-US" smtClean="0"/>
-              <a:t>10/19/16</a:t>
+            <a:fld id="{F5D70862-C264-9F4D-99CD-B0A949988098}" type="datetime1">
+              <a:rPr lang="en-US" smtClean="0"/>
+              <a:t>10/25/16</a:t>
             </a:fld>
             <a:endParaRPr lang="en-US"/>
           </a:p>
@@ -18662,7 +18746,7 @@
           <a:p>
             <a:r>
               <a:rPr lang="sk-SK" smtClean="0"/>
-              <a:t>© 2016 EV3Lessons.com, Last Edit 10/18/2016</a:t>
+              <a:t>© 2016 EV3Lessons.com, Last Edit 10/25/2016</a:t>
             </a:r>
             <a:endParaRPr lang="en-US"/>
           </a:p>
@@ -18736,9 +18820,9 @@
           <a:bodyPr/>
           <a:lstStyle/>
           <a:p>
-            <a:fld id="{F9BBF52E-5F4E-DB47-A695-B7AC34943325}" type="datetime1">
-              <a:rPr lang="en-US" smtClean="0"/>
-              <a:t>10/19/16</a:t>
+            <a:fld id="{168B00E1-C233-CB49-B827-93E45885838A}" type="datetime1">
+              <a:rPr lang="en-US" smtClean="0"/>
+              <a:t>10/25/16</a:t>
             </a:fld>
             <a:endParaRPr lang="en-US"/>
           </a:p>
@@ -18761,7 +18845,7 @@
           <a:p>
             <a:r>
               <a:rPr lang="sk-SK" smtClean="0"/>
-              <a:t>© 2016 EV3Lessons.com, Last Edit 10/18/2016</a:t>
+              <a:t>© 2016 EV3Lessons.com, Last Edit 10/25/2016</a:t>
             </a:r>
             <a:endParaRPr lang="en-US"/>
           </a:p>
@@ -18987,9 +19071,9 @@
           <a:bodyPr/>
           <a:lstStyle/>
           <a:p>
-            <a:fld id="{6978ED6B-2251-1942-9E67-79B8705BBBC1}" type="datetime1">
-              <a:rPr lang="en-US" smtClean="0"/>
-              <a:t>10/19/16</a:t>
+            <a:fld id="{95D23563-1E27-C44C-8624-45FF502A3F6C}" type="datetime1">
+              <a:rPr lang="en-US" smtClean="0"/>
+              <a:t>10/25/16</a:t>
             </a:fld>
             <a:endParaRPr lang="en-US"/>
           </a:p>
@@ -19012,7 +19096,7 @@
           <a:p>
             <a:r>
               <a:rPr lang="sk-SK" smtClean="0"/>
-              <a:t>© 2016 EV3Lessons.com, Last Edit 10/18/2016</a:t>
+              <a:t>© 2016 EV3Lessons.com, Last Edit 10/25/2016</a:t>
             </a:r>
             <a:endParaRPr lang="en-US"/>
           </a:p>
@@ -19290,9 +19374,9 @@
           <a:bodyPr/>
           <a:lstStyle/>
           <a:p>
-            <a:fld id="{1F440DAE-8A6C-4F43-96CB-F525709CCAA3}" type="datetime1">
-              <a:rPr lang="en-US" smtClean="0"/>
-              <a:t>10/19/16</a:t>
+            <a:fld id="{2DCFF1AE-7B64-5C4E-8B85-2AB09EC3E440}" type="datetime1">
+              <a:rPr lang="en-US" smtClean="0"/>
+              <a:t>10/25/16</a:t>
             </a:fld>
             <a:endParaRPr lang="en-US"/>
           </a:p>
@@ -19315,7 +19399,7 @@
           <a:p>
             <a:r>
               <a:rPr lang="sk-SK" smtClean="0"/>
-              <a:t>© 2016 EV3Lessons.com, Last Edit 10/18/2016</a:t>
+              <a:t>© 2016 EV3Lessons.com, Last Edit 10/25/2016</a:t>
             </a:r>
             <a:endParaRPr lang="en-US"/>
           </a:p>
@@ -19593,9 +19677,9 @@
             </a:lvl1pPr>
           </a:lstStyle>
           <a:p>
-            <a:fld id="{B8C93E34-5C7A-0F43-9E4F-06E6760709E1}" type="datetime1">
-              <a:rPr lang="en-US" smtClean="0"/>
-              <a:t>10/19/16</a:t>
+            <a:fld id="{D75C225A-CF2F-C14B-95E5-8671EBE241D2}" type="datetime1">
+              <a:rPr lang="en-US" smtClean="0"/>
+              <a:t>10/25/16</a:t>
             </a:fld>
             <a:endParaRPr lang="en-US"/>
           </a:p>
@@ -19634,7 +19718,7 @@
           <a:p>
             <a:r>
               <a:rPr lang="sk-SK" smtClean="0"/>
-              <a:t>© 2016 EV3Lessons.com, Last Edit 10/18/2016</a:t>
+              <a:t>© 2016 EV3Lessons.com, Last Edit 10/25/2016</a:t>
             </a:r>
             <a:endParaRPr lang="en-US"/>
           </a:p>
@@ -20117,7 +20201,7 @@
     <p:sldLayoutId id="2147483845" r:id="rId10"/>
     <p:sldLayoutId id="2147483846" r:id="rId11"/>
   </p:sldLayoutIdLst>
-  <p:hf hdr="0" dt="0"/>
+  <p:hf sldNum="0" hdr="0" dt="0"/>
   <p:txStyles>
     <p:titleStyle>
       <a:lvl1pPr algn="l" defTabSz="914400" rtl="0" eaLnBrk="1" latinLnBrk="0" hangingPunct="1">
@@ -20546,9 +20630,9 @@
             </a:lvl1pPr>
           </a:lstStyle>
           <a:p>
-            <a:fld id="{2CAAFB42-3480-7A47-886A-33C45F53FB96}" type="datetime1">
-              <a:rPr lang="en-US" smtClean="0"/>
-              <a:t>10/19/16</a:t>
+            <a:fld id="{B017A7C1-D332-8045-8087-00B9E6E329AF}" type="datetime1">
+              <a:rPr lang="en-US" smtClean="0"/>
+              <a:t>10/25/16</a:t>
             </a:fld>
             <a:endParaRPr lang="en-US"/>
           </a:p>
@@ -20587,7 +20671,7 @@
           <a:p>
             <a:r>
               <a:rPr lang="sk-SK" smtClean="0"/>
-              <a:t>© 2016 EV3Lessons.com, Last Edit 10/18/2016</a:t>
+              <a:t>© 2016 EV3Lessons.com, Last Edit 10/25/2016</a:t>
             </a:r>
             <a:endParaRPr lang="en-US"/>
           </a:p>
@@ -21183,7 +21267,7 @@
       </p:par>
     </p:tnLst>
   </p:timing>
-  <p:hf hdr="0" dt="0"/>
+  <p:hf sldNum="0" hdr="0" dt="0"/>
   <p:txStyles>
     <p:titleStyle>
       <a:lvl1pPr algn="l" defTabSz="914400" rtl="0" eaLnBrk="1" latinLnBrk="0" hangingPunct="1">
@@ -21614,9 +21698,9 @@
             </a:lvl1pPr>
           </a:lstStyle>
           <a:p>
-            <a:fld id="{4986EEDC-3481-AF46-B982-85D97F34AA35}" type="datetime1">
-              <a:rPr lang="en-US" smtClean="0"/>
-              <a:t>10/19/16</a:t>
+            <a:fld id="{9EAF20B8-46A4-9045-8082-E3561F3D9569}" type="datetime1">
+              <a:rPr lang="en-US" smtClean="0"/>
+              <a:t>10/25/16</a:t>
             </a:fld>
             <a:endParaRPr lang="en-US"/>
           </a:p>
@@ -21657,7 +21741,7 @@
           <a:p>
             <a:r>
               <a:rPr lang="sk-SK" smtClean="0"/>
-              <a:t>© 2016 EV3Lessons.com, Last Edit 10/18/2016</a:t>
+              <a:t>© 2016 EV3Lessons.com, Last Edit 10/25/2016</a:t>
             </a:r>
             <a:endParaRPr lang="en-US"/>
           </a:p>
@@ -21725,7 +21809,7 @@
     <p:sldLayoutId id="2147483869" r:id="rId10"/>
     <p:sldLayoutId id="2147483870" r:id="rId11"/>
   </p:sldLayoutIdLst>
-  <p:hf hdr="0" dt="0"/>
+  <p:hf sldNum="0" hdr="0" dt="0"/>
   <p:txStyles>
     <p:titleStyle>
       <a:lvl1pPr algn="l" defTabSz="914400" rtl="0" eaLnBrk="1" latinLnBrk="0" hangingPunct="1">
@@ -22157,9 +22241,9 @@
             </a:lvl1pPr>
           </a:lstStyle>
           <a:p>
-            <a:fld id="{CFC19486-466B-D544-A70B-F010200A9085}" type="datetime1">
-              <a:rPr lang="en-US" smtClean="0"/>
-              <a:t>10/19/16</a:t>
+            <a:fld id="{A1354666-E891-444B-8FC8-FD46E0188A5F}" type="datetime1">
+              <a:rPr lang="en-US" smtClean="0"/>
+              <a:t>10/25/16</a:t>
             </a:fld>
             <a:endParaRPr lang="en-US"/>
           </a:p>
@@ -22198,7 +22282,7 @@
           <a:p>
             <a:r>
               <a:rPr lang="sk-SK" smtClean="0"/>
-              <a:t>© 2016 EV3Lessons.com, Last Edit 10/18/2016</a:t>
+              <a:t>© 2016 EV3Lessons.com, Last Edit 10/25/2016</a:t>
             </a:r>
             <a:endParaRPr lang="en-US"/>
           </a:p>
@@ -23098,7 +23182,7 @@
     <p:sldLayoutId id="2147483881" r:id="rId10"/>
     <p:sldLayoutId id="2147483882" r:id="rId11"/>
   </p:sldLayoutIdLst>
-  <p:hf hdr="0" dt="0"/>
+  <p:hf sldNum="0" hdr="0" dt="0"/>
   <p:txStyles>
     <p:titleStyle>
       <a:lvl1pPr algn="l" defTabSz="914400" rtl="0" eaLnBrk="1" latinLnBrk="0" hangingPunct="1">
@@ -23527,9 +23611,9 @@
             </a:lvl1pPr>
           </a:lstStyle>
           <a:p>
-            <a:fld id="{88B89251-5A3E-7A40-A44E-652B62FBA553}" type="datetime1">
-              <a:rPr lang="en-US" smtClean="0"/>
-              <a:t>10/19/16</a:t>
+            <a:fld id="{BD145B49-2F97-264D-8BD6-FA738E768095}" type="datetime1">
+              <a:rPr lang="en-US" smtClean="0"/>
+              <a:t>10/25/16</a:t>
             </a:fld>
             <a:endParaRPr lang="en-US"/>
           </a:p>
@@ -23568,7 +23652,7 @@
           <a:p>
             <a:r>
               <a:rPr lang="sk-SK" smtClean="0"/>
-              <a:t>© 2016 EV3Lessons.com, Last Edit 10/18/2016</a:t>
+              <a:t>© 2016 EV3Lessons.com, Last Edit 10/25/2016</a:t>
             </a:r>
             <a:endParaRPr lang="en-US"/>
           </a:p>
@@ -24186,7 +24270,7 @@
       </p:par>
     </p:tnLst>
   </p:timing>
-  <p:hf hdr="0" dt="0"/>
+  <p:hf sldNum="0" hdr="0" dt="0"/>
   <p:txStyles>
     <p:titleStyle>
       <a:lvl1pPr algn="l" defTabSz="914400" rtl="0" eaLnBrk="1" latinLnBrk="0" hangingPunct="1">
@@ -24617,9 +24701,9 @@
             </a:lvl1pPr>
           </a:lstStyle>
           <a:p>
-            <a:fld id="{8C91D27B-C120-484F-80BE-82C95304C4BB}" type="datetime1">
-              <a:rPr lang="en-US" smtClean="0"/>
-              <a:t>10/19/16</a:t>
+            <a:fld id="{2DF0F74B-BFAB-BC45-954A-DEFADF45D947}" type="datetime1">
+              <a:rPr lang="en-US" smtClean="0"/>
+              <a:t>10/25/16</a:t>
             </a:fld>
             <a:endParaRPr lang="en-US"/>
           </a:p>
@@ -24660,7 +24744,7 @@
           <a:p>
             <a:r>
               <a:rPr lang="sk-SK" smtClean="0"/>
-              <a:t>© 2016 EV3Lessons.com, Last Edit 10/18/2016</a:t>
+              <a:t>© 2016 EV3Lessons.com, Last Edit 10/25/2016</a:t>
             </a:r>
             <a:endParaRPr lang="en-US"/>
           </a:p>
@@ -24728,7 +24812,7 @@
     <p:sldLayoutId id="2147483905" r:id="rId10"/>
     <p:sldLayoutId id="2147483906" r:id="rId11"/>
   </p:sldLayoutIdLst>
-  <p:hf hdr="0" dt="0"/>
+  <p:hf sldNum="0" hdr="0" dt="0"/>
   <p:txStyles>
     <p:titleStyle>
       <a:lvl1pPr algn="l" defTabSz="914400" rtl="0" eaLnBrk="1" latinLnBrk="0" hangingPunct="1">
@@ -25039,9 +25123,16 @@
             <p:ph type="subTitle" idx="1"/>
           </p:nvPr>
         </p:nvSpPr>
-        <p:spPr/>
-        <p:txBody>
-          <a:bodyPr/>
+        <p:spPr>
+          <a:xfrm>
+            <a:off x="668594" y="3427224"/>
+            <a:ext cx="7816645" cy="914400"/>
+          </a:xfrm>
+        </p:spPr>
+        <p:txBody>
+          <a:bodyPr>
+            <a:normAutofit/>
+          </a:bodyPr>
           <a:lstStyle/>
           <a:p>
             <a:r>
@@ -25053,7 +25144,15 @@
             </a:br>
             <a:r>
               <a:rPr lang="en-US" dirty="0" smtClean="0"/>
-              <a:t>(a.k.a. the VM Instruction Break Error)</a:t>
+              <a:t>(a.k.a. the VM </a:t>
+            </a:r>
+            <a:r>
+              <a:rPr lang="en-US" dirty="0" smtClean="0"/>
+              <a:t>Program Instruction </a:t>
+            </a:r>
+            <a:r>
+              <a:rPr lang="en-US" dirty="0" smtClean="0"/>
+              <a:t>Break Error)</a:t>
             </a:r>
             <a:endParaRPr lang="en-US" dirty="0"/>
           </a:p>
@@ -25092,7 +25191,7 @@
           <p:nvPr/>
         </p:nvPicPr>
         <p:blipFill rotWithShape="1">
-          <a:blip r:embed="rId2">
+          <a:blip r:embed="rId3">
             <a:extLst>
               <a:ext uri="{28A0092B-C50C-407E-A947-70E740481C1C}">
                 <a14:useLocalDpi xmlns:a14="http://schemas.microsoft.com/office/drawing/2010/main" val="0"/>
@@ -25189,32 +25288,9 @@
           <a:p>
             <a:r>
               <a:rPr lang="sk-SK" smtClean="0"/>
-              <a:t>© 2016 EV3Lessons.com, Last Edit 10/18/2016</a:t>
-            </a:r>
-            <a:endParaRPr lang="en-US"/>
-          </a:p>
-        </p:txBody>
-      </p:sp>
-      <p:sp>
-        <p:nvSpPr>
-          <p:cNvPr id="5" name="Slide Number Placeholder 4"/>
-          <p:cNvSpPr>
-            <a:spLocks noGrp="1"/>
-          </p:cNvSpPr>
-          <p:nvPr>
-            <p:ph type="sldNum" sz="quarter" idx="12"/>
-          </p:nvPr>
-        </p:nvSpPr>
-        <p:spPr/>
-        <p:txBody>
-          <a:bodyPr/>
-          <a:lstStyle/>
-          <a:p>
-            <a:fld id="{4DBC7FC8-25FB-FC45-8177-2B991DA6778C}" type="slidenum">
-              <a:rPr lang="en-US" smtClean="0"/>
-              <a:t>10</a:t>
-            </a:fld>
-            <a:endParaRPr lang="en-US" dirty="0"/>
+              <a:t>© 2016 EV3Lessons.com, Last Edit 10/25/2016</a:t>
+            </a:r>
+            <a:endParaRPr lang="en-US"/>
           </a:p>
         </p:txBody>
       </p:sp>
@@ -25837,32 +25913,9 @@
           <a:p>
             <a:r>
               <a:rPr lang="sk-SK" smtClean="0"/>
-              <a:t>© 2016 EV3Lessons.com, Last Edit 10/18/2016</a:t>
-            </a:r>
-            <a:endParaRPr lang="en-US"/>
-          </a:p>
-        </p:txBody>
-      </p:sp>
-      <p:sp>
-        <p:nvSpPr>
-          <p:cNvPr id="5" name="Slide Number Placeholder 4"/>
-          <p:cNvSpPr>
-            <a:spLocks noGrp="1"/>
-          </p:cNvSpPr>
-          <p:nvPr>
-            <p:ph type="sldNum" sz="quarter" idx="12"/>
-          </p:nvPr>
-        </p:nvSpPr>
-        <p:spPr/>
-        <p:txBody>
-          <a:bodyPr/>
-          <a:lstStyle/>
-          <a:p>
-            <a:fld id="{4DBC7FC8-25FB-FC45-8177-2B991DA6778C}" type="slidenum">
-              <a:rPr lang="en-US" smtClean="0"/>
-              <a:t>11</a:t>
-            </a:fld>
-            <a:endParaRPr lang="en-US" dirty="0"/>
+              <a:t>© 2016 EV3Lessons.com, Last Edit 10/25/2016</a:t>
+            </a:r>
+            <a:endParaRPr lang="en-US"/>
           </a:p>
         </p:txBody>
       </p:sp>
@@ -26361,29 +26414,8 @@
             </a:pPr>
             <a:r>
               <a:rPr lang="en-US" dirty="0" smtClean="0"/>
-              <a:t>LEGO </a:t>
-            </a:r>
-            <a:r>
-              <a:rPr lang="en-US" dirty="0" smtClean="0"/>
-              <a:t>has </a:t>
-            </a:r>
-            <a:r>
-              <a:rPr lang="en-US" dirty="0" smtClean="0"/>
-              <a:t>released </a:t>
-            </a:r>
-            <a:r>
-              <a:rPr lang="en-US" dirty="0" smtClean="0"/>
-              <a:t>an update to the EV3 programming </a:t>
-            </a:r>
-            <a:r>
-              <a:rPr lang="en-US" dirty="0" smtClean="0"/>
-              <a:t>software </a:t>
-            </a:r>
-            <a:r>
-              <a:rPr lang="en-US" dirty="0" smtClean="0"/>
-              <a:t>with a bug fix </a:t>
-            </a:r>
-            <a:endParaRPr lang="en-US" dirty="0" smtClean="0"/>
+              <a:t>LEGO has released an update to the EV3 programming software with a bug fix </a:t>
+            </a:r>
           </a:p>
           <a:p>
             <a:pPr marL="800100" lvl="1" indent="-342900">
@@ -26392,11 +26424,49 @@
             </a:pPr>
             <a:r>
               <a:rPr lang="en-US" dirty="0" smtClean="0"/>
-              <a:t>As of of 10/19/2016</a:t>
+              <a:t>As of of </a:t>
             </a:r>
             <a:r>
               <a:rPr lang="en-US" dirty="0" smtClean="0"/>
-              <a:t>, Retail V. 1.2.2 is available for download</a:t>
+              <a:t>10/25/2016</a:t>
+            </a:r>
+            <a:r>
+              <a:rPr lang="en-US" dirty="0" smtClean="0"/>
+              <a:t>, </a:t>
+            </a:r>
+            <a:r>
+              <a:rPr lang="en-US" dirty="0" smtClean="0"/>
+              <a:t>both Retail and Education editions of V</a:t>
+            </a:r>
+            <a:r>
+              <a:rPr lang="en-US" dirty="0" smtClean="0"/>
+              <a:t>. 1.2.2 </a:t>
+            </a:r>
+            <a:r>
+              <a:rPr lang="en-US" dirty="0" smtClean="0"/>
+              <a:t>are </a:t>
+            </a:r>
+            <a:r>
+              <a:rPr lang="en-US" dirty="0" smtClean="0"/>
+              <a:t>available </a:t>
+            </a:r>
+            <a:r>
+              <a:rPr lang="en-US" dirty="0" smtClean="0"/>
+              <a:t>for </a:t>
+            </a:r>
+            <a:r>
+              <a:rPr lang="en-US" dirty="0" smtClean="0"/>
+              <a:t>download</a:t>
+            </a:r>
+          </a:p>
+          <a:p>
+            <a:pPr marL="342900" indent="-342900">
+              <a:buFont typeface="Arial" charset="0"/>
+              <a:buChar char="•"/>
+            </a:pPr>
+            <a:r>
+              <a:rPr lang="en-US" dirty="0" smtClean="0"/>
+              <a:t>Download and install the update on your PC</a:t>
             </a:r>
           </a:p>
           <a:p>
@@ -26406,53 +26476,11 @@
             </a:pPr>
             <a:r>
               <a:rPr lang="en-US" dirty="0" smtClean="0"/>
-              <a:t>Edu version of the software coming soon</a:t>
-            </a:r>
-            <a:endParaRPr lang="en-US" dirty="0" smtClean="0"/>
-          </a:p>
-          <a:p>
-            <a:pPr marL="342900" indent="-342900">
-              <a:buFont typeface="Arial" charset="0"/>
-              <a:buChar char="•"/>
-            </a:pPr>
-            <a:r>
-              <a:rPr lang="en-US" dirty="0"/>
-              <a:t>D</a:t>
+              <a:t>After </a:t>
             </a:r>
             <a:r>
               <a:rPr lang="en-US" dirty="0" smtClean="0"/>
-              <a:t>ownload </a:t>
-            </a:r>
-            <a:r>
-              <a:rPr lang="en-US" dirty="0" smtClean="0"/>
-              <a:t>and install </a:t>
-            </a:r>
-            <a:r>
-              <a:rPr lang="en-US" dirty="0" smtClean="0"/>
-              <a:t>the update </a:t>
-            </a:r>
-            <a:r>
-              <a:rPr lang="en-US" dirty="0" smtClean="0"/>
-              <a:t>on </a:t>
-            </a:r>
-            <a:r>
-              <a:rPr lang="en-US" dirty="0" smtClean="0"/>
-              <a:t>your </a:t>
-            </a:r>
-            <a:r>
-              <a:rPr lang="en-US" dirty="0" smtClean="0"/>
-              <a:t>PC</a:t>
-            </a:r>
-            <a:endParaRPr lang="en-US" dirty="0" smtClean="0"/>
-          </a:p>
-          <a:p>
-            <a:pPr marL="342900" indent="-342900">
-              <a:buFont typeface="Arial" charset="0"/>
-              <a:buChar char="•"/>
-            </a:pPr>
-            <a:r>
-              <a:rPr lang="en-US" dirty="0" smtClean="0"/>
-              <a:t>After that, you can load any program you had symptoms such as “VM Instruction Break” that were caused by the bad branches and just download again to your EV3. The newly downloaded code should not have any bad branching code!</a:t>
+              <a:t>that, you can load any program you had symptoms such as “VM Instruction Break” that were caused by the bad branches and just download again to your EV3. The newly downloaded code should not have any bad branching code!</a:t>
             </a:r>
             <a:endParaRPr lang="en-US" dirty="0"/>
           </a:p>
@@ -26475,32 +26503,9 @@
           <a:p>
             <a:r>
               <a:rPr lang="sk-SK" smtClean="0"/>
-              <a:t>© 2016 EV3Lessons.com, Last Edit 10/18/2016</a:t>
-            </a:r>
-            <a:endParaRPr lang="en-US"/>
-          </a:p>
-        </p:txBody>
-      </p:sp>
-      <p:sp>
-        <p:nvSpPr>
-          <p:cNvPr id="5" name="Slide Number Placeholder 4"/>
-          <p:cNvSpPr>
-            <a:spLocks noGrp="1"/>
-          </p:cNvSpPr>
-          <p:nvPr>
-            <p:ph type="sldNum" sz="quarter" idx="12"/>
-          </p:nvPr>
-        </p:nvSpPr>
-        <p:spPr/>
-        <p:txBody>
-          <a:bodyPr/>
-          <a:lstStyle/>
-          <a:p>
-            <a:fld id="{4DBC7FC8-25FB-FC45-8177-2B991DA6778C}" type="slidenum">
-              <a:rPr lang="en-US" smtClean="0"/>
-              <a:t>12</a:t>
-            </a:fld>
-            <a:endParaRPr lang="en-US" dirty="0"/>
+              <a:t>© 2016 EV3Lessons.com, Last Edit 10/25/2016</a:t>
+            </a:r>
+            <a:endParaRPr lang="en-US"/>
           </a:p>
         </p:txBody>
       </p:sp>
@@ -26585,7 +26590,15 @@
             <a:pPr marL="914400" lvl="1" indent="-457200"/>
             <a:r>
               <a:rPr lang="en-US" dirty="0" smtClean="0"/>
-              <a:t>A big part of finding the solution to the “VM Instruction Break” error was FLL, WRO teams and other robot builders reporting and discussing errors</a:t>
+              <a:t>A big part of finding the solution to the “VM </a:t>
+            </a:r>
+            <a:r>
+              <a:rPr lang="en-US" dirty="0" smtClean="0"/>
+              <a:t>Program Instruction </a:t>
+            </a:r>
+            <a:r>
+              <a:rPr lang="en-US" dirty="0" smtClean="0"/>
+              <a:t>Break” error was FLL, WRO teams and other robot builders reporting and discussing errors</a:t>
             </a:r>
           </a:p>
           <a:p>
@@ -26646,32 +26659,9 @@
           <a:p>
             <a:r>
               <a:rPr lang="sk-SK" smtClean="0"/>
-              <a:t>© 2016 EV3Lessons.com, Last Edit 10/18/2016</a:t>
-            </a:r>
-            <a:endParaRPr lang="en-US"/>
-          </a:p>
-        </p:txBody>
-      </p:sp>
-      <p:sp>
-        <p:nvSpPr>
-          <p:cNvPr id="5" name="Slide Number Placeholder 4"/>
-          <p:cNvSpPr>
-            <a:spLocks noGrp="1"/>
-          </p:cNvSpPr>
-          <p:nvPr>
-            <p:ph type="sldNum" sz="quarter" idx="12"/>
-          </p:nvPr>
-        </p:nvSpPr>
-        <p:spPr/>
-        <p:txBody>
-          <a:bodyPr/>
-          <a:lstStyle/>
-          <a:p>
-            <a:fld id="{4DBC7FC8-25FB-FC45-8177-2B991DA6778C}" type="slidenum">
-              <a:rPr lang="en-US" smtClean="0"/>
-              <a:t>13</a:t>
-            </a:fld>
-            <a:endParaRPr lang="en-US" dirty="0"/>
+              <a:t>© 2016 EV3Lessons.com, Last Edit 10/25/2016</a:t>
+            </a:r>
+            <a:endParaRPr lang="en-US"/>
           </a:p>
         </p:txBody>
       </p:sp>
@@ -26768,11 +26758,7 @@
             </a:r>
             <a:r>
               <a:rPr lang="en-US" sz="3200" dirty="0" smtClean="0"/>
-              <a:t>community, National Instruments, and </a:t>
-            </a:r>
-            <a:r>
-              <a:rPr lang="en-US" sz="3200" dirty="0" smtClean="0"/>
-              <a:t>LEGO who </a:t>
+              <a:t>community, National Instruments, and LEGO who </a:t>
             </a:r>
             <a:r>
               <a:rPr lang="en-US" sz="3200" dirty="0"/>
@@ -26802,32 +26788,9 @@
           <a:p>
             <a:r>
               <a:rPr lang="sk-SK" smtClean="0"/>
-              <a:t>© 2016 EV3Lessons.com, Last Edit 10/18/2016</a:t>
-            </a:r>
-            <a:endParaRPr lang="en-US"/>
-          </a:p>
-        </p:txBody>
-      </p:sp>
-      <p:sp>
-        <p:nvSpPr>
-          <p:cNvPr id="5" name="Slide Number Placeholder 4"/>
-          <p:cNvSpPr>
-            <a:spLocks noGrp="1"/>
-          </p:cNvSpPr>
-          <p:nvPr>
-            <p:ph type="sldNum" sz="quarter" idx="12"/>
-          </p:nvPr>
-        </p:nvSpPr>
-        <p:spPr/>
-        <p:txBody>
-          <a:bodyPr/>
-          <a:lstStyle/>
-          <a:p>
-            <a:fld id="{4DBC7FC8-25FB-FC45-8177-2B991DA6778C}" type="slidenum">
-              <a:rPr lang="en-US" smtClean="0"/>
-              <a:t>14</a:t>
-            </a:fld>
-            <a:endParaRPr lang="en-US" dirty="0"/>
+              <a:t>© 2016 EV3Lessons.com, Last Edit 10/25/2016</a:t>
+            </a:r>
+            <a:endParaRPr lang="en-US"/>
           </a:p>
         </p:txBody>
       </p:sp>
@@ -26957,32 +26920,8 @@
           <a:p>
             <a:r>
               <a:rPr lang="sk-SK" smtClean="0"/>
-              <a:t>© 2016 EV3Lessons.com, Last Edit 10/18/2016</a:t>
-            </a:r>
-            <a:endParaRPr lang="en-US"/>
-          </a:p>
-        </p:txBody>
-      </p:sp>
-      <p:sp>
-        <p:nvSpPr>
-          <p:cNvPr id="7" name="Slide Number Placeholder 6"/>
-          <p:cNvSpPr>
-            <a:spLocks noGrp="1"/>
-          </p:cNvSpPr>
-          <p:nvPr>
-            <p:ph type="sldNum" sz="quarter" idx="12"/>
-          </p:nvPr>
-        </p:nvSpPr>
-        <p:spPr/>
-        <p:txBody>
-          <a:bodyPr/>
-          <a:lstStyle/>
-          <a:p>
-            <a:fld id="{4382A7F7-08BF-4252-8141-63FB96055BBB}" type="slidenum">
-              <a:rPr lang="en-US" smtClean="0"/>
-              <a:pPr/>
-              <a:t>15</a:t>
-            </a:fld>
+              <a:t>© 2016 EV3Lessons.com, Last Edit 10/25/2016</a:t>
+            </a:r>
             <a:endParaRPr lang="en-US"/>
           </a:p>
         </p:txBody>
@@ -27012,7 +26951,7 @@
           <a:effectLst/>
           <a:extLst>
             <a:ext uri="{91240B29-F687-4f45-9708-019B960494DF}">
-              <a14:hiddenLine xmlns="" xmlns:a14="http://schemas.microsoft.com/office/drawing/2010/main" w="9525">
+              <a14:hiddenLine xmlns:a14="http://schemas.microsoft.com/office/drawing/2010/main" xmlns="" w="9525">
                 <a:solidFill>
                   <a:schemeClr val="tx1"/>
                 </a:solidFill>
@@ -27022,7 +26961,7 @@
               </a14:hiddenLine>
             </a:ext>
             <a:ext uri="{AF507438-7753-43e0-B8FC-AC1667EBCBE1}">
-              <a14:hiddenEffects xmlns="" xmlns:a14="http://schemas.microsoft.com/office/drawing/2010/main">
+              <a14:hiddenEffects xmlns:a14="http://schemas.microsoft.com/office/drawing/2010/main" xmlns="">
                 <a:effectLst>
                   <a:outerShdw dist="35921" dir="2700000" algn="ctr" rotWithShape="0">
                     <a:schemeClr val="bg2"/>
@@ -27375,7 +27314,7 @@
           <a:noFill/>
           <a:extLst>
             <a:ext uri="{909E8E84-426E-40dd-AFC4-6F175D3DCCD1}">
-              <a14:hiddenFill xmlns="" xmlns:a14="http://schemas.microsoft.com/office/drawing/2010/main">
+              <a14:hiddenFill xmlns:a14="http://schemas.microsoft.com/office/drawing/2010/main" xmlns="">
                 <a:solidFill>
                   <a:srgbClr val="FFFFFF"/>
                 </a:solidFill>
@@ -27528,32 +27467,9 @@
           <a:p>
             <a:r>
               <a:rPr lang="sk-SK" smtClean="0"/>
-              <a:t>© 2016 EV3Lessons.com, Last Edit 10/18/2016</a:t>
-            </a:r>
-            <a:endParaRPr lang="en-US"/>
-          </a:p>
-        </p:txBody>
-      </p:sp>
-      <p:sp>
-        <p:nvSpPr>
-          <p:cNvPr id="5" name="Slide Number Placeholder 4"/>
-          <p:cNvSpPr>
-            <a:spLocks noGrp="1"/>
-          </p:cNvSpPr>
-          <p:nvPr>
-            <p:ph type="sldNum" sz="quarter" idx="12"/>
-          </p:nvPr>
-        </p:nvSpPr>
-        <p:spPr/>
-        <p:txBody>
-          <a:bodyPr/>
-          <a:lstStyle/>
-          <a:p>
-            <a:fld id="{4DBC7FC8-25FB-FC45-8177-2B991DA6778C}" type="slidenum">
-              <a:rPr lang="en-US" smtClean="0"/>
-              <a:t>2</a:t>
-            </a:fld>
-            <a:endParaRPr lang="en-US" dirty="0"/>
+              <a:t>© 2016 EV3Lessons.com, Last Edit 10/25/2016</a:t>
+            </a:r>
+            <a:endParaRPr lang="en-US"/>
           </a:p>
         </p:txBody>
       </p:sp>
@@ -27690,32 +27606,9 @@
           <a:p>
             <a:r>
               <a:rPr lang="sk-SK" smtClean="0"/>
-              <a:t>© 2016 EV3Lessons.com, Last Edit 10/18/2016</a:t>
-            </a:r>
-            <a:endParaRPr lang="en-US"/>
-          </a:p>
-        </p:txBody>
-      </p:sp>
-      <p:sp>
-        <p:nvSpPr>
-          <p:cNvPr id="5" name="Slide Number Placeholder 4"/>
-          <p:cNvSpPr>
-            <a:spLocks noGrp="1"/>
-          </p:cNvSpPr>
-          <p:nvPr>
-            <p:ph type="sldNum" sz="quarter" idx="12"/>
-          </p:nvPr>
-        </p:nvSpPr>
-        <p:spPr/>
-        <p:txBody>
-          <a:bodyPr/>
-          <a:lstStyle/>
-          <a:p>
-            <a:fld id="{4DBC7FC8-25FB-FC45-8177-2B991DA6778C}" type="slidenum">
-              <a:rPr lang="en-US" smtClean="0"/>
-              <a:t>3</a:t>
-            </a:fld>
-            <a:endParaRPr lang="en-US" dirty="0"/>
+              <a:t>© 2016 EV3Lessons.com, Last Edit 10/25/2016</a:t>
+            </a:r>
+            <a:endParaRPr lang="en-US"/>
           </a:p>
         </p:txBody>
       </p:sp>
@@ -27926,32 +27819,9 @@
           <a:p>
             <a:r>
               <a:rPr lang="sk-SK" smtClean="0"/>
-              <a:t>© 2016 EV3Lessons.com, Last Edit 10/18/2016</a:t>
-            </a:r>
-            <a:endParaRPr lang="en-US"/>
-          </a:p>
-        </p:txBody>
-      </p:sp>
-      <p:sp>
-        <p:nvSpPr>
-          <p:cNvPr id="5" name="Slide Number Placeholder 4"/>
-          <p:cNvSpPr>
-            <a:spLocks noGrp="1"/>
-          </p:cNvSpPr>
-          <p:nvPr>
-            <p:ph type="sldNum" sz="quarter" idx="12"/>
-          </p:nvPr>
-        </p:nvSpPr>
-        <p:spPr/>
-        <p:txBody>
-          <a:bodyPr/>
-          <a:lstStyle/>
-          <a:p>
-            <a:fld id="{4DBC7FC8-25FB-FC45-8177-2B991DA6778C}" type="slidenum">
-              <a:rPr lang="en-US" smtClean="0"/>
-              <a:t>4</a:t>
-            </a:fld>
-            <a:endParaRPr lang="en-US" dirty="0"/>
+              <a:t>© 2016 EV3Lessons.com, Last Edit 10/25/2016</a:t>
+            </a:r>
+            <a:endParaRPr lang="en-US"/>
           </a:p>
         </p:txBody>
       </p:sp>
@@ -28089,32 +27959,9 @@
           <a:p>
             <a:r>
               <a:rPr lang="sk-SK" smtClean="0"/>
-              <a:t>© 2016 EV3Lessons.com, Last Edit 10/18/2016</a:t>
-            </a:r>
-            <a:endParaRPr lang="en-US"/>
-          </a:p>
-        </p:txBody>
-      </p:sp>
-      <p:sp>
-        <p:nvSpPr>
-          <p:cNvPr id="5" name="Slide Number Placeholder 4"/>
-          <p:cNvSpPr>
-            <a:spLocks noGrp="1"/>
-          </p:cNvSpPr>
-          <p:nvPr>
-            <p:ph type="sldNum" sz="quarter" idx="12"/>
-          </p:nvPr>
-        </p:nvSpPr>
-        <p:spPr/>
-        <p:txBody>
-          <a:bodyPr/>
-          <a:lstStyle/>
-          <a:p>
-            <a:fld id="{4DBC7FC8-25FB-FC45-8177-2B991DA6778C}" type="slidenum">
-              <a:rPr lang="en-US" smtClean="0"/>
-              <a:t>5</a:t>
-            </a:fld>
-            <a:endParaRPr lang="en-US" dirty="0"/>
+              <a:t>© 2016 EV3Lessons.com, Last Edit 10/25/2016</a:t>
+            </a:r>
+            <a:endParaRPr lang="en-US"/>
           </a:p>
         </p:txBody>
       </p:sp>
@@ -28590,32 +28437,9 @@
           <a:p>
             <a:r>
               <a:rPr lang="sk-SK" smtClean="0"/>
-              <a:t>© 2016 EV3Lessons.com, Last Edit 10/18/2016</a:t>
-            </a:r>
-            <a:endParaRPr lang="en-US"/>
-          </a:p>
-        </p:txBody>
-      </p:sp>
-      <p:sp>
-        <p:nvSpPr>
-          <p:cNvPr id="5" name="Slide Number Placeholder 4"/>
-          <p:cNvSpPr>
-            <a:spLocks noGrp="1"/>
-          </p:cNvSpPr>
-          <p:nvPr>
-            <p:ph type="sldNum" sz="quarter" idx="12"/>
-          </p:nvPr>
-        </p:nvSpPr>
-        <p:spPr/>
-        <p:txBody>
-          <a:bodyPr/>
-          <a:lstStyle/>
-          <a:p>
-            <a:fld id="{4DBC7FC8-25FB-FC45-8177-2B991DA6778C}" type="slidenum">
-              <a:rPr lang="en-US" smtClean="0"/>
-              <a:t>6</a:t>
-            </a:fld>
-            <a:endParaRPr lang="en-US" dirty="0"/>
+              <a:t>© 2016 EV3Lessons.com, Last Edit 10/25/2016</a:t>
+            </a:r>
+            <a:endParaRPr lang="en-US"/>
           </a:p>
         </p:txBody>
       </p:sp>
@@ -29083,15 +28907,7 @@
             </a:pPr>
             <a:r>
               <a:rPr lang="en-US" sz="1800" dirty="0" smtClean="0"/>
-              <a:t>Normally, your EV3 executes </a:t>
-            </a:r>
-            <a:r>
-              <a:rPr lang="en-US" sz="1800" dirty="0" smtClean="0"/>
-              <a:t>instructions </a:t>
-            </a:r>
-            <a:r>
-              <a:rPr lang="en-US" sz="1800" dirty="0" smtClean="0"/>
-              <a:t>in sequential order</a:t>
+              <a:t>Normally, your EV3 executes instructions in sequential order</a:t>
             </a:r>
           </a:p>
           <a:p>
@@ -29158,32 +28974,9 @@
           <a:p>
             <a:r>
               <a:rPr lang="sk-SK" smtClean="0"/>
-              <a:t>© 2016 EV3Lessons.com, Last Edit 10/18/2016</a:t>
-            </a:r>
-            <a:endParaRPr lang="en-US"/>
-          </a:p>
-        </p:txBody>
-      </p:sp>
-      <p:sp>
-        <p:nvSpPr>
-          <p:cNvPr id="5" name="Slide Number Placeholder 4"/>
-          <p:cNvSpPr>
-            <a:spLocks noGrp="1"/>
-          </p:cNvSpPr>
-          <p:nvPr>
-            <p:ph type="sldNum" sz="quarter" idx="12"/>
-          </p:nvPr>
-        </p:nvSpPr>
-        <p:spPr/>
-        <p:txBody>
-          <a:bodyPr/>
-          <a:lstStyle/>
-          <a:p>
-            <a:fld id="{4DBC7FC8-25FB-FC45-8177-2B991DA6778C}" type="slidenum">
-              <a:rPr lang="en-US" smtClean="0"/>
-              <a:t>7</a:t>
-            </a:fld>
-            <a:endParaRPr lang="en-US" dirty="0"/>
+              <a:t>© 2016 EV3Lessons.com, Last Edit 10/25/2016</a:t>
+            </a:r>
+            <a:endParaRPr lang="en-US"/>
           </a:p>
         </p:txBody>
       </p:sp>
@@ -29264,7 +29057,15 @@
           <a:p>
             <a:r>
               <a:rPr lang="en-US" b="0" i="1" dirty="0" smtClean="0"/>
-              <a:t>What happens in a VM Instruction Break: In the bottom case, the branch jumps too far. The EV3 tries to interpret what the command “the motors” means and fails.</a:t>
+              <a:t>What happens in a VM </a:t>
+            </a:r>
+            <a:r>
+              <a:rPr lang="en-US" b="0" i="1" dirty="0" smtClean="0"/>
+              <a:t>Program Instruction </a:t>
+            </a:r>
+            <a:r>
+              <a:rPr lang="en-US" b="0" i="1" dirty="0" smtClean="0"/>
+              <a:t>Break: In the bottom case, the branch jumps too far. The EV3 tries to interpret what the command “the motors” means and fails.</a:t>
             </a:r>
             <a:endParaRPr lang="en-US" b="0" i="1" dirty="0"/>
           </a:p>
@@ -29287,32 +29088,9 @@
           <a:p>
             <a:r>
               <a:rPr lang="sk-SK" smtClean="0"/>
-              <a:t>© 2016 EV3Lessons.com, Last Edit 10/18/2016</a:t>
-            </a:r>
-            <a:endParaRPr lang="en-US"/>
-          </a:p>
-        </p:txBody>
-      </p:sp>
-      <p:sp>
-        <p:nvSpPr>
-          <p:cNvPr id="5" name="Slide Number Placeholder 4"/>
-          <p:cNvSpPr>
-            <a:spLocks noGrp="1"/>
-          </p:cNvSpPr>
-          <p:nvPr>
-            <p:ph type="sldNum" sz="quarter" idx="12"/>
-          </p:nvPr>
-        </p:nvSpPr>
-        <p:spPr/>
-        <p:txBody>
-          <a:bodyPr/>
-          <a:lstStyle/>
-          <a:p>
-            <a:fld id="{4DBC7FC8-25FB-FC45-8177-2B991DA6778C}" type="slidenum">
-              <a:rPr lang="en-US" smtClean="0"/>
-              <a:t>8</a:t>
-            </a:fld>
-            <a:endParaRPr lang="en-US" dirty="0"/>
+              <a:t>© 2016 EV3Lessons.com, Last Edit 10/25/2016</a:t>
+            </a:r>
+            <a:endParaRPr lang="en-US"/>
           </a:p>
         </p:txBody>
       </p:sp>
@@ -30459,32 +30237,9 @@
           <a:p>
             <a:r>
               <a:rPr lang="sk-SK" smtClean="0"/>
-              <a:t>© 2016 EV3Lessons.com, Last Edit 10/18/2016</a:t>
-            </a:r>
-            <a:endParaRPr lang="en-US"/>
-          </a:p>
-        </p:txBody>
-      </p:sp>
-      <p:sp>
-        <p:nvSpPr>
-          <p:cNvPr id="5" name="Slide Number Placeholder 4"/>
-          <p:cNvSpPr>
-            <a:spLocks noGrp="1"/>
-          </p:cNvSpPr>
-          <p:nvPr>
-            <p:ph type="sldNum" sz="quarter" idx="12"/>
-          </p:nvPr>
-        </p:nvSpPr>
-        <p:spPr/>
-        <p:txBody>
-          <a:bodyPr/>
-          <a:lstStyle/>
-          <a:p>
-            <a:fld id="{4DBC7FC8-25FB-FC45-8177-2B991DA6778C}" type="slidenum">
-              <a:rPr lang="en-US" smtClean="0"/>
-              <a:t>9</a:t>
-            </a:fld>
-            <a:endParaRPr lang="en-US" dirty="0"/>
+              <a:t>© 2016 EV3Lessons.com, Last Edit 10/25/2016</a:t>
+            </a:r>
+            <a:endParaRPr lang="en-US"/>
           </a:p>
         </p:txBody>
       </p:sp>

</xml_diff>